<commit_message>
Added Visualizations to power point Minor cleanup to ANA500.ipynb
</commit_message>
<xml_diff>
--- a/Grothe_ANA500_Micro-Project.pptx
+++ b/Grothe_ANA500_Micro-Project.pptx
@@ -14,9 +14,14 @@
     <p:sldId id="259" r:id="rId8"/>
     <p:sldId id="260" r:id="rId9"/>
     <p:sldId id="270" r:id="rId10"/>
-    <p:sldId id="261" r:id="rId11"/>
-    <p:sldId id="262" r:id="rId12"/>
-    <p:sldId id="263" r:id="rId13"/>
+    <p:sldId id="273" r:id="rId11"/>
+    <p:sldId id="272" r:id="rId12"/>
+    <p:sldId id="274" r:id="rId13"/>
+    <p:sldId id="275" r:id="rId14"/>
+    <p:sldId id="276" r:id="rId15"/>
+    <p:sldId id="261" r:id="rId16"/>
+    <p:sldId id="262" r:id="rId17"/>
+    <p:sldId id="263" r:id="rId18"/>
   </p:sldIdLst>
   <p:sldSz cx="12192000" cy="6858000"/>
   <p:notesSz cx="6858000" cy="9144000"/>
@@ -278,7 +283,7 @@
           <a:p>
             <a:fld id="{3F52AFC1-4F45-459D-BC95-0F8F5E3A4294}" type="datetimeFigureOut">
               <a:rPr lang="en-US" smtClean="0"/>
-              <a:t>10/2/22</a:t>
+              <a:t>10/9/22</a:t>
             </a:fld>
             <a:endParaRPr lang="en-US"/>
           </a:p>
@@ -476,7 +481,7 @@
           <a:p>
             <a:fld id="{3F52AFC1-4F45-459D-BC95-0F8F5E3A4294}" type="datetimeFigureOut">
               <a:rPr lang="en-US" smtClean="0"/>
-              <a:t>10/2/22</a:t>
+              <a:t>10/9/22</a:t>
             </a:fld>
             <a:endParaRPr lang="en-US"/>
           </a:p>
@@ -684,7 +689,7 @@
           <a:p>
             <a:fld id="{3F52AFC1-4F45-459D-BC95-0F8F5E3A4294}" type="datetimeFigureOut">
               <a:rPr lang="en-US" smtClean="0"/>
-              <a:t>10/2/22</a:t>
+              <a:t>10/9/22</a:t>
             </a:fld>
             <a:endParaRPr lang="en-US"/>
           </a:p>
@@ -882,7 +887,7 @@
           <a:p>
             <a:fld id="{3F52AFC1-4F45-459D-BC95-0F8F5E3A4294}" type="datetimeFigureOut">
               <a:rPr lang="en-US" smtClean="0"/>
-              <a:t>10/2/22</a:t>
+              <a:t>10/9/22</a:t>
             </a:fld>
             <a:endParaRPr lang="en-US"/>
           </a:p>
@@ -1157,7 +1162,7 @@
           <a:p>
             <a:fld id="{3F52AFC1-4F45-459D-BC95-0F8F5E3A4294}" type="datetimeFigureOut">
               <a:rPr lang="en-US" smtClean="0"/>
-              <a:t>10/2/22</a:t>
+              <a:t>10/9/22</a:t>
             </a:fld>
             <a:endParaRPr lang="en-US"/>
           </a:p>
@@ -1422,7 +1427,7 @@
           <a:p>
             <a:fld id="{3F52AFC1-4F45-459D-BC95-0F8F5E3A4294}" type="datetimeFigureOut">
               <a:rPr lang="en-US" smtClean="0"/>
-              <a:t>10/2/22</a:t>
+              <a:t>10/9/22</a:t>
             </a:fld>
             <a:endParaRPr lang="en-US"/>
           </a:p>
@@ -1834,7 +1839,7 @@
           <a:p>
             <a:fld id="{3F52AFC1-4F45-459D-BC95-0F8F5E3A4294}" type="datetimeFigureOut">
               <a:rPr lang="en-US" smtClean="0"/>
-              <a:t>10/2/22</a:t>
+              <a:t>10/9/22</a:t>
             </a:fld>
             <a:endParaRPr lang="en-US"/>
           </a:p>
@@ -1975,7 +1980,7 @@
           <a:p>
             <a:fld id="{3F52AFC1-4F45-459D-BC95-0F8F5E3A4294}" type="datetimeFigureOut">
               <a:rPr lang="en-US" smtClean="0"/>
-              <a:t>10/2/22</a:t>
+              <a:t>10/9/22</a:t>
             </a:fld>
             <a:endParaRPr lang="en-US"/>
           </a:p>
@@ -2088,7 +2093,7 @@
           <a:p>
             <a:fld id="{3F52AFC1-4F45-459D-BC95-0F8F5E3A4294}" type="datetimeFigureOut">
               <a:rPr lang="en-US" smtClean="0"/>
-              <a:t>10/2/22</a:t>
+              <a:t>10/9/22</a:t>
             </a:fld>
             <a:endParaRPr lang="en-US"/>
           </a:p>
@@ -2399,7 +2404,7 @@
           <a:p>
             <a:fld id="{3F52AFC1-4F45-459D-BC95-0F8F5E3A4294}" type="datetimeFigureOut">
               <a:rPr lang="en-US" smtClean="0"/>
-              <a:t>10/2/22</a:t>
+              <a:t>10/9/22</a:t>
             </a:fld>
             <a:endParaRPr lang="en-US"/>
           </a:p>
@@ -2687,7 +2692,7 @@
           <a:p>
             <a:fld id="{3F52AFC1-4F45-459D-BC95-0F8F5E3A4294}" type="datetimeFigureOut">
               <a:rPr lang="en-US" smtClean="0"/>
-              <a:t>10/2/22</a:t>
+              <a:t>10/9/22</a:t>
             </a:fld>
             <a:endParaRPr lang="en-US"/>
           </a:p>
@@ -2928,7 +2933,7 @@
           <a:p>
             <a:fld id="{3F52AFC1-4F45-459D-BC95-0F8F5E3A4294}" type="datetimeFigureOut">
               <a:rPr lang="en-US" smtClean="0"/>
-              <a:t>10/2/22</a:t>
+              <a:t>10/9/22</a:t>
             </a:fld>
             <a:endParaRPr lang="en-US"/>
           </a:p>
@@ -3382,30 +3387,16 @@
             </a:br>
             <a:r>
               <a:rPr lang="en-US" sz="4800" dirty="0"/>
-              <a:t>Micro-Project #1</a:t>
+              <a:t>Micro-Project #2</a:t>
             </a:r>
             <a:br>
               <a:rPr lang="en-US" sz="4800" dirty="0"/>
             </a:br>
             <a:r>
-              <a:rPr lang="en-US" sz="4800" dirty="0"/>
-              <a:t>https://</a:t>
-            </a:r>
-            <a:r>
-              <a:rPr lang="en-US" sz="4800" dirty="0" err="1"/>
-              <a:t>github.com</a:t>
-            </a:r>
-            <a:r>
-              <a:rPr lang="en-US" sz="4800" dirty="0"/>
-              <a:t>/</a:t>
-            </a:r>
-            <a:r>
-              <a:rPr lang="en-US" sz="4800" dirty="0" err="1"/>
-              <a:t>kurtgrothe</a:t>
-            </a:r>
-            <a:r>
-              <a:rPr lang="en-US" sz="4800" dirty="0"/>
-              <a:t>/ANA500</a:t>
+              <a:rPr lang="en-US" sz="4800" dirty="0">
+                <a:hlinkClick r:id="rId2"/>
+              </a:rPr>
+              <a:t>https://github.com/kurtgrothe/ANA500</a:t>
             </a:r>
             <a:endParaRPr lang="en-US" dirty="0"/>
           </a:p>
@@ -3440,7 +3431,7 @@
           <a:p>
             <a:r>
               <a:rPr lang="en-US" dirty="0"/>
-              <a:t>October 2, 2022</a:t>
+              <a:t>October 9, 2022</a:t>
             </a:r>
           </a:p>
           <a:p>
@@ -3501,46 +3492,8 @@
           <a:p>
             <a:r>
               <a:rPr lang="en-US" dirty="0"/>
-              <a:t>Analyze data</a:t>
-            </a:r>
-          </a:p>
-        </p:txBody>
-      </p:sp>
-      <p:sp>
-        <p:nvSpPr>
-          <p:cNvPr id="3" name="Content Placeholder 2">
-            <a:extLst>
-              <a:ext uri="{FF2B5EF4-FFF2-40B4-BE49-F238E27FC236}">
-                <a16:creationId xmlns:a16="http://schemas.microsoft.com/office/drawing/2014/main" id="{7FEAE391-6366-4E20-A14E-0ECFAEA8029A}"/>
-              </a:ext>
-            </a:extLst>
-          </p:cNvPr>
-          <p:cNvSpPr>
-            <a:spLocks noGrp="1"/>
-          </p:cNvSpPr>
-          <p:nvPr>
-            <p:ph idx="1"/>
-          </p:nvPr>
-        </p:nvSpPr>
-        <p:spPr/>
-        <p:txBody>
-          <a:bodyPr/>
-          <a:lstStyle/>
-          <a:p>
-            <a:r>
-              <a:rPr lang="en-US" sz="1800" dirty="0">
-                <a:solidFill>
-                  <a:srgbClr val="000000"/>
-                </a:solidFill>
-                <a:effectLst/>
-                <a:latin typeface="Times New Roman" panose="02020603050405020304" pitchFamily="18" charset="0"/>
-                <a:ea typeface="Times New Roman" panose="02020603050405020304" pitchFamily="18" charset="0"/>
-              </a:rPr>
-              <a:t>&lt;select analytical technique, build models&gt;</a:t>
-            </a:r>
-          </a:p>
-          <a:p>
-            <a:endParaRPr lang="en-US" dirty="0"/>
+              <a:t>Prepare, cont.</a:t>
+            </a:r>
           </a:p>
         </p:txBody>
       </p:sp>
@@ -3549,7 +3502,7 @@
           <p:cNvPr id="5" name="TextBox 4">
             <a:extLst>
               <a:ext uri="{FF2B5EF4-FFF2-40B4-BE49-F238E27FC236}">
-                <a16:creationId xmlns:a16="http://schemas.microsoft.com/office/drawing/2014/main" id="{3475667D-8683-F088-9369-EC60A0415E3F}"/>
+                <a16:creationId xmlns:a16="http://schemas.microsoft.com/office/drawing/2014/main" id="{D288555E-1FC8-BD23-E0B7-492F0E75C777}"/>
               </a:ext>
             </a:extLst>
           </p:cNvPr>
@@ -3580,15 +3533,123 @@
                   </a:schemeClr>
                 </a:solidFill>
               </a:rPr>
-              <a:t>The Data Science Process (3/5)</a:t>
-            </a:r>
-          </a:p>
-        </p:txBody>
-      </p:sp>
+              <a:t>The Data Science Process (2/5)</a:t>
+            </a:r>
+          </a:p>
+        </p:txBody>
+      </p:sp>
+      <p:pic>
+        <p:nvPicPr>
+          <p:cNvPr id="4" name="Picture 3">
+            <a:extLst>
+              <a:ext uri="{FF2B5EF4-FFF2-40B4-BE49-F238E27FC236}">
+                <a16:creationId xmlns:a16="http://schemas.microsoft.com/office/drawing/2014/main" id="{98505A32-4ECB-1AFE-4ADB-553726C3C0BE}"/>
+              </a:ext>
+            </a:extLst>
+          </p:cNvPr>
+          <p:cNvPicPr>
+            <a:picLocks noChangeAspect="1"/>
+          </p:cNvPicPr>
+          <p:nvPr/>
+        </p:nvPicPr>
+        <p:blipFill>
+          <a:blip r:embed="rId2">
+            <a:extLst>
+              <a:ext uri="{28A0092B-C50C-407E-A947-70E740481C1C}">
+                <a14:useLocalDpi xmlns:a14="http://schemas.microsoft.com/office/drawing/2010/main" val="0"/>
+              </a:ext>
+            </a:extLst>
+          </a:blip>
+          <a:stretch>
+            <a:fillRect/>
+          </a:stretch>
+        </p:blipFill>
+        <p:spPr>
+          <a:xfrm>
+            <a:off x="248435" y="2088733"/>
+            <a:ext cx="3276469" cy="2890630"/>
+          </a:xfrm>
+          <a:prstGeom prst="rect">
+            <a:avLst/>
+          </a:prstGeom>
+        </p:spPr>
+      </p:pic>
+      <p:pic>
+        <p:nvPicPr>
+          <p:cNvPr id="7" name="Picture 6">
+            <a:extLst>
+              <a:ext uri="{FF2B5EF4-FFF2-40B4-BE49-F238E27FC236}">
+                <a16:creationId xmlns:a16="http://schemas.microsoft.com/office/drawing/2014/main" id="{F6BAA549-3206-A84F-FCAB-DF1494063495}"/>
+              </a:ext>
+            </a:extLst>
+          </p:cNvPr>
+          <p:cNvPicPr>
+            <a:picLocks noChangeAspect="1"/>
+          </p:cNvPicPr>
+          <p:nvPr/>
+        </p:nvPicPr>
+        <p:blipFill>
+          <a:blip r:embed="rId3">
+            <a:extLst>
+              <a:ext uri="{28A0092B-C50C-407E-A947-70E740481C1C}">
+                <a14:useLocalDpi xmlns:a14="http://schemas.microsoft.com/office/drawing/2010/main" val="0"/>
+              </a:ext>
+            </a:extLst>
+          </a:blip>
+          <a:stretch>
+            <a:fillRect/>
+          </a:stretch>
+        </p:blipFill>
+        <p:spPr>
+          <a:xfrm>
+            <a:off x="3959830" y="2088733"/>
+            <a:ext cx="3340741" cy="2958757"/>
+          </a:xfrm>
+          <a:prstGeom prst="rect">
+            <a:avLst/>
+          </a:prstGeom>
+        </p:spPr>
+      </p:pic>
+      <p:pic>
+        <p:nvPicPr>
+          <p:cNvPr id="9" name="Picture 8">
+            <a:extLst>
+              <a:ext uri="{FF2B5EF4-FFF2-40B4-BE49-F238E27FC236}">
+                <a16:creationId xmlns:a16="http://schemas.microsoft.com/office/drawing/2014/main" id="{A5DB4FF4-0FEC-343D-E5B3-F6975893AB2C}"/>
+              </a:ext>
+            </a:extLst>
+          </p:cNvPr>
+          <p:cNvPicPr>
+            <a:picLocks noChangeAspect="1"/>
+          </p:cNvPicPr>
+          <p:nvPr/>
+        </p:nvPicPr>
+        <p:blipFill>
+          <a:blip r:embed="rId4">
+            <a:extLst>
+              <a:ext uri="{28A0092B-C50C-407E-A947-70E740481C1C}">
+                <a14:useLocalDpi xmlns:a14="http://schemas.microsoft.com/office/drawing/2010/main" val="0"/>
+              </a:ext>
+            </a:extLst>
+          </a:blip>
+          <a:stretch>
+            <a:fillRect/>
+          </a:stretch>
+        </p:blipFill>
+        <p:spPr>
+          <a:xfrm>
+            <a:off x="8013058" y="1983684"/>
+            <a:ext cx="3340742" cy="3100727"/>
+          </a:xfrm>
+          <a:prstGeom prst="rect">
+            <a:avLst/>
+          </a:prstGeom>
+        </p:spPr>
+      </p:pic>
     </p:spTree>
     <p:extLst>
       <p:ext uri="{BB962C8B-B14F-4D97-AF65-F5344CB8AC3E}">
-        <p14:creationId xmlns:p14="http://schemas.microsoft.com/office/powerpoint/2010/main" val="69798042"/>
+        <p14:creationId xmlns:p14="http://schemas.microsoft.com/office/powerpoint/2010/main" val="2460866311"/>
       </p:ext>
     </p:extLst>
   </p:cSld>
@@ -3638,6 +3699,863 @@
           <a:p>
             <a:r>
               <a:rPr lang="en-US" dirty="0"/>
+              <a:t>Prepare, cont.</a:t>
+            </a:r>
+          </a:p>
+        </p:txBody>
+      </p:sp>
+      <p:sp>
+        <p:nvSpPr>
+          <p:cNvPr id="5" name="TextBox 4">
+            <a:extLst>
+              <a:ext uri="{FF2B5EF4-FFF2-40B4-BE49-F238E27FC236}">
+                <a16:creationId xmlns:a16="http://schemas.microsoft.com/office/drawing/2014/main" id="{D288555E-1FC8-BD23-E0B7-492F0E75C777}"/>
+              </a:ext>
+            </a:extLst>
+          </p:cNvPr>
+          <p:cNvSpPr txBox="1"/>
+          <p:nvPr/>
+        </p:nvSpPr>
+        <p:spPr>
+          <a:xfrm>
+            <a:off x="9035144" y="217714"/>
+            <a:ext cx="2743200" cy="338554"/>
+          </a:xfrm>
+          <a:prstGeom prst="rect">
+            <a:avLst/>
+          </a:prstGeom>
+          <a:noFill/>
+        </p:spPr>
+        <p:txBody>
+          <a:bodyPr wrap="square" rtlCol="0">
+            <a:spAutoFit/>
+          </a:bodyPr>
+          <a:lstStyle/>
+          <a:p>
+            <a:r>
+              <a:rPr lang="en-US" sz="1600" dirty="0">
+                <a:solidFill>
+                  <a:schemeClr val="bg1">
+                    <a:lumMod val="50000"/>
+                  </a:schemeClr>
+                </a:solidFill>
+              </a:rPr>
+              <a:t>The Data Science Process (2/5)</a:t>
+            </a:r>
+          </a:p>
+        </p:txBody>
+      </p:sp>
+      <p:pic>
+        <p:nvPicPr>
+          <p:cNvPr id="4" name="Picture 3">
+            <a:extLst>
+              <a:ext uri="{FF2B5EF4-FFF2-40B4-BE49-F238E27FC236}">
+                <a16:creationId xmlns:a16="http://schemas.microsoft.com/office/drawing/2014/main" id="{34B756B0-3D4B-07E1-7104-9D714AB3BE57}"/>
+              </a:ext>
+            </a:extLst>
+          </p:cNvPr>
+          <p:cNvPicPr>
+            <a:picLocks noChangeAspect="1"/>
+          </p:cNvPicPr>
+          <p:nvPr/>
+        </p:nvPicPr>
+        <p:blipFill>
+          <a:blip r:embed="rId2">
+            <a:extLst>
+              <a:ext uri="{28A0092B-C50C-407E-A947-70E740481C1C}">
+                <a14:useLocalDpi xmlns:a14="http://schemas.microsoft.com/office/drawing/2010/main" val="0"/>
+              </a:ext>
+            </a:extLst>
+          </a:blip>
+          <a:stretch>
+            <a:fillRect/>
+          </a:stretch>
+        </p:blipFill>
+        <p:spPr>
+          <a:xfrm>
+            <a:off x="838200" y="1759770"/>
+            <a:ext cx="3723946" cy="3338459"/>
+          </a:xfrm>
+          <a:prstGeom prst="rect">
+            <a:avLst/>
+          </a:prstGeom>
+        </p:spPr>
+      </p:pic>
+      <p:pic>
+        <p:nvPicPr>
+          <p:cNvPr id="7" name="Picture 6">
+            <a:extLst>
+              <a:ext uri="{FF2B5EF4-FFF2-40B4-BE49-F238E27FC236}">
+                <a16:creationId xmlns:a16="http://schemas.microsoft.com/office/drawing/2014/main" id="{7C73E8B9-6207-5086-E096-9D14750B86AF}"/>
+              </a:ext>
+            </a:extLst>
+          </p:cNvPr>
+          <p:cNvPicPr>
+            <a:picLocks noChangeAspect="1"/>
+          </p:cNvPicPr>
+          <p:nvPr/>
+        </p:nvPicPr>
+        <p:blipFill>
+          <a:blip r:embed="rId3">
+            <a:extLst>
+              <a:ext uri="{28A0092B-C50C-407E-A947-70E740481C1C}">
+                <a14:useLocalDpi xmlns:a14="http://schemas.microsoft.com/office/drawing/2010/main" val="0"/>
+              </a:ext>
+            </a:extLst>
+          </a:blip>
+          <a:stretch>
+            <a:fillRect/>
+          </a:stretch>
+        </p:blipFill>
+        <p:spPr>
+          <a:xfrm>
+            <a:off x="5274078" y="1759769"/>
+            <a:ext cx="3786034" cy="3338460"/>
+          </a:xfrm>
+          <a:prstGeom prst="rect">
+            <a:avLst/>
+          </a:prstGeom>
+        </p:spPr>
+      </p:pic>
+    </p:spTree>
+    <p:extLst>
+      <p:ext uri="{BB962C8B-B14F-4D97-AF65-F5344CB8AC3E}">
+        <p14:creationId xmlns:p14="http://schemas.microsoft.com/office/powerpoint/2010/main" val="3933490422"/>
+      </p:ext>
+    </p:extLst>
+  </p:cSld>
+  <p:clrMapOvr>
+    <a:masterClrMapping/>
+  </p:clrMapOvr>
+</p:sld>
+</file>
+
+<file path=ppt/slides/slide12.xml><?xml version="1.0" encoding="utf-8"?>
+<p:sld xmlns:a="http://schemas.openxmlformats.org/drawingml/2006/main" xmlns:r="http://schemas.openxmlformats.org/officeDocument/2006/relationships" xmlns:p="http://schemas.openxmlformats.org/presentationml/2006/main">
+  <p:cSld>
+    <p:spTree>
+      <p:nvGrpSpPr>
+        <p:cNvPr id="1" name=""/>
+        <p:cNvGrpSpPr/>
+        <p:nvPr/>
+      </p:nvGrpSpPr>
+      <p:grpSpPr>
+        <a:xfrm>
+          <a:off x="0" y="0"/>
+          <a:ext cx="0" cy="0"/>
+          <a:chOff x="0" y="0"/>
+          <a:chExt cx="0" cy="0"/>
+        </a:xfrm>
+      </p:grpSpPr>
+      <p:sp>
+        <p:nvSpPr>
+          <p:cNvPr id="2" name="Title 1">
+            <a:extLst>
+              <a:ext uri="{FF2B5EF4-FFF2-40B4-BE49-F238E27FC236}">
+                <a16:creationId xmlns:a16="http://schemas.microsoft.com/office/drawing/2014/main" id="{DB2A7252-6823-44F9-B464-D7A15D12BB65}"/>
+              </a:ext>
+            </a:extLst>
+          </p:cNvPr>
+          <p:cNvSpPr>
+            <a:spLocks noGrp="1"/>
+          </p:cNvSpPr>
+          <p:nvPr>
+            <p:ph type="title"/>
+          </p:nvPr>
+        </p:nvSpPr>
+        <p:spPr/>
+        <p:txBody>
+          <a:bodyPr/>
+          <a:lstStyle/>
+          <a:p>
+            <a:r>
+              <a:rPr lang="en-US" dirty="0"/>
+              <a:t>Prepare, cont.</a:t>
+            </a:r>
+          </a:p>
+        </p:txBody>
+      </p:sp>
+      <p:sp>
+        <p:nvSpPr>
+          <p:cNvPr id="5" name="TextBox 4">
+            <a:extLst>
+              <a:ext uri="{FF2B5EF4-FFF2-40B4-BE49-F238E27FC236}">
+                <a16:creationId xmlns:a16="http://schemas.microsoft.com/office/drawing/2014/main" id="{D288555E-1FC8-BD23-E0B7-492F0E75C777}"/>
+              </a:ext>
+            </a:extLst>
+          </p:cNvPr>
+          <p:cNvSpPr txBox="1"/>
+          <p:nvPr/>
+        </p:nvSpPr>
+        <p:spPr>
+          <a:xfrm>
+            <a:off x="9035144" y="217714"/>
+            <a:ext cx="2743200" cy="338554"/>
+          </a:xfrm>
+          <a:prstGeom prst="rect">
+            <a:avLst/>
+          </a:prstGeom>
+          <a:noFill/>
+        </p:spPr>
+        <p:txBody>
+          <a:bodyPr wrap="square" rtlCol="0">
+            <a:spAutoFit/>
+          </a:bodyPr>
+          <a:lstStyle/>
+          <a:p>
+            <a:r>
+              <a:rPr lang="en-US" sz="1600" dirty="0">
+                <a:solidFill>
+                  <a:schemeClr val="bg1">
+                    <a:lumMod val="50000"/>
+                  </a:schemeClr>
+                </a:solidFill>
+              </a:rPr>
+              <a:t>The Data Science Process (2/5)</a:t>
+            </a:r>
+          </a:p>
+        </p:txBody>
+      </p:sp>
+      <p:pic>
+        <p:nvPicPr>
+          <p:cNvPr id="6" name="Picture 5">
+            <a:extLst>
+              <a:ext uri="{FF2B5EF4-FFF2-40B4-BE49-F238E27FC236}">
+                <a16:creationId xmlns:a16="http://schemas.microsoft.com/office/drawing/2014/main" id="{34A6410B-C205-9F75-0D9B-D098FB033187}"/>
+              </a:ext>
+            </a:extLst>
+          </p:cNvPr>
+          <p:cNvPicPr>
+            <a:picLocks noChangeAspect="1"/>
+          </p:cNvPicPr>
+          <p:nvPr/>
+        </p:nvPicPr>
+        <p:blipFill>
+          <a:blip r:embed="rId2">
+            <a:extLst>
+              <a:ext uri="{28A0092B-C50C-407E-A947-70E740481C1C}">
+                <a14:useLocalDpi xmlns:a14="http://schemas.microsoft.com/office/drawing/2010/main" val="0"/>
+              </a:ext>
+            </a:extLst>
+          </a:blip>
+          <a:stretch>
+            <a:fillRect/>
+          </a:stretch>
+        </p:blipFill>
+        <p:spPr>
+          <a:xfrm>
+            <a:off x="150259" y="1873172"/>
+            <a:ext cx="3846586" cy="2985934"/>
+          </a:xfrm>
+          <a:prstGeom prst="rect">
+            <a:avLst/>
+          </a:prstGeom>
+        </p:spPr>
+      </p:pic>
+      <p:pic>
+        <p:nvPicPr>
+          <p:cNvPr id="9" name="Picture 8">
+            <a:extLst>
+              <a:ext uri="{FF2B5EF4-FFF2-40B4-BE49-F238E27FC236}">
+                <a16:creationId xmlns:a16="http://schemas.microsoft.com/office/drawing/2014/main" id="{120FFC2F-AE68-C0E2-7B2D-A16F0FE06BD6}"/>
+              </a:ext>
+            </a:extLst>
+          </p:cNvPr>
+          <p:cNvPicPr>
+            <a:picLocks noChangeAspect="1"/>
+          </p:cNvPicPr>
+          <p:nvPr/>
+        </p:nvPicPr>
+        <p:blipFill>
+          <a:blip r:embed="rId3">
+            <a:extLst>
+              <a:ext uri="{28A0092B-C50C-407E-A947-70E740481C1C}">
+                <a14:useLocalDpi xmlns:a14="http://schemas.microsoft.com/office/drawing/2010/main" val="0"/>
+              </a:ext>
+            </a:extLst>
+          </a:blip>
+          <a:stretch>
+            <a:fillRect/>
+          </a:stretch>
+        </p:blipFill>
+        <p:spPr>
+          <a:xfrm>
+            <a:off x="4149547" y="1873172"/>
+            <a:ext cx="3708076" cy="2985934"/>
+          </a:xfrm>
+          <a:prstGeom prst="rect">
+            <a:avLst/>
+          </a:prstGeom>
+        </p:spPr>
+      </p:pic>
+      <p:pic>
+        <p:nvPicPr>
+          <p:cNvPr id="11" name="Picture 10">
+            <a:extLst>
+              <a:ext uri="{FF2B5EF4-FFF2-40B4-BE49-F238E27FC236}">
+                <a16:creationId xmlns:a16="http://schemas.microsoft.com/office/drawing/2014/main" id="{9C3A1F70-CA8D-AAED-11DD-42452A344925}"/>
+              </a:ext>
+            </a:extLst>
+          </p:cNvPr>
+          <p:cNvPicPr>
+            <a:picLocks noChangeAspect="1"/>
+          </p:cNvPicPr>
+          <p:nvPr/>
+        </p:nvPicPr>
+        <p:blipFill>
+          <a:blip r:embed="rId4">
+            <a:extLst>
+              <a:ext uri="{28A0092B-C50C-407E-A947-70E740481C1C}">
+                <a14:useLocalDpi xmlns:a14="http://schemas.microsoft.com/office/drawing/2010/main" val="0"/>
+              </a:ext>
+            </a:extLst>
+          </a:blip>
+          <a:stretch>
+            <a:fillRect/>
+          </a:stretch>
+        </p:blipFill>
+        <p:spPr>
+          <a:xfrm>
+            <a:off x="8382524" y="1838099"/>
+            <a:ext cx="3551948" cy="2985934"/>
+          </a:xfrm>
+          <a:prstGeom prst="rect">
+            <a:avLst/>
+          </a:prstGeom>
+        </p:spPr>
+      </p:pic>
+    </p:spTree>
+    <p:extLst>
+      <p:ext uri="{BB962C8B-B14F-4D97-AF65-F5344CB8AC3E}">
+        <p14:creationId xmlns:p14="http://schemas.microsoft.com/office/powerpoint/2010/main" val="1152645182"/>
+      </p:ext>
+    </p:extLst>
+  </p:cSld>
+  <p:clrMapOvr>
+    <a:masterClrMapping/>
+  </p:clrMapOvr>
+</p:sld>
+</file>
+
+<file path=ppt/slides/slide13.xml><?xml version="1.0" encoding="utf-8"?>
+<p:sld xmlns:a="http://schemas.openxmlformats.org/drawingml/2006/main" xmlns:r="http://schemas.openxmlformats.org/officeDocument/2006/relationships" xmlns:p="http://schemas.openxmlformats.org/presentationml/2006/main">
+  <p:cSld>
+    <p:spTree>
+      <p:nvGrpSpPr>
+        <p:cNvPr id="1" name=""/>
+        <p:cNvGrpSpPr/>
+        <p:nvPr/>
+      </p:nvGrpSpPr>
+      <p:grpSpPr>
+        <a:xfrm>
+          <a:off x="0" y="0"/>
+          <a:ext cx="0" cy="0"/>
+          <a:chOff x="0" y="0"/>
+          <a:chExt cx="0" cy="0"/>
+        </a:xfrm>
+      </p:grpSpPr>
+      <p:sp>
+        <p:nvSpPr>
+          <p:cNvPr id="2" name="Title 1">
+            <a:extLst>
+              <a:ext uri="{FF2B5EF4-FFF2-40B4-BE49-F238E27FC236}">
+                <a16:creationId xmlns:a16="http://schemas.microsoft.com/office/drawing/2014/main" id="{DB2A7252-6823-44F9-B464-D7A15D12BB65}"/>
+              </a:ext>
+            </a:extLst>
+          </p:cNvPr>
+          <p:cNvSpPr>
+            <a:spLocks noGrp="1"/>
+          </p:cNvSpPr>
+          <p:nvPr>
+            <p:ph type="title"/>
+          </p:nvPr>
+        </p:nvSpPr>
+        <p:spPr/>
+        <p:txBody>
+          <a:bodyPr/>
+          <a:lstStyle/>
+          <a:p>
+            <a:r>
+              <a:rPr lang="en-US" dirty="0"/>
+              <a:t>Prepare, cont.</a:t>
+            </a:r>
+          </a:p>
+        </p:txBody>
+      </p:sp>
+      <p:sp>
+        <p:nvSpPr>
+          <p:cNvPr id="5" name="TextBox 4">
+            <a:extLst>
+              <a:ext uri="{FF2B5EF4-FFF2-40B4-BE49-F238E27FC236}">
+                <a16:creationId xmlns:a16="http://schemas.microsoft.com/office/drawing/2014/main" id="{D288555E-1FC8-BD23-E0B7-492F0E75C777}"/>
+              </a:ext>
+            </a:extLst>
+          </p:cNvPr>
+          <p:cNvSpPr txBox="1"/>
+          <p:nvPr/>
+        </p:nvSpPr>
+        <p:spPr>
+          <a:xfrm>
+            <a:off x="9035144" y="217714"/>
+            <a:ext cx="2743200" cy="338554"/>
+          </a:xfrm>
+          <a:prstGeom prst="rect">
+            <a:avLst/>
+          </a:prstGeom>
+          <a:noFill/>
+        </p:spPr>
+        <p:txBody>
+          <a:bodyPr wrap="square" rtlCol="0">
+            <a:spAutoFit/>
+          </a:bodyPr>
+          <a:lstStyle/>
+          <a:p>
+            <a:r>
+              <a:rPr lang="en-US" sz="1600" dirty="0">
+                <a:solidFill>
+                  <a:schemeClr val="bg1">
+                    <a:lumMod val="50000"/>
+                  </a:schemeClr>
+                </a:solidFill>
+              </a:rPr>
+              <a:t>The Data Science Process (2/5)</a:t>
+            </a:r>
+          </a:p>
+        </p:txBody>
+      </p:sp>
+      <p:pic>
+        <p:nvPicPr>
+          <p:cNvPr id="4" name="Picture 3">
+            <a:extLst>
+              <a:ext uri="{FF2B5EF4-FFF2-40B4-BE49-F238E27FC236}">
+                <a16:creationId xmlns:a16="http://schemas.microsoft.com/office/drawing/2014/main" id="{1042FCC0-2150-5B45-DCDD-E28A1C8BAB91}"/>
+              </a:ext>
+            </a:extLst>
+          </p:cNvPr>
+          <p:cNvPicPr>
+            <a:picLocks noChangeAspect="1"/>
+          </p:cNvPicPr>
+          <p:nvPr/>
+        </p:nvPicPr>
+        <p:blipFill>
+          <a:blip r:embed="rId2">
+            <a:extLst>
+              <a:ext uri="{28A0092B-C50C-407E-A947-70E740481C1C}">
+                <a14:useLocalDpi xmlns:a14="http://schemas.microsoft.com/office/drawing/2010/main" val="0"/>
+              </a:ext>
+            </a:extLst>
+          </a:blip>
+          <a:stretch>
+            <a:fillRect/>
+          </a:stretch>
+        </p:blipFill>
+        <p:spPr>
+          <a:xfrm>
+            <a:off x="372224" y="2073250"/>
+            <a:ext cx="3787026" cy="2910623"/>
+          </a:xfrm>
+          <a:prstGeom prst="rect">
+            <a:avLst/>
+          </a:prstGeom>
+        </p:spPr>
+      </p:pic>
+      <p:pic>
+        <p:nvPicPr>
+          <p:cNvPr id="7" name="Picture 6">
+            <a:extLst>
+              <a:ext uri="{FF2B5EF4-FFF2-40B4-BE49-F238E27FC236}">
+                <a16:creationId xmlns:a16="http://schemas.microsoft.com/office/drawing/2014/main" id="{6594F310-7E1A-8F6F-366B-D2E1E23BCF4C}"/>
+              </a:ext>
+            </a:extLst>
+          </p:cNvPr>
+          <p:cNvPicPr>
+            <a:picLocks noChangeAspect="1"/>
+          </p:cNvPicPr>
+          <p:nvPr/>
+        </p:nvPicPr>
+        <p:blipFill>
+          <a:blip r:embed="rId3">
+            <a:extLst>
+              <a:ext uri="{28A0092B-C50C-407E-A947-70E740481C1C}">
+                <a14:useLocalDpi xmlns:a14="http://schemas.microsoft.com/office/drawing/2010/main" val="0"/>
+              </a:ext>
+            </a:extLst>
+          </a:blip>
+          <a:stretch>
+            <a:fillRect/>
+          </a:stretch>
+        </p:blipFill>
+        <p:spPr>
+          <a:xfrm>
+            <a:off x="4275226" y="2073250"/>
+            <a:ext cx="3453901" cy="3007740"/>
+          </a:xfrm>
+          <a:prstGeom prst="rect">
+            <a:avLst/>
+          </a:prstGeom>
+        </p:spPr>
+      </p:pic>
+      <p:pic>
+        <p:nvPicPr>
+          <p:cNvPr id="9" name="Picture 8">
+            <a:extLst>
+              <a:ext uri="{FF2B5EF4-FFF2-40B4-BE49-F238E27FC236}">
+                <a16:creationId xmlns:a16="http://schemas.microsoft.com/office/drawing/2014/main" id="{D8706BA7-9C52-834F-7CE7-711777B3C8C2}"/>
+              </a:ext>
+            </a:extLst>
+          </p:cNvPr>
+          <p:cNvPicPr>
+            <a:picLocks noChangeAspect="1"/>
+          </p:cNvPicPr>
+          <p:nvPr/>
+        </p:nvPicPr>
+        <p:blipFill>
+          <a:blip r:embed="rId4">
+            <a:extLst>
+              <a:ext uri="{28A0092B-C50C-407E-A947-70E740481C1C}">
+                <a14:useLocalDpi xmlns:a14="http://schemas.microsoft.com/office/drawing/2010/main" val="0"/>
+              </a:ext>
+            </a:extLst>
+          </a:blip>
+          <a:stretch>
+            <a:fillRect/>
+          </a:stretch>
+        </p:blipFill>
+        <p:spPr>
+          <a:xfrm>
+            <a:off x="8032752" y="1976133"/>
+            <a:ext cx="3699270" cy="3007740"/>
+          </a:xfrm>
+          <a:prstGeom prst="rect">
+            <a:avLst/>
+          </a:prstGeom>
+        </p:spPr>
+      </p:pic>
+    </p:spTree>
+    <p:extLst>
+      <p:ext uri="{BB962C8B-B14F-4D97-AF65-F5344CB8AC3E}">
+        <p14:creationId xmlns:p14="http://schemas.microsoft.com/office/powerpoint/2010/main" val="1895359332"/>
+      </p:ext>
+    </p:extLst>
+  </p:cSld>
+  <p:clrMapOvr>
+    <a:masterClrMapping/>
+  </p:clrMapOvr>
+</p:sld>
+</file>
+
+<file path=ppt/slides/slide14.xml><?xml version="1.0" encoding="utf-8"?>
+<p:sld xmlns:a="http://schemas.openxmlformats.org/drawingml/2006/main" xmlns:r="http://schemas.openxmlformats.org/officeDocument/2006/relationships" xmlns:p="http://schemas.openxmlformats.org/presentationml/2006/main">
+  <p:cSld>
+    <p:spTree>
+      <p:nvGrpSpPr>
+        <p:cNvPr id="1" name=""/>
+        <p:cNvGrpSpPr/>
+        <p:nvPr/>
+      </p:nvGrpSpPr>
+      <p:grpSpPr>
+        <a:xfrm>
+          <a:off x="0" y="0"/>
+          <a:ext cx="0" cy="0"/>
+          <a:chOff x="0" y="0"/>
+          <a:chExt cx="0" cy="0"/>
+        </a:xfrm>
+      </p:grpSpPr>
+      <p:sp>
+        <p:nvSpPr>
+          <p:cNvPr id="2" name="Title 1">
+            <a:extLst>
+              <a:ext uri="{FF2B5EF4-FFF2-40B4-BE49-F238E27FC236}">
+                <a16:creationId xmlns:a16="http://schemas.microsoft.com/office/drawing/2014/main" id="{DB2A7252-6823-44F9-B464-D7A15D12BB65}"/>
+              </a:ext>
+            </a:extLst>
+          </p:cNvPr>
+          <p:cNvSpPr>
+            <a:spLocks noGrp="1"/>
+          </p:cNvSpPr>
+          <p:nvPr>
+            <p:ph type="title"/>
+          </p:nvPr>
+        </p:nvSpPr>
+        <p:spPr/>
+        <p:txBody>
+          <a:bodyPr/>
+          <a:lstStyle/>
+          <a:p>
+            <a:r>
+              <a:rPr lang="en-US" dirty="0"/>
+              <a:t>Prepare, cont.</a:t>
+            </a:r>
+          </a:p>
+        </p:txBody>
+      </p:sp>
+      <p:sp>
+        <p:nvSpPr>
+          <p:cNvPr id="5" name="TextBox 4">
+            <a:extLst>
+              <a:ext uri="{FF2B5EF4-FFF2-40B4-BE49-F238E27FC236}">
+                <a16:creationId xmlns:a16="http://schemas.microsoft.com/office/drawing/2014/main" id="{D288555E-1FC8-BD23-E0B7-492F0E75C777}"/>
+              </a:ext>
+            </a:extLst>
+          </p:cNvPr>
+          <p:cNvSpPr txBox="1"/>
+          <p:nvPr/>
+        </p:nvSpPr>
+        <p:spPr>
+          <a:xfrm>
+            <a:off x="9035144" y="217714"/>
+            <a:ext cx="2743200" cy="338554"/>
+          </a:xfrm>
+          <a:prstGeom prst="rect">
+            <a:avLst/>
+          </a:prstGeom>
+          <a:noFill/>
+        </p:spPr>
+        <p:txBody>
+          <a:bodyPr wrap="square" rtlCol="0">
+            <a:spAutoFit/>
+          </a:bodyPr>
+          <a:lstStyle/>
+          <a:p>
+            <a:r>
+              <a:rPr lang="en-US" sz="1600" dirty="0">
+                <a:solidFill>
+                  <a:schemeClr val="bg1">
+                    <a:lumMod val="50000"/>
+                  </a:schemeClr>
+                </a:solidFill>
+              </a:rPr>
+              <a:t>The Data Science Process (2/5)</a:t>
+            </a:r>
+          </a:p>
+        </p:txBody>
+      </p:sp>
+      <p:pic>
+        <p:nvPicPr>
+          <p:cNvPr id="4" name="Picture 3">
+            <a:extLst>
+              <a:ext uri="{FF2B5EF4-FFF2-40B4-BE49-F238E27FC236}">
+                <a16:creationId xmlns:a16="http://schemas.microsoft.com/office/drawing/2014/main" id="{D0091024-6EEB-D52E-68DB-1925B985C77F}"/>
+              </a:ext>
+            </a:extLst>
+          </p:cNvPr>
+          <p:cNvPicPr>
+            <a:picLocks noChangeAspect="1"/>
+          </p:cNvPicPr>
+          <p:nvPr/>
+        </p:nvPicPr>
+        <p:blipFill>
+          <a:blip r:embed="rId2">
+            <a:extLst>
+              <a:ext uri="{28A0092B-C50C-407E-A947-70E740481C1C}">
+                <a14:useLocalDpi xmlns:a14="http://schemas.microsoft.com/office/drawing/2010/main" val="0"/>
+              </a:ext>
+            </a:extLst>
+          </a:blip>
+          <a:stretch>
+            <a:fillRect/>
+          </a:stretch>
+        </p:blipFill>
+        <p:spPr>
+          <a:xfrm>
+            <a:off x="3395966" y="1838099"/>
+            <a:ext cx="3857589" cy="3204498"/>
+          </a:xfrm>
+          <a:prstGeom prst="rect">
+            <a:avLst/>
+          </a:prstGeom>
+        </p:spPr>
+      </p:pic>
+    </p:spTree>
+    <p:extLst>
+      <p:ext uri="{BB962C8B-B14F-4D97-AF65-F5344CB8AC3E}">
+        <p14:creationId xmlns:p14="http://schemas.microsoft.com/office/powerpoint/2010/main" val="3025925970"/>
+      </p:ext>
+    </p:extLst>
+  </p:cSld>
+  <p:clrMapOvr>
+    <a:masterClrMapping/>
+  </p:clrMapOvr>
+</p:sld>
+</file>
+
+<file path=ppt/slides/slide15.xml><?xml version="1.0" encoding="utf-8"?>
+<p:sld xmlns:a="http://schemas.openxmlformats.org/drawingml/2006/main" xmlns:r="http://schemas.openxmlformats.org/officeDocument/2006/relationships" xmlns:p="http://schemas.openxmlformats.org/presentationml/2006/main">
+  <p:cSld>
+    <p:spTree>
+      <p:nvGrpSpPr>
+        <p:cNvPr id="1" name=""/>
+        <p:cNvGrpSpPr/>
+        <p:nvPr/>
+      </p:nvGrpSpPr>
+      <p:grpSpPr>
+        <a:xfrm>
+          <a:off x="0" y="0"/>
+          <a:ext cx="0" cy="0"/>
+          <a:chOff x="0" y="0"/>
+          <a:chExt cx="0" cy="0"/>
+        </a:xfrm>
+      </p:grpSpPr>
+      <p:sp>
+        <p:nvSpPr>
+          <p:cNvPr id="2" name="Title 1">
+            <a:extLst>
+              <a:ext uri="{FF2B5EF4-FFF2-40B4-BE49-F238E27FC236}">
+                <a16:creationId xmlns:a16="http://schemas.microsoft.com/office/drawing/2014/main" id="{DB2A7252-6823-44F9-B464-D7A15D12BB65}"/>
+              </a:ext>
+            </a:extLst>
+          </p:cNvPr>
+          <p:cNvSpPr>
+            <a:spLocks noGrp="1"/>
+          </p:cNvSpPr>
+          <p:nvPr>
+            <p:ph type="title"/>
+          </p:nvPr>
+        </p:nvSpPr>
+        <p:spPr/>
+        <p:txBody>
+          <a:bodyPr/>
+          <a:lstStyle/>
+          <a:p>
+            <a:r>
+              <a:rPr lang="en-US" dirty="0"/>
+              <a:t>Analyze data</a:t>
+            </a:r>
+          </a:p>
+        </p:txBody>
+      </p:sp>
+      <p:sp>
+        <p:nvSpPr>
+          <p:cNvPr id="3" name="Content Placeholder 2">
+            <a:extLst>
+              <a:ext uri="{FF2B5EF4-FFF2-40B4-BE49-F238E27FC236}">
+                <a16:creationId xmlns:a16="http://schemas.microsoft.com/office/drawing/2014/main" id="{7FEAE391-6366-4E20-A14E-0ECFAEA8029A}"/>
+              </a:ext>
+            </a:extLst>
+          </p:cNvPr>
+          <p:cNvSpPr>
+            <a:spLocks noGrp="1"/>
+          </p:cNvSpPr>
+          <p:nvPr>
+            <p:ph idx="1"/>
+          </p:nvPr>
+        </p:nvSpPr>
+        <p:spPr/>
+        <p:txBody>
+          <a:bodyPr/>
+          <a:lstStyle/>
+          <a:p>
+            <a:r>
+              <a:rPr lang="en-US" sz="1800" dirty="0">
+                <a:solidFill>
+                  <a:srgbClr val="000000"/>
+                </a:solidFill>
+                <a:effectLst/>
+                <a:latin typeface="Times New Roman" panose="02020603050405020304" pitchFamily="18" charset="0"/>
+                <a:ea typeface="Times New Roman" panose="02020603050405020304" pitchFamily="18" charset="0"/>
+              </a:rPr>
+              <a:t>&lt;select analytical technique, build models&gt;</a:t>
+            </a:r>
+          </a:p>
+          <a:p>
+            <a:endParaRPr lang="en-US" dirty="0"/>
+          </a:p>
+        </p:txBody>
+      </p:sp>
+      <p:sp>
+        <p:nvSpPr>
+          <p:cNvPr id="5" name="TextBox 4">
+            <a:extLst>
+              <a:ext uri="{FF2B5EF4-FFF2-40B4-BE49-F238E27FC236}">
+                <a16:creationId xmlns:a16="http://schemas.microsoft.com/office/drawing/2014/main" id="{3475667D-8683-F088-9369-EC60A0415E3F}"/>
+              </a:ext>
+            </a:extLst>
+          </p:cNvPr>
+          <p:cNvSpPr txBox="1"/>
+          <p:nvPr/>
+        </p:nvSpPr>
+        <p:spPr>
+          <a:xfrm>
+            <a:off x="9035144" y="217714"/>
+            <a:ext cx="2743200" cy="338554"/>
+          </a:xfrm>
+          <a:prstGeom prst="rect">
+            <a:avLst/>
+          </a:prstGeom>
+          <a:noFill/>
+        </p:spPr>
+        <p:txBody>
+          <a:bodyPr wrap="square" rtlCol="0">
+            <a:spAutoFit/>
+          </a:bodyPr>
+          <a:lstStyle/>
+          <a:p>
+            <a:r>
+              <a:rPr lang="en-US" sz="1600" dirty="0">
+                <a:solidFill>
+                  <a:schemeClr val="bg1">
+                    <a:lumMod val="50000"/>
+                  </a:schemeClr>
+                </a:solidFill>
+              </a:rPr>
+              <a:t>The Data Science Process (3/5)</a:t>
+            </a:r>
+          </a:p>
+        </p:txBody>
+      </p:sp>
+    </p:spTree>
+    <p:extLst>
+      <p:ext uri="{BB962C8B-B14F-4D97-AF65-F5344CB8AC3E}">
+        <p14:creationId xmlns:p14="http://schemas.microsoft.com/office/powerpoint/2010/main" val="69798042"/>
+      </p:ext>
+    </p:extLst>
+  </p:cSld>
+  <p:clrMapOvr>
+    <a:masterClrMapping/>
+  </p:clrMapOvr>
+</p:sld>
+</file>
+
+<file path=ppt/slides/slide16.xml><?xml version="1.0" encoding="utf-8"?>
+<p:sld xmlns:a="http://schemas.openxmlformats.org/drawingml/2006/main" xmlns:r="http://schemas.openxmlformats.org/officeDocument/2006/relationships" xmlns:p="http://schemas.openxmlformats.org/presentationml/2006/main">
+  <p:cSld>
+    <p:spTree>
+      <p:nvGrpSpPr>
+        <p:cNvPr id="1" name=""/>
+        <p:cNvGrpSpPr/>
+        <p:nvPr/>
+      </p:nvGrpSpPr>
+      <p:grpSpPr>
+        <a:xfrm>
+          <a:off x="0" y="0"/>
+          <a:ext cx="0" cy="0"/>
+          <a:chOff x="0" y="0"/>
+          <a:chExt cx="0" cy="0"/>
+        </a:xfrm>
+      </p:grpSpPr>
+      <p:sp>
+        <p:nvSpPr>
+          <p:cNvPr id="2" name="Title 1">
+            <a:extLst>
+              <a:ext uri="{FF2B5EF4-FFF2-40B4-BE49-F238E27FC236}">
+                <a16:creationId xmlns:a16="http://schemas.microsoft.com/office/drawing/2014/main" id="{DB2A7252-6823-44F9-B464-D7A15D12BB65}"/>
+              </a:ext>
+            </a:extLst>
+          </p:cNvPr>
+          <p:cNvSpPr>
+            <a:spLocks noGrp="1"/>
+          </p:cNvSpPr>
+          <p:nvPr>
+            <p:ph type="title"/>
+          </p:nvPr>
+        </p:nvSpPr>
+        <p:spPr/>
+        <p:txBody>
+          <a:bodyPr/>
+          <a:lstStyle/>
+          <a:p>
+            <a:r>
+              <a:rPr lang="en-US" dirty="0"/>
               <a:t>Report</a:t>
             </a:r>
           </a:p>
@@ -3735,7 +4653,7 @@
 </p:sld>
 </file>
 
-<file path=ppt/slides/slide12.xml><?xml version="1.0" encoding="utf-8"?>
+<file path=ppt/slides/slide17.xml><?xml version="1.0" encoding="utf-8"?>
 <p:sld xmlns:a="http://schemas.openxmlformats.org/drawingml/2006/main" xmlns:r="http://schemas.openxmlformats.org/officeDocument/2006/relationships" xmlns:p="http://schemas.openxmlformats.org/presentationml/2006/main">
   <p:cSld>
     <p:spTree>
@@ -4081,7 +4999,7 @@
             <p:spPr/>
             <p:txBody>
               <a:bodyPr>
-                <a:normAutofit fontScale="77500" lnSpcReduction="20000"/>
+                <a:normAutofit fontScale="62500" lnSpcReduction="20000"/>
               </a:bodyPr>
               <a:lstStyle/>
               <a:p>
@@ -4097,7 +5015,7 @@
                       <m:sSub>
                         <m:sSubPr>
                           <m:ctrlPr>
-                            <a:rPr lang="en-US" sz="1800" i="1" smtClean="0">
+                            <a:rPr lang="en-US" sz="2100" b="1" i="1" smtClean="0">
                               <a:solidFill>
                                 <a:srgbClr val="000000"/>
                               </a:solidFill>
@@ -4107,29 +5025,29 @@
                         </m:sSubPr>
                         <m:e>
                           <m:r>
-                            <a:rPr lang="en-US" sz="1800" b="0" i="1" smtClean="0">
+                            <a:rPr lang="en-US" sz="2100" b="1" i="1" smtClean="0">
                               <a:solidFill>
                                 <a:srgbClr val="000000"/>
                               </a:solidFill>
                               <a:latin typeface="Cambria Math" panose="02040503050406030204" pitchFamily="18" charset="0"/>
                             </a:rPr>
-                            <m:t>𝐻</m:t>
+                            <m:t>𝑯</m:t>
                           </m:r>
                         </m:e>
                         <m:sub>
                           <m:r>
-                            <a:rPr lang="en-US" sz="1800" b="0" i="1" smtClean="0">
+                            <a:rPr lang="en-US" sz="2100" b="1" i="1" smtClean="0">
                               <a:solidFill>
                                 <a:srgbClr val="000000"/>
                               </a:solidFill>
                               <a:latin typeface="Cambria Math" panose="02040503050406030204" pitchFamily="18" charset="0"/>
                             </a:rPr>
-                            <m:t>0</m:t>
+                            <m:t>𝟎</m:t>
                           </m:r>
                         </m:sub>
                       </m:sSub>
                       <m:r>
-                        <a:rPr lang="en-US" sz="1800" b="0" i="1" smtClean="0">
+                        <a:rPr lang="en-US" sz="2100" b="1" i="1" smtClean="0">
                           <a:solidFill>
                             <a:srgbClr val="000000"/>
                           </a:solidFill>
@@ -4138,16 +5056,16 @@
                         <m:t>:</m:t>
                       </m:r>
                       <m:r>
-                        <a:rPr lang="en-US" sz="1800" b="0" i="1" smtClean="0">
+                        <a:rPr lang="en-US" sz="2100" b="1" i="1" smtClean="0">
                           <a:solidFill>
                             <a:srgbClr val="000000"/>
                           </a:solidFill>
                           <a:latin typeface="Cambria Math" panose="02040503050406030204" pitchFamily="18" charset="0"/>
                         </a:rPr>
-                        <m:t>𝑇h𝑒𝑟𝑒</m:t>
+                        <m:t>𝑻𝒉𝒆𝒓𝒆</m:t>
                       </m:r>
                       <m:r>
-                        <a:rPr lang="en-US" sz="1800" b="0" i="1" smtClean="0">
+                        <a:rPr lang="en-US" sz="2100" b="1" i="1" smtClean="0">
                           <a:solidFill>
                             <a:srgbClr val="000000"/>
                           </a:solidFill>
@@ -4156,16 +5074,16 @@
                         <m:t> </m:t>
                       </m:r>
                       <m:r>
-                        <a:rPr lang="en-US" sz="1800" b="0" i="1" smtClean="0">
+                        <a:rPr lang="en-US" sz="2100" b="1" i="1" smtClean="0">
                           <a:solidFill>
                             <a:srgbClr val="000000"/>
                           </a:solidFill>
                           <a:latin typeface="Cambria Math" panose="02040503050406030204" pitchFamily="18" charset="0"/>
                         </a:rPr>
-                        <m:t>𝑖𝑠</m:t>
+                        <m:t>𝒊𝒔</m:t>
                       </m:r>
                       <m:r>
-                        <a:rPr lang="en-US" sz="1800" b="0" i="1" smtClean="0">
+                        <a:rPr lang="en-US" sz="2100" b="1" i="1" smtClean="0">
                           <a:solidFill>
                             <a:srgbClr val="000000"/>
                           </a:solidFill>
@@ -4174,16 +5092,16 @@
                         <m:t> </m:t>
                       </m:r>
                       <m:r>
-                        <a:rPr lang="en-US" sz="1800" b="0" i="1" smtClean="0">
+                        <a:rPr lang="en-US" sz="2100" b="1" i="1" smtClean="0">
                           <a:solidFill>
                             <a:srgbClr val="000000"/>
                           </a:solidFill>
                           <a:latin typeface="Cambria Math" panose="02040503050406030204" pitchFamily="18" charset="0"/>
                         </a:rPr>
-                        <m:t>𝑛𝑜</m:t>
+                        <m:t>𝒏𝒐</m:t>
                       </m:r>
                       <m:r>
-                        <a:rPr lang="en-US" sz="1800" b="0" i="1" smtClean="0">
+                        <a:rPr lang="en-US" sz="2100" b="1" i="1" smtClean="0">
                           <a:solidFill>
                             <a:srgbClr val="000000"/>
                           </a:solidFill>
@@ -4192,16 +5110,16 @@
                         <m:t> </m:t>
                       </m:r>
                       <m:r>
-                        <a:rPr lang="en-US" sz="1800" b="0" i="1" smtClean="0">
+                        <a:rPr lang="en-US" sz="2100" b="1" i="1" smtClean="0">
                           <a:solidFill>
                             <a:srgbClr val="000000"/>
                           </a:solidFill>
                           <a:latin typeface="Cambria Math" panose="02040503050406030204" pitchFamily="18" charset="0"/>
                         </a:rPr>
-                        <m:t>𝑠𝑡𝑎𝑡𝑖𝑡𝑖𝑐𝑎𝑙</m:t>
+                        <m:t>𝒔𝒕𝒂𝒕𝒊𝒕𝒊𝒄𝒂𝒍</m:t>
                       </m:r>
                       <m:r>
-                        <a:rPr lang="en-US" sz="1800" b="0" i="1" smtClean="0">
+                        <a:rPr lang="en-US" sz="2100" b="1" i="1" smtClean="0">
                           <a:solidFill>
                             <a:srgbClr val="000000"/>
                           </a:solidFill>
@@ -4210,16 +5128,16 @@
                         <m:t> </m:t>
                       </m:r>
                       <m:r>
-                        <a:rPr lang="en-US" sz="1800" b="0" i="1" smtClean="0">
+                        <a:rPr lang="en-US" sz="2100" b="1" i="1" smtClean="0">
                           <a:solidFill>
                             <a:srgbClr val="000000"/>
                           </a:solidFill>
                           <a:latin typeface="Cambria Math" panose="02040503050406030204" pitchFamily="18" charset="0"/>
                         </a:rPr>
-                        <m:t>𝑑𝑖𝑓𝑓𝑒𝑟𝑒𝑛𝑐𝑒</m:t>
+                        <m:t>𝒅𝒊𝒇𝒇𝒆𝒓𝒆𝒏𝒄𝒆</m:t>
                       </m:r>
                       <m:r>
-                        <a:rPr lang="en-US" sz="1800" b="0" i="1" smtClean="0">
+                        <a:rPr lang="en-US" sz="2100" b="1" i="1" smtClean="0">
                           <a:solidFill>
                             <a:srgbClr val="000000"/>
                           </a:solidFill>
@@ -4228,16 +5146,16 @@
                         <m:t> </m:t>
                       </m:r>
                       <m:r>
-                        <a:rPr lang="en-US" sz="1800" b="0" i="1" smtClean="0">
+                        <a:rPr lang="en-US" sz="2100" b="1" i="1" smtClean="0">
                           <a:solidFill>
                             <a:srgbClr val="000000"/>
                           </a:solidFill>
                           <a:latin typeface="Cambria Math" panose="02040503050406030204" pitchFamily="18" charset="0"/>
                         </a:rPr>
-                        <m:t>𝑏𝑒𝑡𝑤𝑒𝑒𝑛</m:t>
+                        <m:t>𝒃𝒆𝒕𝒘𝒆𝒆𝒏</m:t>
                       </m:r>
                       <m:r>
-                        <a:rPr lang="en-US" sz="1800" b="0" i="1" smtClean="0">
+                        <a:rPr lang="en-US" sz="2100" b="1" i="1" smtClean="0">
                           <a:solidFill>
                             <a:srgbClr val="000000"/>
                           </a:solidFill>
@@ -4246,16 +5164,16 @@
                         <m:t> </m:t>
                       </m:r>
                       <m:r>
-                        <a:rPr lang="en-US" sz="1800" b="0" i="1" smtClean="0">
+                        <a:rPr lang="en-US" sz="2100" b="1" i="1" smtClean="0">
                           <a:solidFill>
                             <a:srgbClr val="000000"/>
                           </a:solidFill>
                           <a:latin typeface="Cambria Math" panose="02040503050406030204" pitchFamily="18" charset="0"/>
                         </a:rPr>
-                        <m:t>h𝑒𝑎𝑟𝑡</m:t>
+                        <m:t>𝒉𝒆𝒂𝒓𝒕</m:t>
                       </m:r>
                       <m:r>
-                        <a:rPr lang="en-US" sz="1800" b="0" i="1" smtClean="0">
+                        <a:rPr lang="en-US" sz="2100" b="1" i="1" smtClean="0">
                           <a:solidFill>
                             <a:srgbClr val="000000"/>
                           </a:solidFill>
@@ -4264,16 +5182,16 @@
                         <m:t> </m:t>
                       </m:r>
                       <m:r>
-                        <a:rPr lang="en-US" sz="1800" b="0" i="1" smtClean="0">
+                        <a:rPr lang="en-US" sz="2100" b="1" i="1" smtClean="0">
                           <a:solidFill>
                             <a:srgbClr val="000000"/>
                           </a:solidFill>
                           <a:latin typeface="Cambria Math" panose="02040503050406030204" pitchFamily="18" charset="0"/>
                         </a:rPr>
-                        <m:t>𝑓𝑎𝑖𝑙𝑢𝑟𝑒</m:t>
+                        <m:t>𝒇𝒂𝒊𝒍𝒖𝒓𝒆</m:t>
                       </m:r>
                       <m:r>
-                        <a:rPr lang="en-US" sz="1800" b="0" i="1" smtClean="0">
+                        <a:rPr lang="en-US" sz="2100" b="1" i="1" smtClean="0">
                           <a:solidFill>
                             <a:srgbClr val="000000"/>
                           </a:solidFill>
@@ -4282,16 +5200,16 @@
                         <m:t> </m:t>
                       </m:r>
                       <m:r>
-                        <a:rPr lang="en-US" sz="1800" b="0" i="1" smtClean="0">
+                        <a:rPr lang="en-US" sz="2100" b="1" i="1" smtClean="0">
                           <a:solidFill>
                             <a:srgbClr val="000000"/>
                           </a:solidFill>
                           <a:latin typeface="Cambria Math" panose="02040503050406030204" pitchFamily="18" charset="0"/>
                         </a:rPr>
-                        <m:t>𝑚𝑜𝑟𝑡𝑎𝑙𝑖𝑡𝑦</m:t>
+                        <m:t>𝒎𝒐𝒓𝒕𝒂𝒍𝒊𝒕𝒚</m:t>
                       </m:r>
                       <m:r>
-                        <a:rPr lang="en-US" sz="1800" b="0" i="1" smtClean="0">
+                        <a:rPr lang="en-US" sz="2100" b="1" i="1" smtClean="0">
                           <a:solidFill>
                             <a:srgbClr val="000000"/>
                           </a:solidFill>
@@ -4300,16 +5218,16 @@
                         <m:t> </m:t>
                       </m:r>
                       <m:r>
-                        <a:rPr lang="en-US" sz="1800" b="0" i="1" smtClean="0">
+                        <a:rPr lang="en-US" sz="2100" b="1" i="1" smtClean="0">
                           <a:solidFill>
                             <a:srgbClr val="000000"/>
                           </a:solidFill>
                           <a:latin typeface="Cambria Math" panose="02040503050406030204" pitchFamily="18" charset="0"/>
                         </a:rPr>
-                        <m:t>𝑎𝑛𝑑</m:t>
+                        <m:t>𝒂𝒏𝒅</m:t>
                       </m:r>
                       <m:r>
-                        <a:rPr lang="en-US" sz="1800" b="0" i="1" smtClean="0">
+                        <a:rPr lang="en-US" sz="2100" b="1" i="1" smtClean="0">
                           <a:solidFill>
                             <a:srgbClr val="000000"/>
                           </a:solidFill>
@@ -4318,16 +5236,16 @@
                         <m:t> </m:t>
                       </m:r>
                       <m:r>
-                        <a:rPr lang="en-US" sz="1800" b="0" i="1" smtClean="0">
+                        <a:rPr lang="en-US" sz="2100" b="1" i="1" smtClean="0">
                           <a:solidFill>
                             <a:srgbClr val="000000"/>
                           </a:solidFill>
                           <a:latin typeface="Cambria Math" panose="02040503050406030204" pitchFamily="18" charset="0"/>
                         </a:rPr>
-                        <m:t>𝑑𝑖𝑎𝑏𝑒𝑡𝑒𝑠</m:t>
+                        <m:t>𝒅𝒊𝒂𝒃𝒆𝒕𝒆𝒔</m:t>
                       </m:r>
                       <m:r>
-                        <a:rPr lang="en-US" sz="1800" b="0" i="1" smtClean="0">
+                        <a:rPr lang="en-US" sz="2100" b="1" i="1" smtClean="0">
                           <a:solidFill>
                             <a:srgbClr val="000000"/>
                           </a:solidFill>
@@ -4336,16 +5254,16 @@
                         <m:t> </m:t>
                       </m:r>
                       <m:r>
-                        <a:rPr lang="en-US" sz="1800" b="0" i="1" smtClean="0">
+                        <a:rPr lang="en-US" sz="2100" b="1" i="1" smtClean="0">
                           <a:solidFill>
                             <a:srgbClr val="000000"/>
                           </a:solidFill>
                           <a:latin typeface="Cambria Math" panose="02040503050406030204" pitchFamily="18" charset="0"/>
                         </a:rPr>
-                        <m:t>𝑎𝑙𝑜𝑛𝑔</m:t>
+                        <m:t>𝒂𝒍𝒐𝒏𝒈</m:t>
                       </m:r>
                       <m:r>
-                        <a:rPr lang="en-US" sz="1800" b="0" i="1" smtClean="0">
+                        <a:rPr lang="en-US" sz="2100" b="1" i="1" smtClean="0">
                           <a:solidFill>
                             <a:srgbClr val="000000"/>
                           </a:solidFill>
@@ -4354,16 +5272,16 @@
                         <m:t> </m:t>
                       </m:r>
                       <m:r>
-                        <a:rPr lang="en-US" sz="1800" b="0" i="1" smtClean="0">
+                        <a:rPr lang="en-US" sz="2100" b="1" i="1" smtClean="0">
                           <a:solidFill>
                             <a:srgbClr val="000000"/>
                           </a:solidFill>
                           <a:latin typeface="Cambria Math" panose="02040503050406030204" pitchFamily="18" charset="0"/>
                         </a:rPr>
-                        <m:t>𝑤𝑖𝑡h</m:t>
+                        <m:t>𝒘𝒊𝒕𝒉</m:t>
                       </m:r>
                       <m:r>
-                        <a:rPr lang="en-US" sz="1800" b="0" i="1" smtClean="0">
+                        <a:rPr lang="en-US" sz="2100" b="1" i="1" smtClean="0">
                           <a:solidFill>
                             <a:srgbClr val="000000"/>
                           </a:solidFill>
@@ -4372,16 +5290,16 @@
                         <m:t> </m:t>
                       </m:r>
                       <m:r>
-                        <a:rPr lang="en-US" sz="1800" b="0" i="1" smtClean="0">
+                        <a:rPr lang="en-US" sz="2100" b="1" i="1" smtClean="0">
                           <a:solidFill>
                             <a:srgbClr val="000000"/>
                           </a:solidFill>
                           <a:latin typeface="Cambria Math" panose="02040503050406030204" pitchFamily="18" charset="0"/>
                         </a:rPr>
-                        <m:t>𝑜𝑡h𝑒𝑟</m:t>
+                        <m:t>𝒐𝒕𝒉𝒆𝒓</m:t>
                       </m:r>
                       <m:r>
-                        <a:rPr lang="en-US" sz="1800" b="0" i="1" smtClean="0">
+                        <a:rPr lang="en-US" sz="2100" b="1" i="1" smtClean="0">
                           <a:solidFill>
                             <a:srgbClr val="000000"/>
                           </a:solidFill>
@@ -4390,16 +5308,16 @@
                         <m:t> </m:t>
                       </m:r>
                       <m:r>
-                        <a:rPr lang="en-US" sz="1800" b="0" i="1" smtClean="0">
+                        <a:rPr lang="en-US" sz="2100" b="1" i="1" smtClean="0">
                           <a:solidFill>
                             <a:srgbClr val="000000"/>
                           </a:solidFill>
                           <a:latin typeface="Cambria Math" panose="02040503050406030204" pitchFamily="18" charset="0"/>
                         </a:rPr>
-                        <m:t>𝑚𝑒𝑑𝑖𝑐𝑎𝑙</m:t>
+                        <m:t>𝒎𝒆𝒅𝒊𝒄𝒂𝒍</m:t>
                       </m:r>
                       <m:r>
-                        <a:rPr lang="en-US" sz="1800" b="0" i="1" smtClean="0">
+                        <a:rPr lang="en-US" sz="2100" b="1" i="1" smtClean="0">
                           <a:solidFill>
                             <a:srgbClr val="000000"/>
                           </a:solidFill>
@@ -4408,16 +5326,16 @@
                         <m:t> </m:t>
                       </m:r>
                       <m:r>
-                        <a:rPr lang="en-US" sz="1800" b="0" i="1" smtClean="0">
+                        <a:rPr lang="en-US" sz="2100" b="1" i="1" smtClean="0">
                           <a:solidFill>
                             <a:srgbClr val="000000"/>
                           </a:solidFill>
                           <a:latin typeface="Cambria Math" panose="02040503050406030204" pitchFamily="18" charset="0"/>
                         </a:rPr>
-                        <m:t>𝑓𝑎𝑐𝑡𝑜𝑟𝑠</m:t>
+                        <m:t>𝒇𝒂𝒄𝒕𝒐𝒓𝒔</m:t>
                       </m:r>
                       <m:r>
-                        <a:rPr lang="en-US" sz="1800" b="0" i="1" smtClean="0">
+                        <a:rPr lang="en-US" sz="2100" b="1" i="1" smtClean="0">
                           <a:solidFill>
                             <a:srgbClr val="000000"/>
                           </a:solidFill>
@@ -4428,7 +5346,7 @@
                     </m:oMath>
                   </m:oMathPara>
                 </a14:m>
-                <a:endParaRPr lang="en-US" sz="1800" b="0" dirty="0">
+                <a:endParaRPr lang="en-US" sz="2100" b="1" dirty="0">
                   <a:solidFill>
                     <a:srgbClr val="000000"/>
                   </a:solidFill>
@@ -4439,7 +5357,7 @@
                 <a:pPr marL="0" indent="0">
                   <a:buNone/>
                 </a:pPr>
-                <a:endParaRPr lang="en-US" sz="1800" i="1" dirty="0">
+                <a:endParaRPr lang="en-US" sz="2100" b="1" i="1" dirty="0">
                   <a:solidFill>
                     <a:srgbClr val="000000"/>
                   </a:solidFill>
@@ -4459,7 +5377,7 @@
                       <m:sSub>
                         <m:sSubPr>
                           <m:ctrlPr>
-                            <a:rPr lang="en-US" sz="1800" i="1" smtClean="0">
+                            <a:rPr lang="en-US" sz="2100" b="1" i="1" smtClean="0">
                               <a:solidFill>
                                 <a:srgbClr val="000000"/>
                               </a:solidFill>
@@ -4469,29 +5387,29 @@
                         </m:sSubPr>
                         <m:e>
                           <m:r>
-                            <a:rPr lang="en-US" sz="1800" b="0" i="1" smtClean="0">
+                            <a:rPr lang="en-US" sz="2100" b="1" i="1" smtClean="0">
                               <a:solidFill>
                                 <a:srgbClr val="000000"/>
                               </a:solidFill>
                               <a:latin typeface="Cambria Math" panose="02040503050406030204" pitchFamily="18" charset="0"/>
                             </a:rPr>
-                            <m:t>𝐻</m:t>
+                            <m:t>𝑯</m:t>
                           </m:r>
                         </m:e>
                         <m:sub>
                           <m:r>
-                            <a:rPr lang="en-US" sz="1800" b="0" i="1" smtClean="0">
+                            <a:rPr lang="en-US" sz="2100" b="1" i="1" smtClean="0">
                               <a:solidFill>
                                 <a:srgbClr val="000000"/>
                               </a:solidFill>
                               <a:latin typeface="Cambria Math" panose="02040503050406030204" pitchFamily="18" charset="0"/>
                             </a:rPr>
-                            <m:t>𝐴</m:t>
+                            <m:t>𝑨</m:t>
                           </m:r>
                         </m:sub>
                       </m:sSub>
                       <m:r>
-                        <a:rPr lang="en-US" sz="1800" b="0" i="1" smtClean="0">
+                        <a:rPr lang="en-US" sz="2100" b="1" i="1" smtClean="0">
                           <a:solidFill>
                             <a:srgbClr val="000000"/>
                           </a:solidFill>
@@ -4500,16 +5418,16 @@
                         <m:t>:</m:t>
                       </m:r>
                       <m:r>
-                        <a:rPr lang="en-US" sz="1800" i="1">
+                        <a:rPr lang="en-US" sz="2100" b="1" i="1">
                           <a:solidFill>
                             <a:srgbClr val="000000"/>
                           </a:solidFill>
                           <a:latin typeface="Cambria Math" panose="02040503050406030204" pitchFamily="18" charset="0"/>
                         </a:rPr>
-                        <m:t>𝑇h𝑒𝑟𝑒</m:t>
+                        <m:t>𝑻𝒉𝒆𝒓𝒆</m:t>
                       </m:r>
                       <m:r>
-                        <a:rPr lang="en-US" sz="1800" i="1">
+                        <a:rPr lang="en-US" sz="2100" b="1" i="1">
                           <a:solidFill>
                             <a:srgbClr val="000000"/>
                           </a:solidFill>
@@ -4518,16 +5436,16 @@
                         <m:t> </m:t>
                       </m:r>
                       <m:r>
-                        <a:rPr lang="en-US" sz="1800" i="1">
+                        <a:rPr lang="en-US" sz="2100" b="1" i="1">
                           <a:solidFill>
                             <a:srgbClr val="000000"/>
                           </a:solidFill>
                           <a:latin typeface="Cambria Math" panose="02040503050406030204" pitchFamily="18" charset="0"/>
                         </a:rPr>
-                        <m:t>𝑖𝑠</m:t>
+                        <m:t>𝒊𝒔</m:t>
                       </m:r>
                       <m:r>
-                        <a:rPr lang="en-US" sz="1800" b="0" i="1" smtClean="0">
+                        <a:rPr lang="en-US" sz="2100" b="1" i="1" smtClean="0">
                           <a:solidFill>
                             <a:srgbClr val="000000"/>
                           </a:solidFill>
@@ -4536,16 +5454,16 @@
                         <m:t> </m:t>
                       </m:r>
                       <m:r>
-                        <a:rPr lang="en-US" sz="1800" b="0" i="1" smtClean="0">
+                        <a:rPr lang="en-US" sz="2100" b="1" i="1" smtClean="0">
                           <a:solidFill>
                             <a:srgbClr val="000000"/>
                           </a:solidFill>
                           <a:latin typeface="Cambria Math" panose="02040503050406030204" pitchFamily="18" charset="0"/>
                         </a:rPr>
-                        <m:t>𝑎</m:t>
+                        <m:t>𝒂</m:t>
                       </m:r>
                       <m:r>
-                        <a:rPr lang="en-US" sz="1800" b="0" i="1" smtClean="0">
+                        <a:rPr lang="en-US" sz="2100" b="1" i="1" smtClean="0">
                           <a:solidFill>
                             <a:srgbClr val="000000"/>
                           </a:solidFill>
@@ -4554,16 +5472,16 @@
                         <m:t> </m:t>
                       </m:r>
                       <m:r>
-                        <a:rPr lang="en-US" sz="1800" i="1">
+                        <a:rPr lang="en-US" sz="2100" b="1" i="1">
                           <a:solidFill>
                             <a:srgbClr val="000000"/>
                           </a:solidFill>
                           <a:latin typeface="Cambria Math" panose="02040503050406030204" pitchFamily="18" charset="0"/>
                         </a:rPr>
-                        <m:t>𝑠𝑡𝑎𝑡𝑖𝑡𝑖𝑐𝑎𝑙</m:t>
+                        <m:t>𝒔𝒕𝒂𝒕𝒊𝒕𝒊𝒄𝒂𝒍</m:t>
                       </m:r>
                       <m:r>
-                        <a:rPr lang="en-US" sz="1800" i="1">
+                        <a:rPr lang="en-US" sz="2100" b="1" i="1">
                           <a:solidFill>
                             <a:srgbClr val="000000"/>
                           </a:solidFill>
@@ -4572,16 +5490,16 @@
                         <m:t> </m:t>
                       </m:r>
                       <m:r>
-                        <a:rPr lang="en-US" sz="1800" i="1">
+                        <a:rPr lang="en-US" sz="2100" b="1" i="1">
                           <a:solidFill>
                             <a:srgbClr val="000000"/>
                           </a:solidFill>
                           <a:latin typeface="Cambria Math" panose="02040503050406030204" pitchFamily="18" charset="0"/>
                         </a:rPr>
-                        <m:t>𝑑𝑖𝑓𝑓𝑒𝑟𝑒𝑛𝑐𝑒</m:t>
+                        <m:t>𝒅𝒊𝒇𝒇𝒆𝒓𝒆𝒏𝒄𝒆</m:t>
                       </m:r>
                       <m:r>
-                        <a:rPr lang="en-US" sz="1800" i="1">
+                        <a:rPr lang="en-US" sz="2100" b="1" i="1">
                           <a:solidFill>
                             <a:srgbClr val="000000"/>
                           </a:solidFill>
@@ -4590,16 +5508,16 @@
                         <m:t> </m:t>
                       </m:r>
                       <m:r>
-                        <a:rPr lang="en-US" sz="1800" i="1">
+                        <a:rPr lang="en-US" sz="2100" b="1" i="1">
                           <a:solidFill>
                             <a:srgbClr val="000000"/>
                           </a:solidFill>
                           <a:latin typeface="Cambria Math" panose="02040503050406030204" pitchFamily="18" charset="0"/>
                         </a:rPr>
-                        <m:t>𝑏𝑒𝑡𝑤𝑒𝑒𝑛</m:t>
+                        <m:t>𝒃𝒆𝒕𝒘𝒆𝒆𝒏</m:t>
                       </m:r>
                       <m:r>
-                        <a:rPr lang="en-US" sz="1800" i="1">
+                        <a:rPr lang="en-US" sz="2100" b="1" i="1">
                           <a:solidFill>
                             <a:srgbClr val="000000"/>
                           </a:solidFill>
@@ -4608,16 +5526,16 @@
                         <m:t> </m:t>
                       </m:r>
                       <m:r>
-                        <a:rPr lang="en-US" sz="1800" i="1">
+                        <a:rPr lang="en-US" sz="2100" b="1" i="1">
                           <a:solidFill>
                             <a:srgbClr val="000000"/>
                           </a:solidFill>
                           <a:latin typeface="Cambria Math" panose="02040503050406030204" pitchFamily="18" charset="0"/>
                         </a:rPr>
-                        <m:t>h𝑒𝑎𝑟𝑡</m:t>
+                        <m:t>𝒉𝒆𝒂𝒓𝒕</m:t>
                       </m:r>
                       <m:r>
-                        <a:rPr lang="en-US" sz="1800" i="1">
+                        <a:rPr lang="en-US" sz="2100" b="1" i="1">
                           <a:solidFill>
                             <a:srgbClr val="000000"/>
                           </a:solidFill>
@@ -4626,16 +5544,16 @@
                         <m:t> </m:t>
                       </m:r>
                       <m:r>
-                        <a:rPr lang="en-US" sz="1800" i="1">
+                        <a:rPr lang="en-US" sz="2100" b="1" i="1">
                           <a:solidFill>
                             <a:srgbClr val="000000"/>
                           </a:solidFill>
                           <a:latin typeface="Cambria Math" panose="02040503050406030204" pitchFamily="18" charset="0"/>
                         </a:rPr>
-                        <m:t>𝑓𝑎𝑖𝑙𝑢𝑟𝑒</m:t>
+                        <m:t>𝒇𝒂𝒊𝒍𝒖𝒓𝒆</m:t>
                       </m:r>
                       <m:r>
-                        <a:rPr lang="en-US" sz="1800" i="1">
+                        <a:rPr lang="en-US" sz="2100" b="1" i="1">
                           <a:solidFill>
                             <a:srgbClr val="000000"/>
                           </a:solidFill>
@@ -4644,16 +5562,16 @@
                         <m:t> </m:t>
                       </m:r>
                       <m:r>
-                        <a:rPr lang="en-US" sz="1800" i="1">
+                        <a:rPr lang="en-US" sz="2100" b="1" i="1">
                           <a:solidFill>
                             <a:srgbClr val="000000"/>
                           </a:solidFill>
                           <a:latin typeface="Cambria Math" panose="02040503050406030204" pitchFamily="18" charset="0"/>
                         </a:rPr>
-                        <m:t>𝑚𝑜𝑟𝑡𝑎𝑙𝑖𝑡𝑦</m:t>
+                        <m:t>𝒎𝒐𝒓𝒕𝒂𝒍𝒊𝒕𝒚</m:t>
                       </m:r>
                       <m:r>
-                        <a:rPr lang="en-US" sz="1800" i="1">
+                        <a:rPr lang="en-US" sz="2100" b="1" i="1">
                           <a:solidFill>
                             <a:srgbClr val="000000"/>
                           </a:solidFill>
@@ -4662,16 +5580,16 @@
                         <m:t> </m:t>
                       </m:r>
                       <m:r>
-                        <a:rPr lang="en-US" sz="1800" i="1">
+                        <a:rPr lang="en-US" sz="2100" b="1" i="1">
                           <a:solidFill>
                             <a:srgbClr val="000000"/>
                           </a:solidFill>
                           <a:latin typeface="Cambria Math" panose="02040503050406030204" pitchFamily="18" charset="0"/>
                         </a:rPr>
-                        <m:t>𝑎𝑛𝑑</m:t>
+                        <m:t>𝒂𝒏𝒅</m:t>
                       </m:r>
                       <m:r>
-                        <a:rPr lang="en-US" sz="1800" i="1">
+                        <a:rPr lang="en-US" sz="2100" b="1" i="1">
                           <a:solidFill>
                             <a:srgbClr val="000000"/>
                           </a:solidFill>
@@ -4680,16 +5598,16 @@
                         <m:t> </m:t>
                       </m:r>
                       <m:r>
-                        <a:rPr lang="en-US" sz="1800" i="1">
+                        <a:rPr lang="en-US" sz="2100" b="1" i="1">
                           <a:solidFill>
                             <a:srgbClr val="000000"/>
                           </a:solidFill>
                           <a:latin typeface="Cambria Math" panose="02040503050406030204" pitchFamily="18" charset="0"/>
                         </a:rPr>
-                        <m:t>𝑑𝑖𝑎𝑏𝑒𝑡𝑒𝑠</m:t>
+                        <m:t>𝒅𝒊𝒂𝒃𝒆𝒕𝒆𝒔</m:t>
                       </m:r>
                       <m:r>
-                        <a:rPr lang="en-US" sz="1800" i="1">
+                        <a:rPr lang="en-US" sz="2100" b="1" i="1">
                           <a:solidFill>
                             <a:srgbClr val="000000"/>
                           </a:solidFill>
@@ -4698,16 +5616,16 @@
                         <m:t> </m:t>
                       </m:r>
                       <m:r>
-                        <a:rPr lang="en-US" sz="1800" i="1">
+                        <a:rPr lang="en-US" sz="2100" b="1" i="1">
                           <a:solidFill>
                             <a:srgbClr val="000000"/>
                           </a:solidFill>
                           <a:latin typeface="Cambria Math" panose="02040503050406030204" pitchFamily="18" charset="0"/>
                         </a:rPr>
-                        <m:t>𝑎𝑙𝑜𝑛𝑔</m:t>
+                        <m:t>𝒂𝒍𝒐𝒏𝒈</m:t>
                       </m:r>
                       <m:r>
-                        <a:rPr lang="en-US" sz="1800" i="1">
+                        <a:rPr lang="en-US" sz="2100" b="1" i="1">
                           <a:solidFill>
                             <a:srgbClr val="000000"/>
                           </a:solidFill>
@@ -4716,16 +5634,16 @@
                         <m:t> </m:t>
                       </m:r>
                       <m:r>
-                        <a:rPr lang="en-US" sz="1800" i="1">
+                        <a:rPr lang="en-US" sz="2100" b="1" i="1">
                           <a:solidFill>
                             <a:srgbClr val="000000"/>
                           </a:solidFill>
                           <a:latin typeface="Cambria Math" panose="02040503050406030204" pitchFamily="18" charset="0"/>
                         </a:rPr>
-                        <m:t>𝑤𝑖𝑡h</m:t>
+                        <m:t>𝒘𝒊𝒕𝒉</m:t>
                       </m:r>
                       <m:r>
-                        <a:rPr lang="en-US" sz="1800" i="1">
+                        <a:rPr lang="en-US" sz="2100" b="1" i="1">
                           <a:solidFill>
                             <a:srgbClr val="000000"/>
                           </a:solidFill>
@@ -4734,16 +5652,16 @@
                         <m:t> </m:t>
                       </m:r>
                       <m:r>
-                        <a:rPr lang="en-US" sz="1800" i="1">
+                        <a:rPr lang="en-US" sz="2100" b="1" i="1">
                           <a:solidFill>
                             <a:srgbClr val="000000"/>
                           </a:solidFill>
                           <a:latin typeface="Cambria Math" panose="02040503050406030204" pitchFamily="18" charset="0"/>
                         </a:rPr>
-                        <m:t>𝑜𝑡h𝑒𝑟</m:t>
+                        <m:t>𝒐𝒕𝒉𝒆𝒓</m:t>
                       </m:r>
                       <m:r>
-                        <a:rPr lang="en-US" sz="1800" i="1">
+                        <a:rPr lang="en-US" sz="2100" b="1" i="1">
                           <a:solidFill>
                             <a:srgbClr val="000000"/>
                           </a:solidFill>
@@ -4752,16 +5670,16 @@
                         <m:t> </m:t>
                       </m:r>
                       <m:r>
-                        <a:rPr lang="en-US" sz="1800" i="1">
+                        <a:rPr lang="en-US" sz="2100" b="1" i="1">
                           <a:solidFill>
                             <a:srgbClr val="000000"/>
                           </a:solidFill>
                           <a:latin typeface="Cambria Math" panose="02040503050406030204" pitchFamily="18" charset="0"/>
                         </a:rPr>
-                        <m:t>𝑚𝑒𝑑𝑖𝑐𝑎𝑙</m:t>
+                        <m:t>𝒎𝒆𝒅𝒊𝒄𝒂𝒍</m:t>
                       </m:r>
                       <m:r>
-                        <a:rPr lang="en-US" sz="1800" i="1">
+                        <a:rPr lang="en-US" sz="2100" b="1" i="1">
                           <a:solidFill>
                             <a:srgbClr val="000000"/>
                           </a:solidFill>
@@ -4770,16 +5688,16 @@
                         <m:t> </m:t>
                       </m:r>
                       <m:r>
-                        <a:rPr lang="en-US" sz="1800" i="1">
+                        <a:rPr lang="en-US" sz="2100" b="1" i="1">
                           <a:solidFill>
                             <a:srgbClr val="000000"/>
                           </a:solidFill>
                           <a:latin typeface="Cambria Math" panose="02040503050406030204" pitchFamily="18" charset="0"/>
                         </a:rPr>
-                        <m:t>𝑓𝑎𝑐𝑡𝑜𝑟𝑠</m:t>
+                        <m:t>𝒇𝒂𝒄𝒕𝒐𝒓𝒔</m:t>
                       </m:r>
                       <m:r>
-                        <a:rPr lang="en-US" sz="1800" b="0" i="1" smtClean="0">
+                        <a:rPr lang="en-US" sz="2100" b="1" i="1" smtClean="0">
                           <a:solidFill>
                             <a:srgbClr val="000000"/>
                           </a:solidFill>
@@ -4790,7 +5708,7 @@
                     </m:oMath>
                   </m:oMathPara>
                 </a14:m>
-                <a:endParaRPr lang="en-US" sz="1800" b="0" dirty="0">
+                <a:endParaRPr lang="en-US" sz="2100" b="1" dirty="0">
                   <a:solidFill>
                     <a:srgbClr val="000000"/>
                   </a:solidFill>
@@ -4811,7 +5729,7 @@
               </a:p>
               <a:p>
                 <a:r>
-                  <a:rPr lang="en-US" sz="1800" dirty="0">
+                  <a:rPr lang="en-US" sz="2200" dirty="0">
                     <a:solidFill>
                       <a:srgbClr val="000000"/>
                     </a:solidFill>
@@ -4821,7 +5739,7 @@
                   <a:t>The </a:t>
                 </a:r>
                 <a:r>
-                  <a:rPr lang="en-US" sz="1800" i="1" dirty="0">
+                  <a:rPr lang="en-US" sz="2200" i="1" dirty="0">
                     <a:solidFill>
                       <a:srgbClr val="000000"/>
                     </a:solidFill>
@@ -4831,7 +5749,7 @@
                   <a:t>null hypothesis </a:t>
                 </a:r>
                 <a:r>
-                  <a:rPr lang="en-US" sz="1800" dirty="0">
+                  <a:rPr lang="en-US" sz="2200" dirty="0">
                     <a:solidFill>
                       <a:srgbClr val="000000"/>
                     </a:solidFill>
@@ -4845,7 +5763,7 @@
                     <m:sSub>
                       <m:sSubPr>
                         <m:ctrlPr>
-                          <a:rPr lang="en-US" sz="1800" i="1" smtClean="0">
+                          <a:rPr lang="en-US" sz="2200" i="1" smtClean="0">
                             <a:solidFill>
                               <a:srgbClr val="000000"/>
                             </a:solidFill>
@@ -4855,7 +5773,7 @@
                       </m:sSubPr>
                       <m:e>
                         <m:r>
-                          <a:rPr lang="en-US" sz="1800" b="0" i="1" smtClean="0">
+                          <a:rPr lang="en-US" sz="2200" b="0" i="1" smtClean="0">
                             <a:solidFill>
                               <a:srgbClr val="000000"/>
                             </a:solidFill>
@@ -4866,7 +5784,7 @@
                       </m:e>
                       <m:sub>
                         <m:r>
-                          <a:rPr lang="en-US" sz="1800" b="0" i="1" smtClean="0">
+                          <a:rPr lang="en-US" sz="2200" b="0" i="1" smtClean="0">
                             <a:solidFill>
                               <a:srgbClr val="000000"/>
                             </a:solidFill>
@@ -4879,7 +5797,7 @@
                   </m:oMath>
                 </a14:m>
                 <a:r>
-                  <a:rPr lang="en-US" sz="1800" dirty="0">
+                  <a:rPr lang="en-US" sz="2200" dirty="0">
                     <a:solidFill>
                       <a:srgbClr val="000000"/>
                     </a:solidFill>
@@ -4889,7 +5807,7 @@
                   <a:t>) states that age, anemia, creatinine phosphokinase, diabetes, ejection fraction, high blood pressure, platelet count, serum creatinine, serum sodium, gender and smoking (independent variables) have no association with heart failure mortality (dependent variable)</a:t>
                 </a:r>
                 <a:r>
-                  <a:rPr lang="en-US" sz="1800" i="1" dirty="0">
+                  <a:rPr lang="en-US" sz="2200" i="1" dirty="0">
                     <a:solidFill>
                       <a:srgbClr val="000000"/>
                     </a:solidFill>
@@ -4901,7 +5819,7 @@
               </a:p>
               <a:p>
                 <a:r>
-                  <a:rPr lang="en-US" sz="1800" dirty="0">
+                  <a:rPr lang="en-US" sz="2200" dirty="0">
                     <a:solidFill>
                       <a:srgbClr val="000000"/>
                     </a:solidFill>
@@ -4911,7 +5829,7 @@
                   <a:t>The </a:t>
                 </a:r>
                 <a:r>
-                  <a:rPr lang="en-US" sz="1800" i="1" dirty="0">
+                  <a:rPr lang="en-US" sz="2200" i="1" dirty="0">
                     <a:solidFill>
                       <a:srgbClr val="000000"/>
                     </a:solidFill>
@@ -4921,7 +5839,7 @@
                   <a:t>alternative hypothesis </a:t>
                 </a:r>
                 <a:r>
-                  <a:rPr lang="en-US" sz="1800" dirty="0">
+                  <a:rPr lang="en-US" sz="2200" dirty="0">
                     <a:solidFill>
                       <a:srgbClr val="000000"/>
                     </a:solidFill>
@@ -4935,7 +5853,7 @@
                     <m:sSub>
                       <m:sSubPr>
                         <m:ctrlPr>
-                          <a:rPr lang="en-US" sz="1800" i="1" smtClean="0">
+                          <a:rPr lang="en-US" sz="2200" i="1" smtClean="0">
                             <a:solidFill>
                               <a:srgbClr val="000000"/>
                             </a:solidFill>
@@ -4945,7 +5863,7 @@
                       </m:sSubPr>
                       <m:e>
                         <m:r>
-                          <a:rPr lang="en-US" sz="1800" b="0" i="1" smtClean="0">
+                          <a:rPr lang="en-US" sz="2200" b="0" i="1" smtClean="0">
                             <a:solidFill>
                               <a:srgbClr val="000000"/>
                             </a:solidFill>
@@ -4956,7 +5874,7 @@
                       </m:e>
                       <m:sub>
                         <m:r>
-                          <a:rPr lang="en-US" sz="1800" b="0" i="1" smtClean="0">
+                          <a:rPr lang="en-US" sz="2200" b="0" i="1" smtClean="0">
                             <a:solidFill>
                               <a:srgbClr val="000000"/>
                             </a:solidFill>
@@ -4969,7 +5887,7 @@
                   </m:oMath>
                 </a14:m>
                 <a:r>
-                  <a:rPr lang="en-US" sz="1800" dirty="0">
+                  <a:rPr lang="en-US" sz="2200" dirty="0">
                     <a:solidFill>
                       <a:srgbClr val="000000"/>
                     </a:solidFill>
@@ -4979,7 +5897,7 @@
                   <a:t> states that age, anemia, creatinine phosphokinase, diabetes, ejection fraction, high blood pressure, platelet count, serum creatinine, serum sodium, gender and smoking (independent variables) are associated with heart failure mortality (dependent variable)</a:t>
                 </a:r>
                 <a:r>
-                  <a:rPr lang="en-US" sz="1800" i="1" dirty="0">
+                  <a:rPr lang="en-US" sz="2200" i="1" dirty="0">
                     <a:solidFill>
                       <a:srgbClr val="000000"/>
                     </a:solidFill>
@@ -5217,7 +6135,7 @@
             <a:pPr algn="ctr"/>
             <a:r>
               <a:rPr lang="en-US" dirty="0"/>
-              <a:t>Heart Failure = CVD dataset (</a:t>
+              <a:t>Heart Failure(Yes/No) = CVD dataset (</a:t>
             </a:r>
             <a:r>
               <a:rPr lang="en-US" sz="1800" dirty="0">
@@ -5281,7 +6199,7 @@
                   <a:schemeClr val="accent1"/>
                 </a:solidFill>
               </a:rPr>
-              <a:t>(Output: Heart failure; </a:t>
+              <a:t>(Output: Heart failure(y/n); </a:t>
             </a:r>
           </a:p>
           <a:p>
@@ -6466,16 +7384,100 @@
               </a:spcBef>
               <a:buNone/>
             </a:pPr>
-            <a:endParaRPr lang="en-US" sz="1300" dirty="0">
-              <a:solidFill>
-                <a:schemeClr val="accent1"/>
-              </a:solidFill>
-            </a:endParaRPr>
+            <a:r>
+              <a:rPr lang="en-US" sz="1300" dirty="0">
+                <a:solidFill>
+                  <a:schemeClr val="accent1"/>
+                </a:solidFill>
+              </a:rPr>
+              <a:t>df = df[‘</a:t>
+            </a:r>
+            <a:r>
+              <a:rPr lang="en-US" sz="1300" dirty="0" err="1">
+                <a:solidFill>
+                  <a:schemeClr val="accent1"/>
+                </a:solidFill>
+              </a:rPr>
+              <a:t>cols_w_extreme_vlaues</a:t>
+            </a:r>
+            <a:r>
+              <a:rPr lang="en-US" sz="1300" dirty="0">
+                <a:solidFill>
+                  <a:schemeClr val="accent1"/>
+                </a:solidFill>
+              </a:rPr>
+              <a:t>’ &lt; </a:t>
+            </a:r>
+            <a:r>
+              <a:rPr lang="en-US" sz="1300" dirty="0" err="1">
+                <a:solidFill>
+                  <a:schemeClr val="accent1"/>
+                </a:solidFill>
+              </a:rPr>
+              <a:t>value_remove_outliers</a:t>
+            </a:r>
+            <a:r>
+              <a:rPr lang="en-US" sz="1300" dirty="0">
+                <a:solidFill>
+                  <a:schemeClr val="accent1"/>
+                </a:solidFill>
+              </a:rPr>
+              <a:t>]</a:t>
+            </a:r>
           </a:p>
           <a:p>
             <a:pPr marL="0" indent="0">
+              <a:lnSpc>
+                <a:spcPct val="100000"/>
+              </a:lnSpc>
+              <a:spcBef>
+                <a:spcPts val="0"/>
+              </a:spcBef>
               <a:buNone/>
             </a:pPr>
+            <a:r>
+              <a:rPr lang="en-US" sz="1300" dirty="0" err="1">
+                <a:solidFill>
+                  <a:schemeClr val="accent1"/>
+                </a:solidFill>
+              </a:rPr>
+              <a:t>sns.catplot</a:t>
+            </a:r>
+            <a:r>
+              <a:rPr lang="en-US" sz="1300" dirty="0">
+                <a:solidFill>
+                  <a:schemeClr val="accent1"/>
+                </a:solidFill>
+              </a:rPr>
+              <a:t> #all categorical variables</a:t>
+            </a:r>
+          </a:p>
+          <a:p>
+            <a:pPr marL="0" indent="0">
+              <a:lnSpc>
+                <a:spcPct val="100000"/>
+              </a:lnSpc>
+              <a:spcBef>
+                <a:spcPts val="0"/>
+              </a:spcBef>
+              <a:buNone/>
+            </a:pPr>
+            <a:r>
+              <a:rPr lang="en-US" sz="1300" dirty="0" err="1">
+                <a:solidFill>
+                  <a:schemeClr val="accent1"/>
+                </a:solidFill>
+              </a:rPr>
+              <a:t>sns.boxplot</a:t>
+            </a:r>
+            <a:r>
+              <a:rPr lang="en-US" sz="1300" dirty="0">
+                <a:solidFill>
+                  <a:schemeClr val="accent1"/>
+                </a:solidFill>
+              </a:rPr>
+              <a:t> # all continuous variables against death event</a:t>
+            </a:r>
             <a:endParaRPr lang="en-US" dirty="0"/>
           </a:p>
           <a:p>
@@ -6606,33 +7608,48 @@
               <a:buNone/>
             </a:pPr>
             <a:r>
-              <a:rPr lang="en-US" dirty="0"/>
-              <a:t>   https://</a:t>
-            </a:r>
-            <a:r>
-              <a:rPr lang="en-US" dirty="0" err="1"/>
+              <a:rPr lang="en-US" dirty="0">
+                <a:hlinkClick r:id="rId2"/>
+              </a:rPr>
+              <a:t> https://</a:t>
+            </a:r>
+            <a:r>
+              <a:rPr lang="en-US" dirty="0" err="1">
+                <a:hlinkClick r:id="rId2"/>
+              </a:rPr>
               <a:t>www.kaggle.com</a:t>
             </a:r>
             <a:r>
-              <a:rPr lang="en-US" dirty="0"/>
+              <a:rPr lang="en-US" dirty="0">
+                <a:hlinkClick r:id="rId2"/>
+              </a:rPr>
               <a:t>/datasets/</a:t>
             </a:r>
             <a:r>
-              <a:rPr lang="en-US" dirty="0" err="1"/>
+              <a:rPr lang="en-US" dirty="0" err="1">
+                <a:hlinkClick r:id="rId2"/>
+              </a:rPr>
               <a:t>whenamancodes</a:t>
             </a:r>
             <a:r>
-              <a:rPr lang="en-US" dirty="0"/>
-              <a:t>/heart-failure- </a:t>
-            </a:r>
-            <a:r>
-              <a:rPr lang="en-US" dirty="0" err="1"/>
-              <a:t>clinical-records?resource</a:t>
-            </a:r>
-            <a:r>
-              <a:rPr lang="en-US" dirty="0"/>
+              <a:rPr lang="en-US" dirty="0">
+                <a:hlinkClick r:id="rId2"/>
+              </a:rPr>
+              <a:t>/</a:t>
+            </a:r>
+            <a:r>
+              <a:rPr lang="en-US" dirty="0" err="1">
+                <a:hlinkClick r:id="rId2"/>
+              </a:rPr>
+              <a:t>heart-failure-clinical-records?resource</a:t>
+            </a:r>
+            <a:r>
+              <a:rPr lang="en-US" dirty="0">
+                <a:hlinkClick r:id="rId2"/>
+              </a:rPr>
               <a:t>=download</a:t>
             </a:r>
+            <a:endParaRPr lang="en-US" dirty="0"/>
           </a:p>
         </p:txBody>
       </p:sp>
@@ -7073,7 +8090,7 @@
         <p:spPr>
           <a:xfrm>
             <a:off x="528142" y="1468767"/>
-            <a:ext cx="2425151" cy="369332"/>
+            <a:ext cx="1237518" cy="923330"/>
           </a:xfrm>
           <a:prstGeom prst="rect">
             <a:avLst/>
@@ -7088,17 +8105,29 @@
           <a:p>
             <a:r>
               <a:rPr lang="en-US" dirty="0"/>
-              <a:t>Correlations and scatter</a:t>
+              <a:t>Correlation</a:t>
+            </a:r>
+          </a:p>
+          <a:p>
+            <a:r>
+              <a:rPr lang="en-US" dirty="0"/>
+              <a:t>and</a:t>
+            </a:r>
+          </a:p>
+          <a:p>
+            <a:r>
+              <a:rPr lang="en-US" dirty="0"/>
+              <a:t>Histograms</a:t>
             </a:r>
           </a:p>
         </p:txBody>
       </p:sp>
       <p:pic>
         <p:nvPicPr>
-          <p:cNvPr id="9" name="Picture 8">
-            <a:extLst>
-              <a:ext uri="{FF2B5EF4-FFF2-40B4-BE49-F238E27FC236}">
-                <a16:creationId xmlns:a16="http://schemas.microsoft.com/office/drawing/2014/main" id="{7A01AD4D-139E-C84A-DC89-50E77C68663C}"/>
+          <p:cNvPr id="4" name="Picture 3">
+            <a:extLst>
+              <a:ext uri="{FF2B5EF4-FFF2-40B4-BE49-F238E27FC236}">
+                <a16:creationId xmlns:a16="http://schemas.microsoft.com/office/drawing/2014/main" id="{AA35B7FF-A936-9AD6-FCDC-D79C9A2AC138}"/>
               </a:ext>
             </a:extLst>
           </p:cNvPr>
@@ -7121,8 +8150,8 @@
         </p:blipFill>
         <p:spPr>
           <a:xfrm>
-            <a:off x="4065183" y="556268"/>
-            <a:ext cx="6835697" cy="6233787"/>
+            <a:off x="3992600" y="507101"/>
+            <a:ext cx="7504182" cy="6280141"/>
           </a:xfrm>
           <a:prstGeom prst="rect">
             <a:avLst/>

</xml_diff>

<commit_message>
Updated powerpoint to Analyze data Updated model for project
</commit_message>
<xml_diff>
--- a/Grothe_ANA500_Micro-Project.pptx
+++ b/Grothe_ANA500_Micro-Project.pptx
@@ -20,8 +20,11 @@
     <p:sldId id="275" r:id="rId14"/>
     <p:sldId id="276" r:id="rId15"/>
     <p:sldId id="261" r:id="rId16"/>
-    <p:sldId id="262" r:id="rId17"/>
-    <p:sldId id="263" r:id="rId18"/>
+    <p:sldId id="277" r:id="rId17"/>
+    <p:sldId id="278" r:id="rId18"/>
+    <p:sldId id="279" r:id="rId19"/>
+    <p:sldId id="262" r:id="rId20"/>
+    <p:sldId id="263" r:id="rId21"/>
   </p:sldIdLst>
   <p:sldSz cx="12192000" cy="6858000"/>
   <p:notesSz cx="6858000" cy="9144000"/>
@@ -283,7 +286,7 @@
           <a:p>
             <a:fld id="{3F52AFC1-4F45-459D-BC95-0F8F5E3A4294}" type="datetimeFigureOut">
               <a:rPr lang="en-US" smtClean="0"/>
-              <a:t>10/9/22</a:t>
+              <a:t>10/16/22</a:t>
             </a:fld>
             <a:endParaRPr lang="en-US"/>
           </a:p>
@@ -481,7 +484,7 @@
           <a:p>
             <a:fld id="{3F52AFC1-4F45-459D-BC95-0F8F5E3A4294}" type="datetimeFigureOut">
               <a:rPr lang="en-US" smtClean="0"/>
-              <a:t>10/9/22</a:t>
+              <a:t>10/16/22</a:t>
             </a:fld>
             <a:endParaRPr lang="en-US"/>
           </a:p>
@@ -689,7 +692,7 @@
           <a:p>
             <a:fld id="{3F52AFC1-4F45-459D-BC95-0F8F5E3A4294}" type="datetimeFigureOut">
               <a:rPr lang="en-US" smtClean="0"/>
-              <a:t>10/9/22</a:t>
+              <a:t>10/16/22</a:t>
             </a:fld>
             <a:endParaRPr lang="en-US"/>
           </a:p>
@@ -887,7 +890,7 @@
           <a:p>
             <a:fld id="{3F52AFC1-4F45-459D-BC95-0F8F5E3A4294}" type="datetimeFigureOut">
               <a:rPr lang="en-US" smtClean="0"/>
-              <a:t>10/9/22</a:t>
+              <a:t>10/16/22</a:t>
             </a:fld>
             <a:endParaRPr lang="en-US"/>
           </a:p>
@@ -1162,7 +1165,7 @@
           <a:p>
             <a:fld id="{3F52AFC1-4F45-459D-BC95-0F8F5E3A4294}" type="datetimeFigureOut">
               <a:rPr lang="en-US" smtClean="0"/>
-              <a:t>10/9/22</a:t>
+              <a:t>10/16/22</a:t>
             </a:fld>
             <a:endParaRPr lang="en-US"/>
           </a:p>
@@ -1427,7 +1430,7 @@
           <a:p>
             <a:fld id="{3F52AFC1-4F45-459D-BC95-0F8F5E3A4294}" type="datetimeFigureOut">
               <a:rPr lang="en-US" smtClean="0"/>
-              <a:t>10/9/22</a:t>
+              <a:t>10/16/22</a:t>
             </a:fld>
             <a:endParaRPr lang="en-US"/>
           </a:p>
@@ -1839,7 +1842,7 @@
           <a:p>
             <a:fld id="{3F52AFC1-4F45-459D-BC95-0F8F5E3A4294}" type="datetimeFigureOut">
               <a:rPr lang="en-US" smtClean="0"/>
-              <a:t>10/9/22</a:t>
+              <a:t>10/16/22</a:t>
             </a:fld>
             <a:endParaRPr lang="en-US"/>
           </a:p>
@@ -1980,7 +1983,7 @@
           <a:p>
             <a:fld id="{3F52AFC1-4F45-459D-BC95-0F8F5E3A4294}" type="datetimeFigureOut">
               <a:rPr lang="en-US" smtClean="0"/>
-              <a:t>10/9/22</a:t>
+              <a:t>10/16/22</a:t>
             </a:fld>
             <a:endParaRPr lang="en-US"/>
           </a:p>
@@ -2093,7 +2096,7 @@
           <a:p>
             <a:fld id="{3F52AFC1-4F45-459D-BC95-0F8F5E3A4294}" type="datetimeFigureOut">
               <a:rPr lang="en-US" smtClean="0"/>
-              <a:t>10/9/22</a:t>
+              <a:t>10/16/22</a:t>
             </a:fld>
             <a:endParaRPr lang="en-US"/>
           </a:p>
@@ -2404,7 +2407,7 @@
           <a:p>
             <a:fld id="{3F52AFC1-4F45-459D-BC95-0F8F5E3A4294}" type="datetimeFigureOut">
               <a:rPr lang="en-US" smtClean="0"/>
-              <a:t>10/9/22</a:t>
+              <a:t>10/16/22</a:t>
             </a:fld>
             <a:endParaRPr lang="en-US"/>
           </a:p>
@@ -2692,7 +2695,7 @@
           <a:p>
             <a:fld id="{3F52AFC1-4F45-459D-BC95-0F8F5E3A4294}" type="datetimeFigureOut">
               <a:rPr lang="en-US" smtClean="0"/>
-              <a:t>10/9/22</a:t>
+              <a:t>10/16/22</a:t>
             </a:fld>
             <a:endParaRPr lang="en-US"/>
           </a:p>
@@ -2933,7 +2936,7 @@
           <a:p>
             <a:fld id="{3F52AFC1-4F45-459D-BC95-0F8F5E3A4294}" type="datetimeFigureOut">
               <a:rPr lang="en-US" smtClean="0"/>
-              <a:t>10/9/22</a:t>
+              <a:t>10/16/22</a:t>
             </a:fld>
             <a:endParaRPr lang="en-US"/>
           </a:p>
@@ -3387,7 +3390,7 @@
             </a:br>
             <a:r>
               <a:rPr lang="en-US" sz="4800" dirty="0"/>
-              <a:t>Micro-Project #2</a:t>
+              <a:t>Micro-Project #3</a:t>
             </a:r>
             <a:br>
               <a:rPr lang="en-US" sz="4800" dirty="0"/>
@@ -3431,7 +3434,7 @@
           <a:p>
             <a:r>
               <a:rPr lang="en-US" dirty="0"/>
-              <a:t>October 9, 2022</a:t>
+              <a:t>October 16, 2022</a:t>
             </a:r>
           </a:p>
           <a:p>
@@ -4426,44 +4429,6 @@
       </p:sp>
       <p:sp>
         <p:nvSpPr>
-          <p:cNvPr id="3" name="Content Placeholder 2">
-            <a:extLst>
-              <a:ext uri="{FF2B5EF4-FFF2-40B4-BE49-F238E27FC236}">
-                <a16:creationId xmlns:a16="http://schemas.microsoft.com/office/drawing/2014/main" id="{7FEAE391-6366-4E20-A14E-0ECFAEA8029A}"/>
-              </a:ext>
-            </a:extLst>
-          </p:cNvPr>
-          <p:cNvSpPr>
-            <a:spLocks noGrp="1"/>
-          </p:cNvSpPr>
-          <p:nvPr>
-            <p:ph idx="1"/>
-          </p:nvPr>
-        </p:nvSpPr>
-        <p:spPr/>
-        <p:txBody>
-          <a:bodyPr/>
-          <a:lstStyle/>
-          <a:p>
-            <a:r>
-              <a:rPr lang="en-US" sz="1800" dirty="0">
-                <a:solidFill>
-                  <a:srgbClr val="000000"/>
-                </a:solidFill>
-                <a:effectLst/>
-                <a:latin typeface="Times New Roman" panose="02020603050405020304" pitchFamily="18" charset="0"/>
-                <a:ea typeface="Times New Roman" panose="02020603050405020304" pitchFamily="18" charset="0"/>
-              </a:rPr>
-              <a:t>&lt;select analytical technique, build models&gt;</a:t>
-            </a:r>
-          </a:p>
-          <a:p>
-            <a:endParaRPr lang="en-US" dirty="0"/>
-          </a:p>
-        </p:txBody>
-      </p:sp>
-      <p:sp>
-        <p:nvSpPr>
           <p:cNvPr id="5" name="TextBox 4">
             <a:extLst>
               <a:ext uri="{FF2B5EF4-FFF2-40B4-BE49-F238E27FC236}">
@@ -4503,6 +4468,42 @@
           </a:p>
         </p:txBody>
       </p:sp>
+      <p:pic>
+        <p:nvPicPr>
+          <p:cNvPr id="6" name="Picture 5">
+            <a:extLst>
+              <a:ext uri="{FF2B5EF4-FFF2-40B4-BE49-F238E27FC236}">
+                <a16:creationId xmlns:a16="http://schemas.microsoft.com/office/drawing/2014/main" id="{0FADC4A3-AD32-5C95-84C0-8D393EE7E006}"/>
+              </a:ext>
+            </a:extLst>
+          </p:cNvPr>
+          <p:cNvPicPr>
+            <a:picLocks noChangeAspect="1"/>
+          </p:cNvPicPr>
+          <p:nvPr/>
+        </p:nvPicPr>
+        <p:blipFill>
+          <a:blip r:embed="rId2">
+            <a:extLst>
+              <a:ext uri="{28A0092B-C50C-407E-A947-70E740481C1C}">
+                <a14:useLocalDpi xmlns:a14="http://schemas.microsoft.com/office/drawing/2010/main" val="0"/>
+              </a:ext>
+            </a:extLst>
+          </a:blip>
+          <a:stretch>
+            <a:fillRect/>
+          </a:stretch>
+        </p:blipFill>
+        <p:spPr>
+          <a:xfrm>
+            <a:off x="838200" y="2009365"/>
+            <a:ext cx="10402936" cy="3304039"/>
+          </a:xfrm>
+          <a:prstGeom prst="rect">
+            <a:avLst/>
+          </a:prstGeom>
+        </p:spPr>
+      </p:pic>
     </p:spTree>
     <p:extLst>
       <p:ext uri="{BB962C8B-B14F-4D97-AF65-F5344CB8AC3E}">
@@ -4556,46 +4557,8 @@
           <a:p>
             <a:r>
               <a:rPr lang="en-US" dirty="0"/>
-              <a:t>Report</a:t>
-            </a:r>
-          </a:p>
-        </p:txBody>
-      </p:sp>
-      <p:sp>
-        <p:nvSpPr>
-          <p:cNvPr id="3" name="Content Placeholder 2">
-            <a:extLst>
-              <a:ext uri="{FF2B5EF4-FFF2-40B4-BE49-F238E27FC236}">
-                <a16:creationId xmlns:a16="http://schemas.microsoft.com/office/drawing/2014/main" id="{7FEAE391-6366-4E20-A14E-0ECFAEA8029A}"/>
-              </a:ext>
-            </a:extLst>
-          </p:cNvPr>
-          <p:cNvSpPr>
-            <a:spLocks noGrp="1"/>
-          </p:cNvSpPr>
-          <p:nvPr>
-            <p:ph idx="1"/>
-          </p:nvPr>
-        </p:nvSpPr>
-        <p:spPr/>
-        <p:txBody>
-          <a:bodyPr/>
-          <a:lstStyle/>
-          <a:p>
-            <a:r>
-              <a:rPr lang="en-US" sz="1800" dirty="0">
-                <a:solidFill>
-                  <a:srgbClr val="000000"/>
-                </a:solidFill>
-                <a:effectLst/>
-                <a:latin typeface="Times New Roman" panose="02020603050405020304" pitchFamily="18" charset="0"/>
-                <a:ea typeface="Times New Roman" panose="02020603050405020304" pitchFamily="18" charset="0"/>
-              </a:rPr>
-              <a:t>&lt;communicate results&gt;</a:t>
-            </a:r>
-          </a:p>
-          <a:p>
-            <a:endParaRPr lang="en-US" dirty="0"/>
+              <a:t>Analyze data</a:t>
+            </a:r>
           </a:p>
         </p:txBody>
       </p:sp>
@@ -4604,7 +4567,7 @@
           <p:cNvPr id="5" name="TextBox 4">
             <a:extLst>
               <a:ext uri="{FF2B5EF4-FFF2-40B4-BE49-F238E27FC236}">
-                <a16:creationId xmlns:a16="http://schemas.microsoft.com/office/drawing/2014/main" id="{84E3B221-2E05-660E-47DA-C83FEFEF4EAB}"/>
+                <a16:creationId xmlns:a16="http://schemas.microsoft.com/office/drawing/2014/main" id="{3475667D-8683-F088-9369-EC60A0415E3F}"/>
               </a:ext>
             </a:extLst>
           </p:cNvPr>
@@ -4635,15 +4598,51 @@
                   </a:schemeClr>
                 </a:solidFill>
               </a:rPr>
-              <a:t>The Data Science Process (4/5)</a:t>
-            </a:r>
-          </a:p>
-        </p:txBody>
-      </p:sp>
+              <a:t>The Data Science Process (3/5)</a:t>
+            </a:r>
+          </a:p>
+        </p:txBody>
+      </p:sp>
+      <p:pic>
+        <p:nvPicPr>
+          <p:cNvPr id="4" name="Picture 3">
+            <a:extLst>
+              <a:ext uri="{FF2B5EF4-FFF2-40B4-BE49-F238E27FC236}">
+                <a16:creationId xmlns:a16="http://schemas.microsoft.com/office/drawing/2014/main" id="{4A702A3E-CD94-E4F9-C0C5-4504A7E47991}"/>
+              </a:ext>
+            </a:extLst>
+          </p:cNvPr>
+          <p:cNvPicPr>
+            <a:picLocks noChangeAspect="1"/>
+          </p:cNvPicPr>
+          <p:nvPr/>
+        </p:nvPicPr>
+        <p:blipFill>
+          <a:blip r:embed="rId2">
+            <a:extLst>
+              <a:ext uri="{28A0092B-C50C-407E-A947-70E740481C1C}">
+                <a14:useLocalDpi xmlns:a14="http://schemas.microsoft.com/office/drawing/2010/main" val="0"/>
+              </a:ext>
+            </a:extLst>
+          </a:blip>
+          <a:stretch>
+            <a:fillRect/>
+          </a:stretch>
+        </p:blipFill>
+        <p:spPr>
+          <a:xfrm>
+            <a:off x="1059420" y="1626996"/>
+            <a:ext cx="9134904" cy="4247573"/>
+          </a:xfrm>
+          <a:prstGeom prst="rect">
+            <a:avLst/>
+          </a:prstGeom>
+        </p:spPr>
+      </p:pic>
     </p:spTree>
     <p:extLst>
       <p:ext uri="{BB962C8B-B14F-4D97-AF65-F5344CB8AC3E}">
-        <p14:creationId xmlns:p14="http://schemas.microsoft.com/office/powerpoint/2010/main" val="2309908418"/>
+        <p14:creationId xmlns:p14="http://schemas.microsoft.com/office/powerpoint/2010/main" val="682833330"/>
       </p:ext>
     </p:extLst>
   </p:cSld>
@@ -4675,7 +4674,7 @@
           <p:cNvPr id="2" name="Title 1">
             <a:extLst>
               <a:ext uri="{FF2B5EF4-FFF2-40B4-BE49-F238E27FC236}">
-                <a16:creationId xmlns:a16="http://schemas.microsoft.com/office/drawing/2014/main" id="{7998C1A2-E365-4EAD-A777-10EF9BD2588C}"/>
+                <a16:creationId xmlns:a16="http://schemas.microsoft.com/office/drawing/2014/main" id="{DB2A7252-6823-44F9-B464-D7A15D12BB65}"/>
               </a:ext>
             </a:extLst>
           </p:cNvPr>
@@ -4693,44 +4692,8 @@
           <a:p>
             <a:r>
               <a:rPr lang="en-US" dirty="0"/>
-              <a:t>Act</a:t>
-            </a:r>
-          </a:p>
-        </p:txBody>
-      </p:sp>
-      <p:sp>
-        <p:nvSpPr>
-          <p:cNvPr id="3" name="Content Placeholder 2">
-            <a:extLst>
-              <a:ext uri="{FF2B5EF4-FFF2-40B4-BE49-F238E27FC236}">
-                <a16:creationId xmlns:a16="http://schemas.microsoft.com/office/drawing/2014/main" id="{83DC0D0A-FDCC-4561-A8EB-1F836A94AACC}"/>
-              </a:ext>
-            </a:extLst>
-          </p:cNvPr>
-          <p:cNvSpPr>
-            <a:spLocks noGrp="1"/>
-          </p:cNvSpPr>
-          <p:nvPr>
-            <p:ph idx="1"/>
-          </p:nvPr>
-        </p:nvSpPr>
-        <p:spPr/>
-        <p:txBody>
-          <a:bodyPr/>
-          <a:lstStyle/>
-          <a:p>
-            <a:r>
-              <a:rPr lang="en-US" sz="1800" dirty="0">
-                <a:solidFill>
-                  <a:srgbClr val="000000"/>
-                </a:solidFill>
-                <a:effectLst/>
-                <a:latin typeface="Times New Roman" panose="02020603050405020304" pitchFamily="18" charset="0"/>
-                <a:ea typeface="Times New Roman" panose="02020603050405020304" pitchFamily="18" charset="0"/>
-              </a:rPr>
-              <a:t>&lt;apply results, connect results with the chosen problem statement or business question&gt;</a:t>
-            </a:r>
-            <a:endParaRPr lang="en-US" dirty="0"/>
+              <a:t>Analyze data</a:t>
+            </a:r>
           </a:p>
         </p:txBody>
       </p:sp>
@@ -4739,7 +4702,7 @@
           <p:cNvPr id="5" name="TextBox 4">
             <a:extLst>
               <a:ext uri="{FF2B5EF4-FFF2-40B4-BE49-F238E27FC236}">
-                <a16:creationId xmlns:a16="http://schemas.microsoft.com/office/drawing/2014/main" id="{CAE26450-2BDD-A04A-39A7-E633248AD1AB}"/>
+                <a16:creationId xmlns:a16="http://schemas.microsoft.com/office/drawing/2014/main" id="{3475667D-8683-F088-9369-EC60A0415E3F}"/>
               </a:ext>
             </a:extLst>
           </p:cNvPr>
@@ -4770,15 +4733,323 @@
                   </a:schemeClr>
                 </a:solidFill>
               </a:rPr>
-              <a:t>The Data Science Process (5/5)</a:t>
-            </a:r>
-          </a:p>
-        </p:txBody>
-      </p:sp>
+              <a:t>The Data Science Process (3/5)</a:t>
+            </a:r>
+          </a:p>
+        </p:txBody>
+      </p:sp>
+      <p:pic>
+        <p:nvPicPr>
+          <p:cNvPr id="6" name="Picture 5">
+            <a:extLst>
+              <a:ext uri="{FF2B5EF4-FFF2-40B4-BE49-F238E27FC236}">
+                <a16:creationId xmlns:a16="http://schemas.microsoft.com/office/drawing/2014/main" id="{DA7FC3C3-4F98-BE6A-3AAE-3317AE284262}"/>
+              </a:ext>
+            </a:extLst>
+          </p:cNvPr>
+          <p:cNvPicPr>
+            <a:picLocks noChangeAspect="1"/>
+          </p:cNvPicPr>
+          <p:nvPr/>
+        </p:nvPicPr>
+        <p:blipFill>
+          <a:blip r:embed="rId2">
+            <a:extLst>
+              <a:ext uri="{28A0092B-C50C-407E-A947-70E740481C1C}">
+                <a14:useLocalDpi xmlns:a14="http://schemas.microsoft.com/office/drawing/2010/main" val="0"/>
+              </a:ext>
+            </a:extLst>
+          </a:blip>
+          <a:stretch>
+            <a:fillRect/>
+          </a:stretch>
+        </p:blipFill>
+        <p:spPr>
+          <a:xfrm>
+            <a:off x="4044863" y="1027906"/>
+            <a:ext cx="7722362" cy="5612380"/>
+          </a:xfrm>
+          <a:prstGeom prst="rect">
+            <a:avLst/>
+          </a:prstGeom>
+        </p:spPr>
+      </p:pic>
     </p:spTree>
     <p:extLst>
       <p:ext uri="{BB962C8B-B14F-4D97-AF65-F5344CB8AC3E}">
-        <p14:creationId xmlns:p14="http://schemas.microsoft.com/office/powerpoint/2010/main" val="4024108741"/>
+        <p14:creationId xmlns:p14="http://schemas.microsoft.com/office/powerpoint/2010/main" val="2178864191"/>
+      </p:ext>
+    </p:extLst>
+  </p:cSld>
+  <p:clrMapOvr>
+    <a:masterClrMapping/>
+  </p:clrMapOvr>
+</p:sld>
+</file>
+
+<file path=ppt/slides/slide18.xml><?xml version="1.0" encoding="utf-8"?>
+<p:sld xmlns:a="http://schemas.openxmlformats.org/drawingml/2006/main" xmlns:r="http://schemas.openxmlformats.org/officeDocument/2006/relationships" xmlns:p="http://schemas.openxmlformats.org/presentationml/2006/main">
+  <p:cSld>
+    <p:spTree>
+      <p:nvGrpSpPr>
+        <p:cNvPr id="1" name=""/>
+        <p:cNvGrpSpPr/>
+        <p:nvPr/>
+      </p:nvGrpSpPr>
+      <p:grpSpPr>
+        <a:xfrm>
+          <a:off x="0" y="0"/>
+          <a:ext cx="0" cy="0"/>
+          <a:chOff x="0" y="0"/>
+          <a:chExt cx="0" cy="0"/>
+        </a:xfrm>
+      </p:grpSpPr>
+      <p:sp>
+        <p:nvSpPr>
+          <p:cNvPr id="2" name="Title 1">
+            <a:extLst>
+              <a:ext uri="{FF2B5EF4-FFF2-40B4-BE49-F238E27FC236}">
+                <a16:creationId xmlns:a16="http://schemas.microsoft.com/office/drawing/2014/main" id="{DB2A7252-6823-44F9-B464-D7A15D12BB65}"/>
+              </a:ext>
+            </a:extLst>
+          </p:cNvPr>
+          <p:cNvSpPr>
+            <a:spLocks noGrp="1"/>
+          </p:cNvSpPr>
+          <p:nvPr>
+            <p:ph type="title"/>
+          </p:nvPr>
+        </p:nvSpPr>
+        <p:spPr/>
+        <p:txBody>
+          <a:bodyPr/>
+          <a:lstStyle/>
+          <a:p>
+            <a:r>
+              <a:rPr lang="en-US" dirty="0"/>
+              <a:t>Analyze data</a:t>
+            </a:r>
+          </a:p>
+        </p:txBody>
+      </p:sp>
+      <p:sp>
+        <p:nvSpPr>
+          <p:cNvPr id="5" name="TextBox 4">
+            <a:extLst>
+              <a:ext uri="{FF2B5EF4-FFF2-40B4-BE49-F238E27FC236}">
+                <a16:creationId xmlns:a16="http://schemas.microsoft.com/office/drawing/2014/main" id="{3475667D-8683-F088-9369-EC60A0415E3F}"/>
+              </a:ext>
+            </a:extLst>
+          </p:cNvPr>
+          <p:cNvSpPr txBox="1"/>
+          <p:nvPr/>
+        </p:nvSpPr>
+        <p:spPr>
+          <a:xfrm>
+            <a:off x="9035144" y="217714"/>
+            <a:ext cx="2743200" cy="338554"/>
+          </a:xfrm>
+          <a:prstGeom prst="rect">
+            <a:avLst/>
+          </a:prstGeom>
+          <a:noFill/>
+        </p:spPr>
+        <p:txBody>
+          <a:bodyPr wrap="square" rtlCol="0">
+            <a:spAutoFit/>
+          </a:bodyPr>
+          <a:lstStyle/>
+          <a:p>
+            <a:r>
+              <a:rPr lang="en-US" sz="1600" dirty="0">
+                <a:solidFill>
+                  <a:schemeClr val="bg1">
+                    <a:lumMod val="50000"/>
+                  </a:schemeClr>
+                </a:solidFill>
+              </a:rPr>
+              <a:t>The Data Science Process (3/5)</a:t>
+            </a:r>
+          </a:p>
+        </p:txBody>
+      </p:sp>
+      <p:pic>
+        <p:nvPicPr>
+          <p:cNvPr id="4" name="Picture 3">
+            <a:extLst>
+              <a:ext uri="{FF2B5EF4-FFF2-40B4-BE49-F238E27FC236}">
+                <a16:creationId xmlns:a16="http://schemas.microsoft.com/office/drawing/2014/main" id="{854DA9F3-425A-387D-F272-9DC07B1F6385}"/>
+              </a:ext>
+            </a:extLst>
+          </p:cNvPr>
+          <p:cNvPicPr>
+            <a:picLocks noChangeAspect="1"/>
+          </p:cNvPicPr>
+          <p:nvPr/>
+        </p:nvPicPr>
+        <p:blipFill>
+          <a:blip r:embed="rId2">
+            <a:extLst>
+              <a:ext uri="{28A0092B-C50C-407E-A947-70E740481C1C}">
+                <a14:useLocalDpi xmlns:a14="http://schemas.microsoft.com/office/drawing/2010/main" val="0"/>
+              </a:ext>
+            </a:extLst>
+          </a:blip>
+          <a:stretch>
+            <a:fillRect/>
+          </a:stretch>
+        </p:blipFill>
+        <p:spPr>
+          <a:xfrm>
+            <a:off x="4233370" y="556268"/>
+            <a:ext cx="5157765" cy="6123442"/>
+          </a:xfrm>
+          <a:prstGeom prst="rect">
+            <a:avLst/>
+          </a:prstGeom>
+        </p:spPr>
+      </p:pic>
+    </p:spTree>
+    <p:extLst>
+      <p:ext uri="{BB962C8B-B14F-4D97-AF65-F5344CB8AC3E}">
+        <p14:creationId xmlns:p14="http://schemas.microsoft.com/office/powerpoint/2010/main" val="4262395198"/>
+      </p:ext>
+    </p:extLst>
+  </p:cSld>
+  <p:clrMapOvr>
+    <a:masterClrMapping/>
+  </p:clrMapOvr>
+</p:sld>
+</file>
+
+<file path=ppt/slides/slide19.xml><?xml version="1.0" encoding="utf-8"?>
+<p:sld xmlns:a="http://schemas.openxmlformats.org/drawingml/2006/main" xmlns:r="http://schemas.openxmlformats.org/officeDocument/2006/relationships" xmlns:p="http://schemas.openxmlformats.org/presentationml/2006/main">
+  <p:cSld>
+    <p:spTree>
+      <p:nvGrpSpPr>
+        <p:cNvPr id="1" name=""/>
+        <p:cNvGrpSpPr/>
+        <p:nvPr/>
+      </p:nvGrpSpPr>
+      <p:grpSpPr>
+        <a:xfrm>
+          <a:off x="0" y="0"/>
+          <a:ext cx="0" cy="0"/>
+          <a:chOff x="0" y="0"/>
+          <a:chExt cx="0" cy="0"/>
+        </a:xfrm>
+      </p:grpSpPr>
+      <p:sp>
+        <p:nvSpPr>
+          <p:cNvPr id="2" name="Title 1">
+            <a:extLst>
+              <a:ext uri="{FF2B5EF4-FFF2-40B4-BE49-F238E27FC236}">
+                <a16:creationId xmlns:a16="http://schemas.microsoft.com/office/drawing/2014/main" id="{DB2A7252-6823-44F9-B464-D7A15D12BB65}"/>
+              </a:ext>
+            </a:extLst>
+          </p:cNvPr>
+          <p:cNvSpPr>
+            <a:spLocks noGrp="1"/>
+          </p:cNvSpPr>
+          <p:nvPr>
+            <p:ph type="title"/>
+          </p:nvPr>
+        </p:nvSpPr>
+        <p:spPr/>
+        <p:txBody>
+          <a:bodyPr/>
+          <a:lstStyle/>
+          <a:p>
+            <a:r>
+              <a:rPr lang="en-US" dirty="0"/>
+              <a:t>Report</a:t>
+            </a:r>
+          </a:p>
+        </p:txBody>
+      </p:sp>
+      <p:sp>
+        <p:nvSpPr>
+          <p:cNvPr id="3" name="Content Placeholder 2">
+            <a:extLst>
+              <a:ext uri="{FF2B5EF4-FFF2-40B4-BE49-F238E27FC236}">
+                <a16:creationId xmlns:a16="http://schemas.microsoft.com/office/drawing/2014/main" id="{7FEAE391-6366-4E20-A14E-0ECFAEA8029A}"/>
+              </a:ext>
+            </a:extLst>
+          </p:cNvPr>
+          <p:cNvSpPr>
+            <a:spLocks noGrp="1"/>
+          </p:cNvSpPr>
+          <p:nvPr>
+            <p:ph idx="1"/>
+          </p:nvPr>
+        </p:nvSpPr>
+        <p:spPr/>
+        <p:txBody>
+          <a:bodyPr/>
+          <a:lstStyle/>
+          <a:p>
+            <a:r>
+              <a:rPr lang="en-US" sz="1800" dirty="0">
+                <a:solidFill>
+                  <a:srgbClr val="000000"/>
+                </a:solidFill>
+                <a:effectLst/>
+                <a:latin typeface="Times New Roman" panose="02020603050405020304" pitchFamily="18" charset="0"/>
+                <a:ea typeface="Times New Roman" panose="02020603050405020304" pitchFamily="18" charset="0"/>
+              </a:rPr>
+              <a:t>&lt;communicate results&gt;</a:t>
+            </a:r>
+          </a:p>
+          <a:p>
+            <a:endParaRPr lang="en-US" dirty="0"/>
+          </a:p>
+        </p:txBody>
+      </p:sp>
+      <p:sp>
+        <p:nvSpPr>
+          <p:cNvPr id="5" name="TextBox 4">
+            <a:extLst>
+              <a:ext uri="{FF2B5EF4-FFF2-40B4-BE49-F238E27FC236}">
+                <a16:creationId xmlns:a16="http://schemas.microsoft.com/office/drawing/2014/main" id="{84E3B221-2E05-660E-47DA-C83FEFEF4EAB}"/>
+              </a:ext>
+            </a:extLst>
+          </p:cNvPr>
+          <p:cNvSpPr txBox="1"/>
+          <p:nvPr/>
+        </p:nvSpPr>
+        <p:spPr>
+          <a:xfrm>
+            <a:off x="9035144" y="217714"/>
+            <a:ext cx="2743200" cy="338554"/>
+          </a:xfrm>
+          <a:prstGeom prst="rect">
+            <a:avLst/>
+          </a:prstGeom>
+          <a:noFill/>
+        </p:spPr>
+        <p:txBody>
+          <a:bodyPr wrap="square" rtlCol="0">
+            <a:spAutoFit/>
+          </a:bodyPr>
+          <a:lstStyle/>
+          <a:p>
+            <a:r>
+              <a:rPr lang="en-US" sz="1600" dirty="0">
+                <a:solidFill>
+                  <a:schemeClr val="bg1">
+                    <a:lumMod val="50000"/>
+                  </a:schemeClr>
+                </a:solidFill>
+              </a:rPr>
+              <a:t>The Data Science Process (4/5)</a:t>
+            </a:r>
+          </a:p>
+        </p:txBody>
+      </p:sp>
+    </p:spTree>
+    <p:extLst>
+      <p:ext uri="{BB962C8B-B14F-4D97-AF65-F5344CB8AC3E}">
+        <p14:creationId xmlns:p14="http://schemas.microsoft.com/office/powerpoint/2010/main" val="2309908418"/>
       </p:ext>
     </p:extLst>
   </p:cSld>
@@ -4933,6 +5204,141 @@
 </p:sld>
 </file>
 
+<file path=ppt/slides/slide20.xml><?xml version="1.0" encoding="utf-8"?>
+<p:sld xmlns:a="http://schemas.openxmlformats.org/drawingml/2006/main" xmlns:r="http://schemas.openxmlformats.org/officeDocument/2006/relationships" xmlns:p="http://schemas.openxmlformats.org/presentationml/2006/main">
+  <p:cSld>
+    <p:spTree>
+      <p:nvGrpSpPr>
+        <p:cNvPr id="1" name=""/>
+        <p:cNvGrpSpPr/>
+        <p:nvPr/>
+      </p:nvGrpSpPr>
+      <p:grpSpPr>
+        <a:xfrm>
+          <a:off x="0" y="0"/>
+          <a:ext cx="0" cy="0"/>
+          <a:chOff x="0" y="0"/>
+          <a:chExt cx="0" cy="0"/>
+        </a:xfrm>
+      </p:grpSpPr>
+      <p:sp>
+        <p:nvSpPr>
+          <p:cNvPr id="2" name="Title 1">
+            <a:extLst>
+              <a:ext uri="{FF2B5EF4-FFF2-40B4-BE49-F238E27FC236}">
+                <a16:creationId xmlns:a16="http://schemas.microsoft.com/office/drawing/2014/main" id="{7998C1A2-E365-4EAD-A777-10EF9BD2588C}"/>
+              </a:ext>
+            </a:extLst>
+          </p:cNvPr>
+          <p:cNvSpPr>
+            <a:spLocks noGrp="1"/>
+          </p:cNvSpPr>
+          <p:nvPr>
+            <p:ph type="title"/>
+          </p:nvPr>
+        </p:nvSpPr>
+        <p:spPr/>
+        <p:txBody>
+          <a:bodyPr/>
+          <a:lstStyle/>
+          <a:p>
+            <a:r>
+              <a:rPr lang="en-US" dirty="0"/>
+              <a:t>Act</a:t>
+            </a:r>
+          </a:p>
+        </p:txBody>
+      </p:sp>
+      <p:sp>
+        <p:nvSpPr>
+          <p:cNvPr id="3" name="Content Placeholder 2">
+            <a:extLst>
+              <a:ext uri="{FF2B5EF4-FFF2-40B4-BE49-F238E27FC236}">
+                <a16:creationId xmlns:a16="http://schemas.microsoft.com/office/drawing/2014/main" id="{83DC0D0A-FDCC-4561-A8EB-1F836A94AACC}"/>
+              </a:ext>
+            </a:extLst>
+          </p:cNvPr>
+          <p:cNvSpPr>
+            <a:spLocks noGrp="1"/>
+          </p:cNvSpPr>
+          <p:nvPr>
+            <p:ph idx="1"/>
+          </p:nvPr>
+        </p:nvSpPr>
+        <p:spPr/>
+        <p:txBody>
+          <a:bodyPr/>
+          <a:lstStyle/>
+          <a:p>
+            <a:r>
+              <a:rPr lang="en-US" sz="1800" dirty="0">
+                <a:solidFill>
+                  <a:srgbClr val="000000"/>
+                </a:solidFill>
+                <a:effectLst/>
+                <a:latin typeface="Times New Roman" panose="02020603050405020304" pitchFamily="18" charset="0"/>
+                <a:ea typeface="Times New Roman" panose="02020603050405020304" pitchFamily="18" charset="0"/>
+              </a:rPr>
+              <a:t>&lt;apply results, connect results with the chosen problem statement or business question&gt;</a:t>
+            </a:r>
+            <a:endParaRPr lang="en-US" dirty="0"/>
+          </a:p>
+        </p:txBody>
+      </p:sp>
+      <p:sp>
+        <p:nvSpPr>
+          <p:cNvPr id="5" name="TextBox 4">
+            <a:extLst>
+              <a:ext uri="{FF2B5EF4-FFF2-40B4-BE49-F238E27FC236}">
+                <a16:creationId xmlns:a16="http://schemas.microsoft.com/office/drawing/2014/main" id="{CAE26450-2BDD-A04A-39A7-E633248AD1AB}"/>
+              </a:ext>
+            </a:extLst>
+          </p:cNvPr>
+          <p:cNvSpPr txBox="1"/>
+          <p:nvPr/>
+        </p:nvSpPr>
+        <p:spPr>
+          <a:xfrm>
+            <a:off x="9035144" y="217714"/>
+            <a:ext cx="2743200" cy="338554"/>
+          </a:xfrm>
+          <a:prstGeom prst="rect">
+            <a:avLst/>
+          </a:prstGeom>
+          <a:noFill/>
+        </p:spPr>
+        <p:txBody>
+          <a:bodyPr wrap="square" rtlCol="0">
+            <a:spAutoFit/>
+          </a:bodyPr>
+          <a:lstStyle/>
+          <a:p>
+            <a:r>
+              <a:rPr lang="en-US" sz="1600" dirty="0">
+                <a:solidFill>
+                  <a:schemeClr val="bg1">
+                    <a:lumMod val="50000"/>
+                  </a:schemeClr>
+                </a:solidFill>
+              </a:rPr>
+              <a:t>The Data Science Process (5/5)</a:t>
+            </a:r>
+          </a:p>
+        </p:txBody>
+      </p:sp>
+    </p:spTree>
+    <p:extLst>
+      <p:ext uri="{BB962C8B-B14F-4D97-AF65-F5344CB8AC3E}">
+        <p14:creationId xmlns:p14="http://schemas.microsoft.com/office/powerpoint/2010/main" val="4024108741"/>
+      </p:ext>
+    </p:extLst>
+  </p:cSld>
+  <p:clrMapOvr>
+    <a:masterClrMapping/>
+  </p:clrMapOvr>
+</p:sld>
+</file>
+
 <file path=ppt/slides/slide3.xml><?xml version="1.0" encoding="utf-8"?>
 <p:sld xmlns:a="http://schemas.openxmlformats.org/drawingml/2006/main" xmlns:r="http://schemas.openxmlformats.org/officeDocument/2006/relationships" xmlns:p="http://schemas.openxmlformats.org/presentationml/2006/main">
   <p:cSld>
@@ -4978,8 +5384,8 @@
           </a:p>
         </p:txBody>
       </p:sp>
-      <mc:AlternateContent xmlns:mc="http://schemas.openxmlformats.org/markup-compatibility/2006">
-        <mc:Choice xmlns:a14="http://schemas.microsoft.com/office/drawing/2010/main" Requires="a14">
+      <mc:AlternateContent xmlns:mc="http://schemas.openxmlformats.org/markup-compatibility/2006" xmlns:a14="http://schemas.microsoft.com/office/drawing/2010/main">
+        <mc:Choice Requires="a14">
           <p:sp>
             <p:nvSpPr>
               <p:cNvPr id="3" name="Content Placeholder 2">
@@ -5910,7 +6316,7 @@
             </p:txBody>
           </p:sp>
         </mc:Choice>
-        <mc:Fallback>
+        <mc:Fallback xmlns="">
           <p:sp>
             <p:nvSpPr>
               <p:cNvPr id="3" name="Content Placeholder 2">
@@ -6330,7 +6736,7 @@
         </p:nvSpPr>
         <p:spPr>
           <a:xfrm>
-            <a:off x="189171" y="2459149"/>
+            <a:off x="189171" y="2140424"/>
             <a:ext cx="1544595" cy="525162"/>
           </a:xfrm>
           <a:prstGeom prst="flowChartTerminator">
@@ -6379,7 +6785,7 @@
         </p:nvSpPr>
         <p:spPr>
           <a:xfrm>
-            <a:off x="2388675" y="2426636"/>
+            <a:off x="2388674" y="2139745"/>
             <a:ext cx="1421027" cy="543697"/>
           </a:xfrm>
           <a:prstGeom prst="flowChartProcess">
@@ -6430,7 +6836,7 @@
         </p:nvCxnSpPr>
         <p:spPr>
           <a:xfrm flipV="1">
-            <a:off x="1684342" y="2712463"/>
+            <a:off x="1694223" y="2454154"/>
             <a:ext cx="704333" cy="9267"/>
           </a:xfrm>
           <a:prstGeom prst="straightConnector1">
@@ -6470,7 +6876,7 @@
         </p:nvSpPr>
         <p:spPr>
           <a:xfrm flipH="1">
-            <a:off x="376585" y="1468030"/>
+            <a:off x="376583" y="1295056"/>
             <a:ext cx="1523999" cy="646331"/>
           </a:xfrm>
           <a:prstGeom prst="rect">
@@ -6519,7 +6925,7 @@
         </p:nvSpPr>
         <p:spPr>
           <a:xfrm>
-            <a:off x="4493441" y="1468029"/>
+            <a:off x="4493440" y="1292959"/>
             <a:ext cx="1099752" cy="646331"/>
           </a:xfrm>
           <a:prstGeom prst="rect">
@@ -6568,7 +6974,7 @@
         </p:nvSpPr>
         <p:spPr>
           <a:xfrm>
-            <a:off x="4332804" y="2426635"/>
+            <a:off x="4332802" y="2148760"/>
             <a:ext cx="1421027" cy="543697"/>
           </a:xfrm>
           <a:prstGeom prst="flowChartProcess">
@@ -6617,7 +7023,7 @@
         </p:nvSpPr>
         <p:spPr>
           <a:xfrm>
-            <a:off x="6408740" y="2426635"/>
+            <a:off x="6408738" y="2148760"/>
             <a:ext cx="1421027" cy="543697"/>
           </a:xfrm>
           <a:prstGeom prst="flowChartProcess">
@@ -6673,7 +7079,7 @@
         </p:nvSpPr>
         <p:spPr>
           <a:xfrm>
-            <a:off x="8880091" y="2426635"/>
+            <a:off x="8787598" y="2148760"/>
             <a:ext cx="1421027" cy="543697"/>
           </a:xfrm>
           <a:prstGeom prst="flowChartProcess">
@@ -6724,7 +7130,7 @@
         </p:nvCxnSpPr>
         <p:spPr>
           <a:xfrm flipV="1">
-            <a:off x="3809702" y="2712462"/>
+            <a:off x="3834376" y="2454154"/>
             <a:ext cx="523102" cy="1"/>
           </a:xfrm>
           <a:prstGeom prst="straightConnector1">
@@ -6760,6 +7166,7 @@
             </a:extLst>
           </p:cNvPr>
           <p:cNvCxnSpPr>
+            <a:cxnSpLocks/>
             <a:stCxn id="18" idx="3"/>
             <a:endCxn id="20" idx="1"/>
           </p:cNvCxnSpPr>
@@ -6767,7 +7174,7 @@
         </p:nvCxnSpPr>
         <p:spPr>
           <a:xfrm>
-            <a:off x="5753831" y="2698484"/>
+            <a:off x="5753829" y="2420609"/>
             <a:ext cx="654909" cy="0"/>
           </a:xfrm>
           <a:prstGeom prst="straightConnector1">
@@ -6803,6 +7210,7 @@
             </a:extLst>
           </p:cNvPr>
           <p:cNvCxnSpPr>
+            <a:cxnSpLocks/>
             <a:stCxn id="20" idx="3"/>
             <a:endCxn id="21" idx="1"/>
           </p:cNvCxnSpPr>
@@ -6810,8 +7218,8 @@
         </p:nvCxnSpPr>
         <p:spPr>
           <a:xfrm>
-            <a:off x="7829767" y="2698484"/>
-            <a:ext cx="1050324" cy="0"/>
+            <a:off x="7829765" y="2420609"/>
+            <a:ext cx="957833" cy="0"/>
           </a:xfrm>
           <a:prstGeom prst="straightConnector1">
             <a:avLst/>
@@ -6836,6 +7244,815 @@
           </a:fontRef>
         </p:style>
       </p:cxnSp>
+      <p:sp>
+        <p:nvSpPr>
+          <p:cNvPr id="11" name="Process 10">
+            <a:extLst>
+              <a:ext uri="{FF2B5EF4-FFF2-40B4-BE49-F238E27FC236}">
+                <a16:creationId xmlns:a16="http://schemas.microsoft.com/office/drawing/2014/main" id="{26EE1E02-DDF6-9A0B-7F22-432023975F3A}"/>
+              </a:ext>
+            </a:extLst>
+          </p:cNvPr>
+          <p:cNvSpPr/>
+          <p:nvPr/>
+        </p:nvSpPr>
+        <p:spPr>
+          <a:xfrm>
+            <a:off x="189172" y="3500651"/>
+            <a:ext cx="1421027" cy="543697"/>
+          </a:xfrm>
+          <a:prstGeom prst="flowChartProcess">
+            <a:avLst/>
+          </a:prstGeom>
+        </p:spPr>
+        <p:style>
+          <a:lnRef idx="2">
+            <a:schemeClr val="accent1">
+              <a:shade val="50000"/>
+            </a:schemeClr>
+          </a:lnRef>
+          <a:fillRef idx="1">
+            <a:schemeClr val="accent1"/>
+          </a:fillRef>
+          <a:effectRef idx="0">
+            <a:schemeClr val="accent1"/>
+          </a:effectRef>
+          <a:fontRef idx="minor">
+            <a:schemeClr val="lt1"/>
+          </a:fontRef>
+        </p:style>
+        <p:txBody>
+          <a:bodyPr rtlCol="0" anchor="ctr"/>
+          <a:lstStyle/>
+          <a:p>
+            <a:pPr algn="ctr"/>
+            <a:r>
+              <a:rPr lang="en-US" sz="1200" dirty="0"/>
+              <a:t>Select Analytical Technique</a:t>
+            </a:r>
+          </a:p>
+        </p:txBody>
+      </p:sp>
+      <p:sp>
+        <p:nvSpPr>
+          <p:cNvPr id="16" name="TextBox 15">
+            <a:extLst>
+              <a:ext uri="{FF2B5EF4-FFF2-40B4-BE49-F238E27FC236}">
+                <a16:creationId xmlns:a16="http://schemas.microsoft.com/office/drawing/2014/main" id="{865FD07A-0BC6-A1CE-8D2C-4CF82835F3F9}"/>
+              </a:ext>
+            </a:extLst>
+          </p:cNvPr>
+          <p:cNvSpPr txBox="1"/>
+          <p:nvPr/>
+        </p:nvSpPr>
+        <p:spPr>
+          <a:xfrm flipH="1">
+            <a:off x="209767" y="4502420"/>
+            <a:ext cx="1523999" cy="646331"/>
+          </a:xfrm>
+          <a:prstGeom prst="rect">
+            <a:avLst/>
+          </a:prstGeom>
+          <a:noFill/>
+        </p:spPr>
+        <p:txBody>
+          <a:bodyPr wrap="square" rtlCol="0">
+            <a:spAutoFit/>
+          </a:bodyPr>
+          <a:lstStyle/>
+          <a:p>
+            <a:r>
+              <a:rPr lang="en-US" dirty="0">
+                <a:solidFill>
+                  <a:schemeClr val="accent1"/>
+                </a:solidFill>
+              </a:rPr>
+              <a:t>Step 3:</a:t>
+            </a:r>
+          </a:p>
+          <a:p>
+            <a:r>
+              <a:rPr lang="en-US" dirty="0">
+                <a:solidFill>
+                  <a:schemeClr val="accent1"/>
+                </a:solidFill>
+              </a:rPr>
+              <a:t>Analyze data</a:t>
+            </a:r>
+          </a:p>
+        </p:txBody>
+      </p:sp>
+      <p:sp>
+        <p:nvSpPr>
+          <p:cNvPr id="17" name="Process 16">
+            <a:extLst>
+              <a:ext uri="{FF2B5EF4-FFF2-40B4-BE49-F238E27FC236}">
+                <a16:creationId xmlns:a16="http://schemas.microsoft.com/office/drawing/2014/main" id="{ABBAF04A-CB61-C0FD-E6C0-52E96B05C165}"/>
+              </a:ext>
+            </a:extLst>
+          </p:cNvPr>
+          <p:cNvSpPr/>
+          <p:nvPr/>
+        </p:nvSpPr>
+        <p:spPr>
+          <a:xfrm>
+            <a:off x="2367871" y="3509666"/>
+            <a:ext cx="1421027" cy="543697"/>
+          </a:xfrm>
+          <a:prstGeom prst="flowChartProcess">
+            <a:avLst/>
+          </a:prstGeom>
+        </p:spPr>
+        <p:style>
+          <a:lnRef idx="2">
+            <a:schemeClr val="accent1">
+              <a:shade val="50000"/>
+            </a:schemeClr>
+          </a:lnRef>
+          <a:fillRef idx="1">
+            <a:schemeClr val="accent1"/>
+          </a:fillRef>
+          <a:effectRef idx="0">
+            <a:schemeClr val="accent1"/>
+          </a:effectRef>
+          <a:fontRef idx="minor">
+            <a:schemeClr val="lt1"/>
+          </a:fontRef>
+        </p:style>
+        <p:txBody>
+          <a:bodyPr rtlCol="0" anchor="ctr"/>
+          <a:lstStyle/>
+          <a:p>
+            <a:pPr algn="ctr"/>
+            <a:r>
+              <a:rPr lang="en-US" sz="1200" dirty="0"/>
+              <a:t>Select Estimator</a:t>
+            </a:r>
+          </a:p>
+        </p:txBody>
+      </p:sp>
+      <p:cxnSp>
+        <p:nvCxnSpPr>
+          <p:cNvPr id="27" name="Elbow Connector 26">
+            <a:extLst>
+              <a:ext uri="{FF2B5EF4-FFF2-40B4-BE49-F238E27FC236}">
+                <a16:creationId xmlns:a16="http://schemas.microsoft.com/office/drawing/2014/main" id="{7E87DFEB-25D7-6532-16F4-343CCA9C03DF}"/>
+              </a:ext>
+            </a:extLst>
+          </p:cNvPr>
+          <p:cNvCxnSpPr>
+            <a:stCxn id="21" idx="2"/>
+            <a:endCxn id="11" idx="0"/>
+          </p:cNvCxnSpPr>
+          <p:nvPr/>
+        </p:nvCxnSpPr>
+        <p:spPr>
+          <a:xfrm rot="5400000">
+            <a:off x="4794802" y="-1202659"/>
+            <a:ext cx="808194" cy="8598426"/>
+          </a:xfrm>
+          <a:prstGeom prst="bentConnector3">
+            <a:avLst/>
+          </a:prstGeom>
+          <a:ln w="12700">
+            <a:solidFill>
+              <a:schemeClr val="accent1"/>
+            </a:solidFill>
+            <a:headEnd w="lg" len="med"/>
+            <a:tailEnd type="triangle" w="lg" len="lg"/>
+          </a:ln>
+        </p:spPr>
+        <p:style>
+          <a:lnRef idx="1">
+            <a:schemeClr val="accent1"/>
+          </a:lnRef>
+          <a:fillRef idx="0">
+            <a:schemeClr val="accent1"/>
+          </a:fillRef>
+          <a:effectRef idx="0">
+            <a:schemeClr val="accent1"/>
+          </a:effectRef>
+          <a:fontRef idx="minor">
+            <a:schemeClr val="tx1"/>
+          </a:fontRef>
+        </p:style>
+      </p:cxnSp>
+      <p:cxnSp>
+        <p:nvCxnSpPr>
+          <p:cNvPr id="30" name="Straight Arrow Connector 29">
+            <a:extLst>
+              <a:ext uri="{FF2B5EF4-FFF2-40B4-BE49-F238E27FC236}">
+                <a16:creationId xmlns:a16="http://schemas.microsoft.com/office/drawing/2014/main" id="{1B8A2392-2CE9-3271-B523-DC5F50461B20}"/>
+              </a:ext>
+            </a:extLst>
+          </p:cNvPr>
+          <p:cNvCxnSpPr>
+            <a:stCxn id="11" idx="3"/>
+            <a:endCxn id="17" idx="1"/>
+          </p:cNvCxnSpPr>
+          <p:nvPr/>
+        </p:nvCxnSpPr>
+        <p:spPr>
+          <a:xfrm>
+            <a:off x="1610199" y="3772500"/>
+            <a:ext cx="757672" cy="9015"/>
+          </a:xfrm>
+          <a:prstGeom prst="straightConnector1">
+            <a:avLst/>
+          </a:prstGeom>
+          <a:ln w="12700">
+            <a:tailEnd type="triangle" w="lg" len="lg"/>
+          </a:ln>
+        </p:spPr>
+        <p:style>
+          <a:lnRef idx="1">
+            <a:schemeClr val="accent1"/>
+          </a:lnRef>
+          <a:fillRef idx="0">
+            <a:schemeClr val="accent1"/>
+          </a:fillRef>
+          <a:effectRef idx="0">
+            <a:schemeClr val="accent1"/>
+          </a:effectRef>
+          <a:fontRef idx="minor">
+            <a:schemeClr val="tx1"/>
+          </a:fontRef>
+        </p:style>
+      </p:cxnSp>
+      <p:sp>
+        <p:nvSpPr>
+          <p:cNvPr id="31" name="Process 30">
+            <a:extLst>
+              <a:ext uri="{FF2B5EF4-FFF2-40B4-BE49-F238E27FC236}">
+                <a16:creationId xmlns:a16="http://schemas.microsoft.com/office/drawing/2014/main" id="{2F0CEDCF-DC18-DC80-6916-E9C543EE104F}"/>
+              </a:ext>
+            </a:extLst>
+          </p:cNvPr>
+          <p:cNvSpPr/>
+          <p:nvPr/>
+        </p:nvSpPr>
+        <p:spPr>
+          <a:xfrm>
+            <a:off x="4332801" y="3532179"/>
+            <a:ext cx="1421027" cy="543697"/>
+          </a:xfrm>
+          <a:prstGeom prst="flowChartProcess">
+            <a:avLst/>
+          </a:prstGeom>
+        </p:spPr>
+        <p:style>
+          <a:lnRef idx="2">
+            <a:schemeClr val="accent1">
+              <a:shade val="50000"/>
+            </a:schemeClr>
+          </a:lnRef>
+          <a:fillRef idx="1">
+            <a:schemeClr val="accent1"/>
+          </a:fillRef>
+          <a:effectRef idx="0">
+            <a:schemeClr val="accent1"/>
+          </a:effectRef>
+          <a:fontRef idx="minor">
+            <a:schemeClr val="lt1"/>
+          </a:fontRef>
+        </p:style>
+        <p:txBody>
+          <a:bodyPr rtlCol="0" anchor="ctr"/>
+          <a:lstStyle/>
+          <a:p>
+            <a:pPr algn="ctr"/>
+            <a:r>
+              <a:rPr lang="en-US" sz="1200" dirty="0"/>
+              <a:t>Improve Model Performance</a:t>
+            </a:r>
+          </a:p>
+        </p:txBody>
+      </p:sp>
+      <p:sp>
+        <p:nvSpPr>
+          <p:cNvPr id="33" name="Process 32">
+            <a:extLst>
+              <a:ext uri="{FF2B5EF4-FFF2-40B4-BE49-F238E27FC236}">
+                <a16:creationId xmlns:a16="http://schemas.microsoft.com/office/drawing/2014/main" id="{AD424726-2661-DDE4-7491-8FEF7659C302}"/>
+              </a:ext>
+            </a:extLst>
+          </p:cNvPr>
+          <p:cNvSpPr/>
+          <p:nvPr/>
+        </p:nvSpPr>
+        <p:spPr>
+          <a:xfrm>
+            <a:off x="6408738" y="3532179"/>
+            <a:ext cx="1421027" cy="543697"/>
+          </a:xfrm>
+          <a:prstGeom prst="flowChartProcess">
+            <a:avLst/>
+          </a:prstGeom>
+        </p:spPr>
+        <p:style>
+          <a:lnRef idx="2">
+            <a:schemeClr val="accent1">
+              <a:shade val="50000"/>
+            </a:schemeClr>
+          </a:lnRef>
+          <a:fillRef idx="1">
+            <a:schemeClr val="accent1"/>
+          </a:fillRef>
+          <a:effectRef idx="0">
+            <a:schemeClr val="accent1"/>
+          </a:effectRef>
+          <a:fontRef idx="minor">
+            <a:schemeClr val="lt1"/>
+          </a:fontRef>
+        </p:style>
+        <p:txBody>
+          <a:bodyPr rtlCol="0" anchor="ctr"/>
+          <a:lstStyle/>
+          <a:p>
+            <a:pPr algn="ctr"/>
+            <a:r>
+              <a:rPr lang="en-US" sz="1200" dirty="0"/>
+              <a:t>Split Data for Testing and Training</a:t>
+            </a:r>
+          </a:p>
+        </p:txBody>
+      </p:sp>
+      <p:sp>
+        <p:nvSpPr>
+          <p:cNvPr id="34" name="Process 33">
+            <a:extLst>
+              <a:ext uri="{FF2B5EF4-FFF2-40B4-BE49-F238E27FC236}">
+                <a16:creationId xmlns:a16="http://schemas.microsoft.com/office/drawing/2014/main" id="{BD79562A-2590-7846-AFFA-8503F37C2082}"/>
+              </a:ext>
+            </a:extLst>
+          </p:cNvPr>
+          <p:cNvSpPr/>
+          <p:nvPr/>
+        </p:nvSpPr>
+        <p:spPr>
+          <a:xfrm>
+            <a:off x="8787597" y="3532179"/>
+            <a:ext cx="1421027" cy="543697"/>
+          </a:xfrm>
+          <a:prstGeom prst="flowChartProcess">
+            <a:avLst/>
+          </a:prstGeom>
+        </p:spPr>
+        <p:style>
+          <a:lnRef idx="2">
+            <a:schemeClr val="accent1">
+              <a:shade val="50000"/>
+            </a:schemeClr>
+          </a:lnRef>
+          <a:fillRef idx="1">
+            <a:schemeClr val="accent1"/>
+          </a:fillRef>
+          <a:effectRef idx="0">
+            <a:schemeClr val="accent1"/>
+          </a:effectRef>
+          <a:fontRef idx="minor">
+            <a:schemeClr val="lt1"/>
+          </a:fontRef>
+        </p:style>
+        <p:txBody>
+          <a:bodyPr rtlCol="0" anchor="ctr"/>
+          <a:lstStyle/>
+          <a:p>
+            <a:pPr algn="ctr"/>
+            <a:r>
+              <a:rPr lang="en-US" sz="1200" dirty="0"/>
+              <a:t>Train the Estimator</a:t>
+            </a:r>
+          </a:p>
+        </p:txBody>
+      </p:sp>
+      <p:sp>
+        <p:nvSpPr>
+          <p:cNvPr id="49" name="Process 48">
+            <a:extLst>
+              <a:ext uri="{FF2B5EF4-FFF2-40B4-BE49-F238E27FC236}">
+                <a16:creationId xmlns:a16="http://schemas.microsoft.com/office/drawing/2014/main" id="{15E36493-2FA1-AE9E-5726-5A9DD11D64F3}"/>
+              </a:ext>
+            </a:extLst>
+          </p:cNvPr>
+          <p:cNvSpPr/>
+          <p:nvPr/>
+        </p:nvSpPr>
+        <p:spPr>
+          <a:xfrm>
+            <a:off x="4332800" y="5107664"/>
+            <a:ext cx="1421027" cy="543697"/>
+          </a:xfrm>
+          <a:prstGeom prst="flowChartProcess">
+            <a:avLst/>
+          </a:prstGeom>
+        </p:spPr>
+        <p:style>
+          <a:lnRef idx="2">
+            <a:schemeClr val="accent1">
+              <a:shade val="50000"/>
+            </a:schemeClr>
+          </a:lnRef>
+          <a:fillRef idx="1">
+            <a:schemeClr val="accent1"/>
+          </a:fillRef>
+          <a:effectRef idx="0">
+            <a:schemeClr val="accent1"/>
+          </a:effectRef>
+          <a:fontRef idx="minor">
+            <a:schemeClr val="lt1"/>
+          </a:fontRef>
+        </p:style>
+        <p:txBody>
+          <a:bodyPr rtlCol="0" anchor="ctr"/>
+          <a:lstStyle/>
+          <a:p>
+            <a:pPr algn="ctr"/>
+            <a:r>
+              <a:rPr lang="en-US" sz="1200" dirty="0"/>
+              <a:t>Test the Estimator</a:t>
+            </a:r>
+          </a:p>
+        </p:txBody>
+      </p:sp>
+      <p:sp>
+        <p:nvSpPr>
+          <p:cNvPr id="50" name="Process 49">
+            <a:extLst>
+              <a:ext uri="{FF2B5EF4-FFF2-40B4-BE49-F238E27FC236}">
+                <a16:creationId xmlns:a16="http://schemas.microsoft.com/office/drawing/2014/main" id="{F7DCB537-8493-BF5A-E3A2-016117223BD1}"/>
+              </a:ext>
+            </a:extLst>
+          </p:cNvPr>
+          <p:cNvSpPr/>
+          <p:nvPr/>
+        </p:nvSpPr>
+        <p:spPr>
+          <a:xfrm>
+            <a:off x="6408738" y="4794376"/>
+            <a:ext cx="1944123" cy="1207476"/>
+          </a:xfrm>
+          <a:prstGeom prst="flowChartProcess">
+            <a:avLst/>
+          </a:prstGeom>
+        </p:spPr>
+        <p:style>
+          <a:lnRef idx="2">
+            <a:schemeClr val="accent1">
+              <a:shade val="50000"/>
+            </a:schemeClr>
+          </a:lnRef>
+          <a:fillRef idx="1">
+            <a:schemeClr val="accent1"/>
+          </a:fillRef>
+          <a:effectRef idx="0">
+            <a:schemeClr val="accent1"/>
+          </a:effectRef>
+          <a:fontRef idx="minor">
+            <a:schemeClr val="lt1"/>
+          </a:fontRef>
+        </p:style>
+        <p:txBody>
+          <a:bodyPr rtlCol="0" anchor="ctr"/>
+          <a:lstStyle/>
+          <a:p>
+            <a:pPr algn="ctr"/>
+            <a:r>
+              <a:rPr lang="en-US" sz="1200" u="sng" dirty="0"/>
+              <a:t>Assess Model Performance</a:t>
+            </a:r>
+          </a:p>
+          <a:p>
+            <a:pPr marL="171450" indent="-171450">
+              <a:buFont typeface="Arial" panose="020B0604020202020204" pitchFamily="34" charset="0"/>
+              <a:buChar char="•"/>
+            </a:pPr>
+            <a:r>
+              <a:rPr lang="en-US" sz="1200" dirty="0"/>
+              <a:t>Visualize Heart Failure predicted vs actual</a:t>
+            </a:r>
+          </a:p>
+          <a:p>
+            <a:pPr marL="171450" indent="-171450">
+              <a:buFont typeface="Arial" panose="020B0604020202020204" pitchFamily="34" charset="0"/>
+              <a:buChar char="•"/>
+            </a:pPr>
+            <a:r>
+              <a:rPr lang="en-US" sz="1200" dirty="0"/>
+              <a:t>Metrics</a:t>
+            </a:r>
+          </a:p>
+        </p:txBody>
+      </p:sp>
+      <p:cxnSp>
+        <p:nvCxnSpPr>
+          <p:cNvPr id="52" name="Straight Arrow Connector 51">
+            <a:extLst>
+              <a:ext uri="{FF2B5EF4-FFF2-40B4-BE49-F238E27FC236}">
+                <a16:creationId xmlns:a16="http://schemas.microsoft.com/office/drawing/2014/main" id="{267B12D9-FA03-9FFE-6448-26E4CFCE8075}"/>
+              </a:ext>
+            </a:extLst>
+          </p:cNvPr>
+          <p:cNvCxnSpPr>
+            <a:stCxn id="17" idx="3"/>
+            <a:endCxn id="31" idx="1"/>
+          </p:cNvCxnSpPr>
+          <p:nvPr/>
+        </p:nvCxnSpPr>
+        <p:spPr>
+          <a:xfrm>
+            <a:off x="3788898" y="3781515"/>
+            <a:ext cx="543903" cy="22513"/>
+          </a:xfrm>
+          <a:prstGeom prst="straightConnector1">
+            <a:avLst/>
+          </a:prstGeom>
+          <a:ln w="12700">
+            <a:tailEnd type="triangle" w="lg" len="lg"/>
+          </a:ln>
+        </p:spPr>
+        <p:style>
+          <a:lnRef idx="1">
+            <a:schemeClr val="accent1"/>
+          </a:lnRef>
+          <a:fillRef idx="0">
+            <a:schemeClr val="accent1"/>
+          </a:fillRef>
+          <a:effectRef idx="0">
+            <a:schemeClr val="accent1"/>
+          </a:effectRef>
+          <a:fontRef idx="minor">
+            <a:schemeClr val="tx1"/>
+          </a:fontRef>
+        </p:style>
+      </p:cxnSp>
+      <p:cxnSp>
+        <p:nvCxnSpPr>
+          <p:cNvPr id="54" name="Straight Arrow Connector 53">
+            <a:extLst>
+              <a:ext uri="{FF2B5EF4-FFF2-40B4-BE49-F238E27FC236}">
+                <a16:creationId xmlns:a16="http://schemas.microsoft.com/office/drawing/2014/main" id="{9477E611-791D-1697-F143-FF828152E506}"/>
+              </a:ext>
+            </a:extLst>
+          </p:cNvPr>
+          <p:cNvCxnSpPr>
+            <a:stCxn id="31" idx="3"/>
+            <a:endCxn id="33" idx="1"/>
+          </p:cNvCxnSpPr>
+          <p:nvPr/>
+        </p:nvCxnSpPr>
+        <p:spPr>
+          <a:xfrm>
+            <a:off x="5753828" y="3804028"/>
+            <a:ext cx="654910" cy="0"/>
+          </a:xfrm>
+          <a:prstGeom prst="straightConnector1">
+            <a:avLst/>
+          </a:prstGeom>
+          <a:ln w="12700">
+            <a:tailEnd type="triangle" w="lg" len="lg"/>
+          </a:ln>
+        </p:spPr>
+        <p:style>
+          <a:lnRef idx="1">
+            <a:schemeClr val="accent1"/>
+          </a:lnRef>
+          <a:fillRef idx="0">
+            <a:schemeClr val="accent1"/>
+          </a:fillRef>
+          <a:effectRef idx="0">
+            <a:schemeClr val="accent1"/>
+          </a:effectRef>
+          <a:fontRef idx="minor">
+            <a:schemeClr val="tx1"/>
+          </a:fontRef>
+        </p:style>
+      </p:cxnSp>
+      <p:cxnSp>
+        <p:nvCxnSpPr>
+          <p:cNvPr id="56" name="Straight Arrow Connector 55">
+            <a:extLst>
+              <a:ext uri="{FF2B5EF4-FFF2-40B4-BE49-F238E27FC236}">
+                <a16:creationId xmlns:a16="http://schemas.microsoft.com/office/drawing/2014/main" id="{8AB1E6FE-863F-5D0A-C7F6-E7FBC4DF9A35}"/>
+              </a:ext>
+            </a:extLst>
+          </p:cNvPr>
+          <p:cNvCxnSpPr>
+            <a:stCxn id="33" idx="3"/>
+            <a:endCxn id="34" idx="1"/>
+          </p:cNvCxnSpPr>
+          <p:nvPr/>
+        </p:nvCxnSpPr>
+        <p:spPr>
+          <a:xfrm>
+            <a:off x="7829765" y="3804028"/>
+            <a:ext cx="957832" cy="0"/>
+          </a:xfrm>
+          <a:prstGeom prst="straightConnector1">
+            <a:avLst/>
+          </a:prstGeom>
+          <a:ln w="12700">
+            <a:tailEnd type="triangle" w="lg" len="lg"/>
+          </a:ln>
+        </p:spPr>
+        <p:style>
+          <a:lnRef idx="1">
+            <a:schemeClr val="accent1"/>
+          </a:lnRef>
+          <a:fillRef idx="0">
+            <a:schemeClr val="accent1"/>
+          </a:fillRef>
+          <a:effectRef idx="0">
+            <a:schemeClr val="accent1"/>
+          </a:effectRef>
+          <a:fontRef idx="minor">
+            <a:schemeClr val="tx1"/>
+          </a:fontRef>
+        </p:style>
+      </p:cxnSp>
+      <p:cxnSp>
+        <p:nvCxnSpPr>
+          <p:cNvPr id="58" name="Elbow Connector 57">
+            <a:extLst>
+              <a:ext uri="{FF2B5EF4-FFF2-40B4-BE49-F238E27FC236}">
+                <a16:creationId xmlns:a16="http://schemas.microsoft.com/office/drawing/2014/main" id="{EDB5A60E-20E6-A1CA-F4B5-E72C92822775}"/>
+              </a:ext>
+            </a:extLst>
+          </p:cNvPr>
+          <p:cNvCxnSpPr>
+            <a:stCxn id="34" idx="2"/>
+            <a:endCxn id="49" idx="0"/>
+          </p:cNvCxnSpPr>
+          <p:nvPr/>
+        </p:nvCxnSpPr>
+        <p:spPr>
+          <a:xfrm rot="5400000">
+            <a:off x="6754819" y="2364372"/>
+            <a:ext cx="1031788" cy="4454797"/>
+          </a:xfrm>
+          <a:prstGeom prst="bentConnector3">
+            <a:avLst/>
+          </a:prstGeom>
+          <a:ln w="12700">
+            <a:tailEnd type="triangle" w="lg" len="lg"/>
+          </a:ln>
+        </p:spPr>
+        <p:style>
+          <a:lnRef idx="1">
+            <a:schemeClr val="accent1"/>
+          </a:lnRef>
+          <a:fillRef idx="0">
+            <a:schemeClr val="accent1"/>
+          </a:fillRef>
+          <a:effectRef idx="0">
+            <a:schemeClr val="accent1"/>
+          </a:effectRef>
+          <a:fontRef idx="minor">
+            <a:schemeClr val="tx1"/>
+          </a:fontRef>
+        </p:style>
+      </p:cxnSp>
+      <p:cxnSp>
+        <p:nvCxnSpPr>
+          <p:cNvPr id="60" name="Straight Arrow Connector 59">
+            <a:extLst>
+              <a:ext uri="{FF2B5EF4-FFF2-40B4-BE49-F238E27FC236}">
+                <a16:creationId xmlns:a16="http://schemas.microsoft.com/office/drawing/2014/main" id="{FFE20BA6-6EA3-2466-B708-E363F76C3A32}"/>
+              </a:ext>
+            </a:extLst>
+          </p:cNvPr>
+          <p:cNvCxnSpPr>
+            <a:cxnSpLocks/>
+            <a:stCxn id="49" idx="3"/>
+            <a:endCxn id="50" idx="1"/>
+          </p:cNvCxnSpPr>
+          <p:nvPr/>
+        </p:nvCxnSpPr>
+        <p:spPr>
+          <a:xfrm>
+            <a:off x="5753827" y="5379513"/>
+            <a:ext cx="654911" cy="18601"/>
+          </a:xfrm>
+          <a:prstGeom prst="straightConnector1">
+            <a:avLst/>
+          </a:prstGeom>
+          <a:ln w="12700">
+            <a:tailEnd type="triangle" w="lg" len="lg"/>
+          </a:ln>
+        </p:spPr>
+        <p:style>
+          <a:lnRef idx="1">
+            <a:schemeClr val="accent1"/>
+          </a:lnRef>
+          <a:fillRef idx="0">
+            <a:schemeClr val="accent1"/>
+          </a:fillRef>
+          <a:effectRef idx="0">
+            <a:schemeClr val="accent1"/>
+          </a:effectRef>
+          <a:fontRef idx="minor">
+            <a:schemeClr val="tx1"/>
+          </a:fontRef>
+        </p:style>
+      </p:cxnSp>
+      <p:sp>
+        <p:nvSpPr>
+          <p:cNvPr id="71" name="TextBox 70">
+            <a:extLst>
+              <a:ext uri="{FF2B5EF4-FFF2-40B4-BE49-F238E27FC236}">
+                <a16:creationId xmlns:a16="http://schemas.microsoft.com/office/drawing/2014/main" id="{49BCE533-8D0C-0BED-27BC-6C9ACAAEE772}"/>
+              </a:ext>
+            </a:extLst>
+          </p:cNvPr>
+          <p:cNvSpPr txBox="1"/>
+          <p:nvPr/>
+        </p:nvSpPr>
+        <p:spPr>
+          <a:xfrm flipH="1">
+            <a:off x="10704772" y="5005030"/>
+            <a:ext cx="955380" cy="646331"/>
+          </a:xfrm>
+          <a:prstGeom prst="rect">
+            <a:avLst/>
+          </a:prstGeom>
+          <a:noFill/>
+        </p:spPr>
+        <p:txBody>
+          <a:bodyPr wrap="square" rtlCol="0">
+            <a:spAutoFit/>
+          </a:bodyPr>
+          <a:lstStyle/>
+          <a:p>
+            <a:r>
+              <a:rPr lang="en-US" dirty="0">
+                <a:solidFill>
+                  <a:schemeClr val="accent1"/>
+                </a:solidFill>
+              </a:rPr>
+              <a:t>Step 5:</a:t>
+            </a:r>
+          </a:p>
+          <a:p>
+            <a:r>
+              <a:rPr lang="en-US" dirty="0">
+                <a:solidFill>
+                  <a:schemeClr val="accent1"/>
+                </a:solidFill>
+              </a:rPr>
+              <a:t>Act</a:t>
+            </a:r>
+          </a:p>
+        </p:txBody>
+      </p:sp>
+      <p:sp>
+        <p:nvSpPr>
+          <p:cNvPr id="72" name="TextBox 71">
+            <a:extLst>
+              <a:ext uri="{FF2B5EF4-FFF2-40B4-BE49-F238E27FC236}">
+                <a16:creationId xmlns:a16="http://schemas.microsoft.com/office/drawing/2014/main" id="{CF804398-C137-20BA-B400-3DE4FB472601}"/>
+              </a:ext>
+            </a:extLst>
+          </p:cNvPr>
+          <p:cNvSpPr txBox="1"/>
+          <p:nvPr/>
+        </p:nvSpPr>
+        <p:spPr>
+          <a:xfrm flipH="1">
+            <a:off x="9115139" y="5065647"/>
+            <a:ext cx="955598" cy="646331"/>
+          </a:xfrm>
+          <a:prstGeom prst="rect">
+            <a:avLst/>
+          </a:prstGeom>
+          <a:noFill/>
+        </p:spPr>
+        <p:txBody>
+          <a:bodyPr wrap="square" rtlCol="0">
+            <a:spAutoFit/>
+          </a:bodyPr>
+          <a:lstStyle/>
+          <a:p>
+            <a:r>
+              <a:rPr lang="en-US" dirty="0">
+                <a:solidFill>
+                  <a:schemeClr val="accent1"/>
+                </a:solidFill>
+              </a:rPr>
+              <a:t>Step 4:</a:t>
+            </a:r>
+          </a:p>
+          <a:p>
+            <a:r>
+              <a:rPr lang="en-US" dirty="0">
+                <a:solidFill>
+                  <a:schemeClr val="accent1"/>
+                </a:solidFill>
+              </a:rPr>
+              <a:t>Report</a:t>
+            </a:r>
+          </a:p>
+        </p:txBody>
+      </p:sp>
     </p:spTree>
     <p:extLst>
       <p:ext uri="{BB962C8B-B14F-4D97-AF65-F5344CB8AC3E}">
@@ -6896,34 +8113,6 @@
       </p:sp>
       <p:sp>
         <p:nvSpPr>
-          <p:cNvPr id="5" name="Footer Placeholder 4">
-            <a:extLst>
-              <a:ext uri="{FF2B5EF4-FFF2-40B4-BE49-F238E27FC236}">
-                <a16:creationId xmlns:a16="http://schemas.microsoft.com/office/drawing/2014/main" id="{E05174E8-A6F1-B722-21E7-1FEB9E988BD2}"/>
-              </a:ext>
-            </a:extLst>
-          </p:cNvPr>
-          <p:cNvSpPr>
-            <a:spLocks noGrp="1"/>
-          </p:cNvSpPr>
-          <p:nvPr>
-            <p:ph type="ftr" sz="quarter" idx="11"/>
-          </p:nvPr>
-        </p:nvSpPr>
-        <p:spPr/>
-        <p:txBody>
-          <a:bodyPr/>
-          <a:lstStyle/>
-          <a:p>
-            <a:r>
-              <a:rPr lang="en-US"/>
-              <a:t>E Rodriguez</a:t>
-            </a:r>
-          </a:p>
-        </p:txBody>
-      </p:sp>
-      <p:sp>
-        <p:nvSpPr>
           <p:cNvPr id="6" name="Slide Number Placeholder 5">
             <a:extLst>
               <a:ext uri="{FF2B5EF4-FFF2-40B4-BE49-F238E27FC236}">
@@ -7008,10 +8197,15 @@
             <p:ph idx="1"/>
           </p:nvPr>
         </p:nvSpPr>
-        <p:spPr/>
+        <p:spPr>
+          <a:xfrm>
+            <a:off x="8180173" y="1696156"/>
+            <a:ext cx="3803822" cy="4351338"/>
+          </a:xfrm>
+        </p:spPr>
         <p:txBody>
           <a:bodyPr>
-            <a:normAutofit/>
+            <a:noAutofit/>
           </a:bodyPr>
           <a:lstStyle/>
           <a:p>
@@ -7027,10 +8221,10 @@
             <a:r>
               <a:rPr lang="en-US" sz="1200" dirty="0">
                 <a:solidFill>
-                  <a:schemeClr val="accent1"/>
-                </a:solidFill>
-              </a:rPr>
-              <a:t>import pandas library</a:t>
+                  <a:schemeClr val="accent5"/>
+                </a:solidFill>
+              </a:rPr>
+              <a:t>  </a:t>
             </a:r>
           </a:p>
           <a:p>
@@ -7046,24 +8240,11 @@
             <a:r>
               <a:rPr lang="en-US" sz="1200" dirty="0">
                 <a:solidFill>
-                  <a:schemeClr val="accent1"/>
-                </a:solidFill>
-              </a:rPr>
-              <a:t>import </a:t>
-            </a:r>
-            <a:r>
-              <a:rPr lang="en-US" sz="1200" dirty="0" err="1">
-                <a:solidFill>
-                  <a:schemeClr val="accent1"/>
-                </a:solidFill>
-              </a:rPr>
-              <a:t>numpy</a:t>
-            </a:r>
-            <a:endParaRPr lang="en-US" sz="1200" dirty="0">
-              <a:solidFill>
-                <a:schemeClr val="accent1"/>
-              </a:solidFill>
-            </a:endParaRPr>
+                  <a:schemeClr val="accent5"/>
+                </a:solidFill>
+              </a:rPr>
+              <a:t>  # Fit the model</a:t>
+            </a:r>
           </a:p>
           <a:p>
             <a:pPr marL="0" indent="0">
@@ -7078,10 +8259,58 @@
             <a:r>
               <a:rPr lang="en-US" sz="1200" dirty="0">
                 <a:solidFill>
-                  <a:schemeClr val="accent1"/>
-                </a:solidFill>
-              </a:rPr>
-              <a:t>import matplotlib</a:t>
+                  <a:schemeClr val="accent5"/>
+                </a:solidFill>
+              </a:rPr>
+              <a:t>  </a:t>
+            </a:r>
+            <a:r>
+              <a:rPr lang="en-US" sz="1200" dirty="0" err="1">
+                <a:solidFill>
+                  <a:schemeClr val="accent5"/>
+                </a:solidFill>
+              </a:rPr>
+              <a:t>grid_search.fit</a:t>
+            </a:r>
+            <a:r>
+              <a:rPr lang="en-US" sz="1200" dirty="0">
+                <a:solidFill>
+                  <a:schemeClr val="accent5"/>
+                </a:solidFill>
+              </a:rPr>
+              <a:t>(</a:t>
+            </a:r>
+            <a:r>
+              <a:rPr lang="en-US" sz="1200" dirty="0" err="1">
+                <a:solidFill>
+                  <a:schemeClr val="accent5"/>
+                </a:solidFill>
+              </a:rPr>
+              <a:t>X_train_scaled</a:t>
+            </a:r>
+            <a:r>
+              <a:rPr lang="en-US" sz="1200" dirty="0">
+                <a:solidFill>
+                  <a:schemeClr val="accent5"/>
+                </a:solidFill>
+              </a:rPr>
+              <a:t>, </a:t>
+            </a:r>
+            <a:r>
+              <a:rPr lang="en-US" sz="1200" dirty="0" err="1">
+                <a:solidFill>
+                  <a:schemeClr val="accent5"/>
+                </a:solidFill>
+              </a:rPr>
+              <a:t>y_train</a:t>
+            </a:r>
+            <a:r>
+              <a:rPr lang="en-US" sz="1200" dirty="0">
+                <a:solidFill>
+                  <a:schemeClr val="accent5"/>
+                </a:solidFill>
+              </a:rPr>
+              <a:t>);</a:t>
             </a:r>
           </a:p>
           <a:p>
@@ -7096,7 +8325,7 @@
             </a:pPr>
             <a:endParaRPr lang="en-US" sz="1200" dirty="0">
               <a:solidFill>
-                <a:schemeClr val="accent1"/>
+                <a:schemeClr val="accent5"/>
               </a:solidFill>
             </a:endParaRPr>
           </a:p>
@@ -7113,10 +8342,10 @@
             <a:r>
               <a:rPr lang="en-US" sz="1200" dirty="0">
                 <a:solidFill>
-                  <a:schemeClr val="accent1"/>
-                </a:solidFill>
-              </a:rPr>
-              <a:t>1. Acquire Data</a:t>
+                  <a:schemeClr val="accent5"/>
+                </a:solidFill>
+              </a:rPr>
+              <a:t>  # Make a prediction on the test split to find model accuracy</a:t>
             </a:r>
           </a:p>
           <a:p>
@@ -7132,10 +8361,42 @@
             <a:r>
               <a:rPr lang="en-US" sz="1200" dirty="0">
                 <a:solidFill>
-                  <a:schemeClr val="accent1"/>
-                </a:solidFill>
-              </a:rPr>
-              <a:t># load data</a:t>
+                  <a:schemeClr val="accent5"/>
+                </a:solidFill>
+              </a:rPr>
+              <a:t>  predicted = </a:t>
+            </a:r>
+            <a:r>
+              <a:rPr lang="en-US" sz="1200" dirty="0" err="1">
+                <a:solidFill>
+                  <a:schemeClr val="accent5"/>
+                </a:solidFill>
+              </a:rPr>
+              <a:t>grid_search.predict</a:t>
+            </a:r>
+            <a:r>
+              <a:rPr lang="en-US" sz="1200" dirty="0">
+                <a:solidFill>
+                  <a:schemeClr val="accent5"/>
+                </a:solidFill>
+              </a:rPr>
+              <a:t>(</a:t>
+            </a:r>
+            <a:r>
+              <a:rPr lang="en-US" sz="1200" dirty="0" err="1">
+                <a:solidFill>
+                  <a:schemeClr val="accent5"/>
+                </a:solidFill>
+              </a:rPr>
+              <a:t>X_test_scaled</a:t>
+            </a:r>
+            <a:r>
+              <a:rPr lang="en-US" sz="1200" dirty="0">
+                <a:solidFill>
+                  <a:schemeClr val="accent5"/>
+                </a:solidFill>
+              </a:rPr>
+              <a:t>)</a:t>
             </a:r>
           </a:p>
           <a:p>
@@ -7151,40 +8412,43 @@
             <a:r>
               <a:rPr lang="en-US" sz="1200" dirty="0">
                 <a:solidFill>
-                  <a:schemeClr val="accent1"/>
-                </a:solidFill>
-              </a:rPr>
-              <a:t>df = pandas </a:t>
+                  <a:schemeClr val="accent5"/>
+                </a:solidFill>
+              </a:rPr>
+              <a:t>  acc = </a:t>
             </a:r>
             <a:r>
               <a:rPr lang="en-US" sz="1200" dirty="0" err="1">
                 <a:solidFill>
-                  <a:schemeClr val="accent1"/>
-                </a:solidFill>
-              </a:rPr>
-              <a:t>dataframe</a:t>
+                  <a:schemeClr val="accent5"/>
+                </a:solidFill>
+              </a:rPr>
+              <a:t>accuracy_score</a:t>
             </a:r>
             <a:r>
               <a:rPr lang="en-US" sz="1200" dirty="0">
                 <a:solidFill>
-                  <a:schemeClr val="accent1"/>
-                </a:solidFill>
-              </a:rPr>
-              <a:t>. </a:t>
+                  <a:schemeClr val="accent5"/>
+                </a:solidFill>
+              </a:rPr>
+              <a:t>(predicted, </a:t>
             </a:r>
             <a:r>
               <a:rPr lang="en-US" sz="1200" dirty="0" err="1">
                 <a:solidFill>
-                  <a:schemeClr val="accent1"/>
-                </a:solidFill>
-              </a:rPr>
-              <a:t>csv_dataset</a:t>
-            </a:r>
-            <a:endParaRPr lang="en-US" sz="1200" dirty="0">
-              <a:solidFill>
-                <a:schemeClr val="accent1"/>
-              </a:solidFill>
-            </a:endParaRPr>
+                  <a:schemeClr val="accent5"/>
+                </a:solidFill>
+              </a:rPr>
+              <a:t>y_test</a:t>
+            </a:r>
+            <a:r>
+              <a:rPr lang="en-US" sz="1200" dirty="0">
+                <a:solidFill>
+                  <a:schemeClr val="accent5"/>
+                </a:solidFill>
+              </a:rPr>
+              <a:t>)</a:t>
+            </a:r>
           </a:p>
           <a:p>
             <a:pPr marL="0" indent="0">
@@ -7199,10 +8463,26 @@
             <a:r>
               <a:rPr lang="en-US" sz="1200" dirty="0">
                 <a:solidFill>
-                  <a:schemeClr val="accent1"/>
-                </a:solidFill>
-              </a:rPr>
-              <a:t># verify data load check contents via head</a:t>
+                  <a:schemeClr val="accent5"/>
+                </a:solidFill>
+              </a:rPr>
+              <a:t>  </a:t>
+            </a:r>
+            <a:r>
+              <a:rPr lang="en-US" sz="1200" dirty="0" err="1">
+                <a:solidFill>
+                  <a:schemeClr val="accent5"/>
+                </a:solidFill>
+              </a:rPr>
+              <a:t>entries.append</a:t>
+            </a:r>
+            <a:r>
+              <a:rPr lang="en-US" sz="1200" dirty="0">
+                <a:solidFill>
+                  <a:schemeClr val="accent5"/>
+                </a:solidFill>
+              </a:rPr>
+              <a:t>(acc)</a:t>
             </a:r>
           </a:p>
           <a:p>
@@ -7215,17 +8495,9 @@
               </a:spcBef>
               <a:buNone/>
             </a:pPr>
-            <a:r>
-              <a:rPr lang="en-US" sz="1200" dirty="0" err="1">
-                <a:solidFill>
-                  <a:schemeClr val="accent1"/>
-                </a:solidFill>
-              </a:rPr>
-              <a:t>df.head</a:t>
-            </a:r>
             <a:endParaRPr lang="en-US" sz="1200" dirty="0">
               <a:solidFill>
-                <a:schemeClr val="accent1"/>
+                <a:schemeClr val="accent5"/>
               </a:solidFill>
             </a:endParaRPr>
           </a:p>
@@ -7239,11 +8511,30 @@
               </a:spcBef>
               <a:buNone/>
             </a:pPr>
-            <a:endParaRPr lang="en-US" sz="1300" dirty="0">
-              <a:solidFill>
-                <a:schemeClr val="accent1"/>
-              </a:solidFill>
-            </a:endParaRPr>
+            <a:r>
+              <a:rPr lang="en-US" sz="1200" dirty="0">
+                <a:solidFill>
+                  <a:schemeClr val="accent5"/>
+                </a:solidFill>
+              </a:rPr>
+              <a:t>  print(</a:t>
+            </a:r>
+            <a:r>
+              <a:rPr lang="en-US" sz="1200" dirty="0" err="1">
+                <a:solidFill>
+                  <a:schemeClr val="accent5"/>
+                </a:solidFill>
+              </a:rPr>
+              <a:t>grid_search.best_params</a:t>
+            </a:r>
+            <a:r>
+              <a:rPr lang="en-US" sz="1200" dirty="0">
+                <a:solidFill>
+                  <a:schemeClr val="accent5"/>
+                </a:solidFill>
+              </a:rPr>
+              <a:t>_)</a:t>
+            </a:r>
           </a:p>
           <a:p>
             <a:pPr marL="0" indent="0">
@@ -7255,14 +8546,11 @@
               </a:spcBef>
               <a:buNone/>
             </a:pPr>
-            <a:r>
-              <a:rPr lang="en-US" sz="1300" dirty="0">
-                <a:solidFill>
-                  <a:schemeClr val="accent1"/>
-                </a:solidFill>
-              </a:rPr>
-              <a:t>2. Prepare Data</a:t>
-            </a:r>
+            <a:endParaRPr lang="en-US" sz="1200" dirty="0">
+              <a:solidFill>
+                <a:schemeClr val="accent5"/>
+              </a:solidFill>
+            </a:endParaRPr>
           </a:p>
           <a:p>
             <a:pPr marL="0" indent="0">
@@ -7275,12 +8563,12 @@
               <a:buNone/>
             </a:pPr>
             <a:r>
-              <a:rPr lang="en-US" sz="1300" dirty="0">
-                <a:solidFill>
-                  <a:schemeClr val="accent1"/>
-                </a:solidFill>
-              </a:rPr>
-              <a:t># missing value check</a:t>
+              <a:rPr lang="en-US" sz="1200" dirty="0">
+                <a:solidFill>
+                  <a:schemeClr val="accent5"/>
+                </a:solidFill>
+              </a:rPr>
+              <a:t>  # If model have the highest accuracy, it's out best model</a:t>
             </a:r>
           </a:p>
           <a:p>
@@ -7294,18 +8582,29 @@
               <a:buNone/>
             </a:pPr>
             <a:r>
-              <a:rPr lang="en-US" sz="1300" dirty="0" err="1">
-                <a:solidFill>
-                  <a:schemeClr val="accent1"/>
-                </a:solidFill>
-              </a:rPr>
-              <a:t>df.isnull</a:t>
-            </a:r>
-            <a:endParaRPr lang="en-US" sz="1300" dirty="0">
-              <a:solidFill>
-                <a:schemeClr val="accent1"/>
-              </a:solidFill>
-            </a:endParaRPr>
+              <a:rPr lang="en-US" sz="1200" dirty="0">
+                <a:solidFill>
+                  <a:schemeClr val="accent5"/>
+                </a:solidFill>
+              </a:rPr>
+              <a:t>  if acc &gt; </a:t>
+            </a:r>
+            <a:r>
+              <a:rPr lang="en-US" sz="1200" dirty="0" err="1">
+                <a:solidFill>
+                  <a:schemeClr val="accent5"/>
+                </a:solidFill>
+              </a:rPr>
+              <a:t>highest_acc</a:t>
+            </a:r>
+            <a:r>
+              <a:rPr lang="en-US" sz="1200" dirty="0">
+                <a:solidFill>
+                  <a:schemeClr val="accent5"/>
+                </a:solidFill>
+              </a:rPr>
+              <a:t>:</a:t>
+            </a:r>
           </a:p>
           <a:p>
             <a:pPr marL="0" indent="0">
@@ -7318,12 +8617,28 @@
               <a:buNone/>
             </a:pPr>
             <a:r>
-              <a:rPr lang="en-US" sz="1300" dirty="0">
-                <a:solidFill>
-                  <a:schemeClr val="accent1"/>
-                </a:solidFill>
-              </a:rPr>
-              <a:t># Summary Stats</a:t>
+              <a:rPr lang="en-US" sz="1200" dirty="0">
+                <a:solidFill>
+                  <a:schemeClr val="accent5"/>
+                </a:solidFill>
+              </a:rPr>
+              <a:t>    </a:t>
+            </a:r>
+            <a:r>
+              <a:rPr lang="en-US" sz="1200" dirty="0" err="1">
+                <a:solidFill>
+                  <a:schemeClr val="accent5"/>
+                </a:solidFill>
+              </a:rPr>
+              <a:t>highest_acc</a:t>
+            </a:r>
+            <a:r>
+              <a:rPr lang="en-US" sz="1200" dirty="0">
+                <a:solidFill>
+                  <a:schemeClr val="accent5"/>
+                </a:solidFill>
+              </a:rPr>
+              <a:t> = acc</a:t>
             </a:r>
           </a:p>
           <a:p>
@@ -7337,16 +8652,40 @@
               <a:buNone/>
             </a:pPr>
             <a:r>
-              <a:rPr lang="en-US" sz="1300" dirty="0" err="1">
-                <a:solidFill>
-                  <a:schemeClr val="accent1"/>
-                </a:solidFill>
-              </a:rPr>
-              <a:t>df.describe</a:t>
-            </a:r>
-            <a:endParaRPr lang="en-US" sz="1300" dirty="0">
+              <a:rPr lang="en-US" sz="1200" dirty="0">
+                <a:solidFill>
+                  <a:schemeClr val="accent5"/>
+                </a:solidFill>
+              </a:rPr>
+              <a:t>    </a:t>
+            </a:r>
+            <a:r>
+              <a:rPr lang="en-US" sz="1200" dirty="0" err="1">
+                <a:solidFill>
+                  <a:schemeClr val="accent5"/>
+                </a:solidFill>
+              </a:rPr>
+              <a:t>best_model</a:t>
+            </a:r>
+            <a:r>
+              <a:rPr lang="en-US" sz="1200" dirty="0">
+                <a:solidFill>
+                  <a:schemeClr val="accent5"/>
+                </a:solidFill>
+              </a:rPr>
+              <a:t> = </a:t>
+            </a:r>
+            <a:r>
+              <a:rPr lang="en-US" sz="1200" dirty="0" err="1">
+                <a:solidFill>
+                  <a:schemeClr val="accent5"/>
+                </a:solidFill>
+              </a:rPr>
+              <a:t>grid_search</a:t>
+            </a:r>
+            <a:endParaRPr lang="en-US" sz="1200" dirty="0">
               <a:solidFill>
-                <a:schemeClr val="accent1"/>
+                <a:schemeClr val="accent5"/>
               </a:solidFill>
             </a:endParaRPr>
           </a:p>
@@ -7360,17 +8699,9 @@
               </a:spcBef>
               <a:buNone/>
             </a:pPr>
-            <a:r>
-              <a:rPr lang="en-US" sz="1300" dirty="0" err="1">
-                <a:solidFill>
-                  <a:schemeClr val="accent1"/>
-                </a:solidFill>
-              </a:rPr>
-              <a:t>df.info</a:t>
-            </a:r>
-            <a:endParaRPr lang="en-US" sz="1300" dirty="0">
+            <a:endParaRPr lang="en-US" sz="1200" dirty="0">
               <a:solidFill>
-                <a:schemeClr val="accent1"/>
+                <a:schemeClr val="accent5"/>
               </a:solidFill>
             </a:endParaRPr>
           </a:p>
@@ -7385,44 +8716,12 @@
               <a:buNone/>
             </a:pPr>
             <a:r>
-              <a:rPr lang="en-US" sz="1300" dirty="0">
-                <a:solidFill>
-                  <a:schemeClr val="accent1"/>
-                </a:solidFill>
-              </a:rPr>
-              <a:t>df = df[‘</a:t>
-            </a:r>
-            <a:r>
-              <a:rPr lang="en-US" sz="1300" dirty="0" err="1">
-                <a:solidFill>
-                  <a:schemeClr val="accent1"/>
-                </a:solidFill>
-              </a:rPr>
-              <a:t>cols_w_extreme_vlaues</a:t>
-            </a:r>
-            <a:r>
-              <a:rPr lang="en-US" sz="1300" dirty="0">
-                <a:solidFill>
-                  <a:schemeClr val="accent1"/>
-                </a:solidFill>
-              </a:rPr>
-              <a:t>’ &lt; </a:t>
-            </a:r>
-            <a:r>
-              <a:rPr lang="en-US" sz="1300" dirty="0" err="1">
-                <a:solidFill>
-                  <a:schemeClr val="accent1"/>
-                </a:solidFill>
-              </a:rPr>
-              <a:t>value_remove_outliers</a:t>
-            </a:r>
-            <a:r>
-              <a:rPr lang="en-US" sz="1300" dirty="0">
-                <a:solidFill>
-                  <a:schemeClr val="accent1"/>
-                </a:solidFill>
-              </a:rPr>
-              <a:t>]</a:t>
+              <a:rPr lang="en-US" sz="1200" dirty="0">
+                <a:solidFill>
+                  <a:schemeClr val="accent5"/>
+                </a:solidFill>
+              </a:rPr>
+              <a:t># Plot results</a:t>
             </a:r>
           </a:p>
           <a:p>
@@ -7436,22 +8735,231 @@
               <a:buNone/>
             </a:pPr>
             <a:r>
-              <a:rPr lang="en-US" sz="1300" dirty="0" err="1">
-                <a:solidFill>
-                  <a:schemeClr val="accent1"/>
-                </a:solidFill>
-              </a:rPr>
-              <a:t>sns.catplot</a:t>
-            </a:r>
-            <a:r>
-              <a:rPr lang="en-US" sz="1300" dirty="0">
-                <a:solidFill>
-                  <a:schemeClr val="accent1"/>
-                </a:solidFill>
-              </a:rPr>
-              <a:t> #all categorical variables</a:t>
-            </a:r>
-          </a:p>
+              <a:rPr lang="en-US" sz="1200" dirty="0" err="1">
+                <a:solidFill>
+                  <a:schemeClr val="accent5"/>
+                </a:solidFill>
+              </a:rPr>
+              <a:t>sns.barplot</a:t>
+            </a:r>
+            <a:r>
+              <a:rPr lang="en-US" sz="1200" dirty="0">
+                <a:solidFill>
+                  <a:schemeClr val="accent5"/>
+                </a:solidFill>
+              </a:rPr>
+              <a:t>(x='</a:t>
+            </a:r>
+            <a:r>
+              <a:rPr lang="en-US" sz="1200" dirty="0" err="1">
+                <a:solidFill>
+                  <a:schemeClr val="accent5"/>
+                </a:solidFill>
+              </a:rPr>
+              <a:t>Estimater</a:t>
+            </a:r>
+            <a:r>
+              <a:rPr lang="en-US" sz="1200" dirty="0">
+                <a:solidFill>
+                  <a:schemeClr val="accent5"/>
+                </a:solidFill>
+              </a:rPr>
+              <a:t>', y='Accuracy', data=df)</a:t>
+            </a:r>
+          </a:p>
+        </p:txBody>
+      </p:sp>
+      <p:sp>
+        <p:nvSpPr>
+          <p:cNvPr id="7" name="Content Placeholder 7">
+            <a:extLst>
+              <a:ext uri="{FF2B5EF4-FFF2-40B4-BE49-F238E27FC236}">
+                <a16:creationId xmlns:a16="http://schemas.microsoft.com/office/drawing/2014/main" id="{91C68350-4A52-E69E-F897-B59DB78B0946}"/>
+              </a:ext>
+            </a:extLst>
+          </p:cNvPr>
+          <p:cNvSpPr txBox="1">
+            <a:spLocks/>
+          </p:cNvSpPr>
+          <p:nvPr/>
+        </p:nvSpPr>
+        <p:spPr>
+          <a:xfrm>
+            <a:off x="113271" y="1847850"/>
+            <a:ext cx="3803821" cy="4351338"/>
+          </a:xfrm>
+          <a:prstGeom prst="rect">
+            <a:avLst/>
+          </a:prstGeom>
+        </p:spPr>
+        <p:txBody>
+          <a:bodyPr vert="horz" lIns="91440" tIns="45720" rIns="91440" bIns="45720" rtlCol="0">
+            <a:normAutofit/>
+          </a:bodyPr>
+          <a:lstStyle>
+            <a:lvl1pPr marL="228600" indent="-228600" algn="l" defTabSz="914400" rtl="0" eaLnBrk="1" latinLnBrk="0" hangingPunct="1">
+              <a:lnSpc>
+                <a:spcPct val="90000"/>
+              </a:lnSpc>
+              <a:spcBef>
+                <a:spcPts val="1000"/>
+              </a:spcBef>
+              <a:buFont typeface="Arial" panose="020B0604020202020204" pitchFamily="34" charset="0"/>
+              <a:buChar char="•"/>
+              <a:defRPr sz="2800" kern="1200">
+                <a:solidFill>
+                  <a:schemeClr val="tx1"/>
+                </a:solidFill>
+                <a:latin typeface="+mn-lt"/>
+                <a:ea typeface="+mn-ea"/>
+                <a:cs typeface="+mn-cs"/>
+              </a:defRPr>
+            </a:lvl1pPr>
+            <a:lvl2pPr marL="685800" indent="-228600" algn="l" defTabSz="914400" rtl="0" eaLnBrk="1" latinLnBrk="0" hangingPunct="1">
+              <a:lnSpc>
+                <a:spcPct val="90000"/>
+              </a:lnSpc>
+              <a:spcBef>
+                <a:spcPts val="500"/>
+              </a:spcBef>
+              <a:buFont typeface="Arial" panose="020B0604020202020204" pitchFamily="34" charset="0"/>
+              <a:buChar char="•"/>
+              <a:defRPr sz="2400" kern="1200">
+                <a:solidFill>
+                  <a:schemeClr val="tx1"/>
+                </a:solidFill>
+                <a:latin typeface="+mn-lt"/>
+                <a:ea typeface="+mn-ea"/>
+                <a:cs typeface="+mn-cs"/>
+              </a:defRPr>
+            </a:lvl2pPr>
+            <a:lvl3pPr marL="1143000" indent="-228600" algn="l" defTabSz="914400" rtl="0" eaLnBrk="1" latinLnBrk="0" hangingPunct="1">
+              <a:lnSpc>
+                <a:spcPct val="90000"/>
+              </a:lnSpc>
+              <a:spcBef>
+                <a:spcPts val="500"/>
+              </a:spcBef>
+              <a:buFont typeface="Arial" panose="020B0604020202020204" pitchFamily="34" charset="0"/>
+              <a:buChar char="•"/>
+              <a:defRPr sz="2000" kern="1200">
+                <a:solidFill>
+                  <a:schemeClr val="tx1"/>
+                </a:solidFill>
+                <a:latin typeface="+mn-lt"/>
+                <a:ea typeface="+mn-ea"/>
+                <a:cs typeface="+mn-cs"/>
+              </a:defRPr>
+            </a:lvl3pPr>
+            <a:lvl4pPr marL="1600200" indent="-228600" algn="l" defTabSz="914400" rtl="0" eaLnBrk="1" latinLnBrk="0" hangingPunct="1">
+              <a:lnSpc>
+                <a:spcPct val="90000"/>
+              </a:lnSpc>
+              <a:spcBef>
+                <a:spcPts val="500"/>
+              </a:spcBef>
+              <a:buFont typeface="Arial" panose="020B0604020202020204" pitchFamily="34" charset="0"/>
+              <a:buChar char="•"/>
+              <a:defRPr sz="1800" kern="1200">
+                <a:solidFill>
+                  <a:schemeClr val="tx1"/>
+                </a:solidFill>
+                <a:latin typeface="+mn-lt"/>
+                <a:ea typeface="+mn-ea"/>
+                <a:cs typeface="+mn-cs"/>
+              </a:defRPr>
+            </a:lvl4pPr>
+            <a:lvl5pPr marL="2057400" indent="-228600" algn="l" defTabSz="914400" rtl="0" eaLnBrk="1" latinLnBrk="0" hangingPunct="1">
+              <a:lnSpc>
+                <a:spcPct val="90000"/>
+              </a:lnSpc>
+              <a:spcBef>
+                <a:spcPts val="500"/>
+              </a:spcBef>
+              <a:buFont typeface="Arial" panose="020B0604020202020204" pitchFamily="34" charset="0"/>
+              <a:buChar char="•"/>
+              <a:defRPr sz="1800" kern="1200">
+                <a:solidFill>
+                  <a:schemeClr val="tx1"/>
+                </a:solidFill>
+                <a:latin typeface="+mn-lt"/>
+                <a:ea typeface="+mn-ea"/>
+                <a:cs typeface="+mn-cs"/>
+              </a:defRPr>
+            </a:lvl5pPr>
+            <a:lvl6pPr marL="2514600" indent="-228600" algn="l" defTabSz="914400" rtl="0" eaLnBrk="1" latinLnBrk="0" hangingPunct="1">
+              <a:lnSpc>
+                <a:spcPct val="90000"/>
+              </a:lnSpc>
+              <a:spcBef>
+                <a:spcPts val="500"/>
+              </a:spcBef>
+              <a:buFont typeface="Arial" panose="020B0604020202020204" pitchFamily="34" charset="0"/>
+              <a:buChar char="•"/>
+              <a:defRPr sz="1800" kern="1200">
+                <a:solidFill>
+                  <a:schemeClr val="tx1"/>
+                </a:solidFill>
+                <a:latin typeface="+mn-lt"/>
+                <a:ea typeface="+mn-ea"/>
+                <a:cs typeface="+mn-cs"/>
+              </a:defRPr>
+            </a:lvl6pPr>
+            <a:lvl7pPr marL="2971800" indent="-228600" algn="l" defTabSz="914400" rtl="0" eaLnBrk="1" latinLnBrk="0" hangingPunct="1">
+              <a:lnSpc>
+                <a:spcPct val="90000"/>
+              </a:lnSpc>
+              <a:spcBef>
+                <a:spcPts val="500"/>
+              </a:spcBef>
+              <a:buFont typeface="Arial" panose="020B0604020202020204" pitchFamily="34" charset="0"/>
+              <a:buChar char="•"/>
+              <a:defRPr sz="1800" kern="1200">
+                <a:solidFill>
+                  <a:schemeClr val="tx1"/>
+                </a:solidFill>
+                <a:latin typeface="+mn-lt"/>
+                <a:ea typeface="+mn-ea"/>
+                <a:cs typeface="+mn-cs"/>
+              </a:defRPr>
+            </a:lvl7pPr>
+            <a:lvl8pPr marL="3429000" indent="-228600" algn="l" defTabSz="914400" rtl="0" eaLnBrk="1" latinLnBrk="0" hangingPunct="1">
+              <a:lnSpc>
+                <a:spcPct val="90000"/>
+              </a:lnSpc>
+              <a:spcBef>
+                <a:spcPts val="500"/>
+              </a:spcBef>
+              <a:buFont typeface="Arial" panose="020B0604020202020204" pitchFamily="34" charset="0"/>
+              <a:buChar char="•"/>
+              <a:defRPr sz="1800" kern="1200">
+                <a:solidFill>
+                  <a:schemeClr val="tx1"/>
+                </a:solidFill>
+                <a:latin typeface="+mn-lt"/>
+                <a:ea typeface="+mn-ea"/>
+                <a:cs typeface="+mn-cs"/>
+              </a:defRPr>
+            </a:lvl8pPr>
+            <a:lvl9pPr marL="3886200" indent="-228600" algn="l" defTabSz="914400" rtl="0" eaLnBrk="1" latinLnBrk="0" hangingPunct="1">
+              <a:lnSpc>
+                <a:spcPct val="90000"/>
+              </a:lnSpc>
+              <a:spcBef>
+                <a:spcPts val="500"/>
+              </a:spcBef>
+              <a:buFont typeface="Arial" panose="020B0604020202020204" pitchFamily="34" charset="0"/>
+              <a:buChar char="•"/>
+              <a:defRPr sz="1800" kern="1200">
+                <a:solidFill>
+                  <a:schemeClr val="tx1"/>
+                </a:solidFill>
+                <a:latin typeface="+mn-lt"/>
+                <a:ea typeface="+mn-ea"/>
+                <a:cs typeface="+mn-cs"/>
+              </a:defRPr>
+            </a:lvl9pPr>
+          </a:lstStyle>
           <a:p>
             <a:pPr marL="0" indent="0">
               <a:lnSpc>
@@ -7460,14 +8968,471 @@
               <a:spcBef>
                 <a:spcPts val="0"/>
               </a:spcBef>
+              <a:buFont typeface="Arial" panose="020B0604020202020204" pitchFamily="34" charset="0"/>
               <a:buNone/>
             </a:pPr>
             <a:r>
+              <a:rPr lang="en-US" sz="1200" dirty="0">
+                <a:solidFill>
+                  <a:schemeClr val="accent1"/>
+                </a:solidFill>
+              </a:rPr>
+              <a:t>import pandas library</a:t>
+            </a:r>
+          </a:p>
+          <a:p>
+            <a:pPr marL="0" indent="0">
+              <a:lnSpc>
+                <a:spcPct val="100000"/>
+              </a:lnSpc>
+              <a:spcBef>
+                <a:spcPts val="0"/>
+              </a:spcBef>
+              <a:buFont typeface="Arial" panose="020B0604020202020204" pitchFamily="34" charset="0"/>
+              <a:buNone/>
+            </a:pPr>
+            <a:r>
+              <a:rPr lang="en-US" sz="1200" dirty="0">
+                <a:solidFill>
+                  <a:schemeClr val="accent1"/>
+                </a:solidFill>
+              </a:rPr>
+              <a:t>import </a:t>
+            </a:r>
+            <a:r>
+              <a:rPr lang="en-US" sz="1200" dirty="0" err="1">
+                <a:solidFill>
+                  <a:schemeClr val="accent1"/>
+                </a:solidFill>
+              </a:rPr>
+              <a:t>numpy</a:t>
+            </a:r>
+            <a:endParaRPr lang="en-US" sz="1200" dirty="0">
+              <a:solidFill>
+                <a:schemeClr val="accent1"/>
+              </a:solidFill>
+            </a:endParaRPr>
+          </a:p>
+          <a:p>
+            <a:pPr marL="0" indent="0">
+              <a:lnSpc>
+                <a:spcPct val="100000"/>
+              </a:lnSpc>
+              <a:spcBef>
+                <a:spcPts val="0"/>
+              </a:spcBef>
+              <a:buFont typeface="Arial" panose="020B0604020202020204" pitchFamily="34" charset="0"/>
+              <a:buNone/>
+            </a:pPr>
+            <a:r>
+              <a:rPr lang="en-US" sz="1200" dirty="0">
+                <a:solidFill>
+                  <a:schemeClr val="accent1"/>
+                </a:solidFill>
+              </a:rPr>
+              <a:t>import matplotlib</a:t>
+            </a:r>
+          </a:p>
+          <a:p>
+            <a:pPr marL="0" indent="0">
+              <a:lnSpc>
+                <a:spcPct val="100000"/>
+              </a:lnSpc>
+              <a:spcBef>
+                <a:spcPts val="0"/>
+              </a:spcBef>
+              <a:buFont typeface="Arial" panose="020B0604020202020204" pitchFamily="34" charset="0"/>
+              <a:buNone/>
+            </a:pPr>
+            <a:endParaRPr lang="en-US" sz="1200" dirty="0">
+              <a:solidFill>
+                <a:schemeClr val="accent1"/>
+              </a:solidFill>
+            </a:endParaRPr>
+          </a:p>
+          <a:p>
+            <a:pPr marL="0" indent="0">
+              <a:lnSpc>
+                <a:spcPct val="100000"/>
+              </a:lnSpc>
+              <a:spcBef>
+                <a:spcPts val="0"/>
+              </a:spcBef>
+              <a:buFont typeface="Arial" panose="020B0604020202020204" pitchFamily="34" charset="0"/>
+              <a:buNone/>
+            </a:pPr>
+            <a:r>
+              <a:rPr lang="en-US" sz="1200" dirty="0">
+                <a:solidFill>
+                  <a:schemeClr val="accent1"/>
+                </a:solidFill>
+              </a:rPr>
+              <a:t>1. Acquire Data</a:t>
+            </a:r>
+          </a:p>
+          <a:p>
+            <a:pPr marL="0" indent="0">
+              <a:lnSpc>
+                <a:spcPct val="100000"/>
+              </a:lnSpc>
+              <a:spcBef>
+                <a:spcPts val="0"/>
+              </a:spcBef>
+              <a:buFont typeface="Arial" panose="020B0604020202020204" pitchFamily="34" charset="0"/>
+              <a:buNone/>
+            </a:pPr>
+            <a:r>
+              <a:rPr lang="en-US" sz="1200" dirty="0">
+                <a:solidFill>
+                  <a:schemeClr val="accent1"/>
+                </a:solidFill>
+              </a:rPr>
+              <a:t># load data</a:t>
+            </a:r>
+          </a:p>
+          <a:p>
+            <a:pPr marL="0" indent="0">
+              <a:lnSpc>
+                <a:spcPct val="100000"/>
+              </a:lnSpc>
+              <a:spcBef>
+                <a:spcPts val="0"/>
+              </a:spcBef>
+              <a:buFont typeface="Arial" panose="020B0604020202020204" pitchFamily="34" charset="0"/>
+              <a:buNone/>
+            </a:pPr>
+            <a:r>
+              <a:rPr lang="en-US" sz="1200" dirty="0">
+                <a:solidFill>
+                  <a:schemeClr val="accent1"/>
+                </a:solidFill>
+              </a:rPr>
+              <a:t>df = pandas </a:t>
+            </a:r>
+            <a:r>
+              <a:rPr lang="en-US" sz="1200" dirty="0" err="1">
+                <a:solidFill>
+                  <a:schemeClr val="accent1"/>
+                </a:solidFill>
+              </a:rPr>
+              <a:t>dataframe</a:t>
+            </a:r>
+            <a:r>
+              <a:rPr lang="en-US" sz="1200" dirty="0">
+                <a:solidFill>
+                  <a:schemeClr val="accent1"/>
+                </a:solidFill>
+              </a:rPr>
+              <a:t>. </a:t>
+            </a:r>
+            <a:r>
+              <a:rPr lang="en-US" sz="1200" dirty="0" err="1">
+                <a:solidFill>
+                  <a:schemeClr val="accent1"/>
+                </a:solidFill>
+              </a:rPr>
+              <a:t>csv_dataset</a:t>
+            </a:r>
+            <a:endParaRPr lang="en-US" sz="1200" dirty="0">
+              <a:solidFill>
+                <a:schemeClr val="accent1"/>
+              </a:solidFill>
+            </a:endParaRPr>
+          </a:p>
+          <a:p>
+            <a:pPr marL="0" indent="0">
+              <a:lnSpc>
+                <a:spcPct val="100000"/>
+              </a:lnSpc>
+              <a:spcBef>
+                <a:spcPts val="0"/>
+              </a:spcBef>
+              <a:buFont typeface="Arial" panose="020B0604020202020204" pitchFamily="34" charset="0"/>
+              <a:buNone/>
+            </a:pPr>
+            <a:r>
+              <a:rPr lang="en-US" sz="1200" dirty="0">
+                <a:solidFill>
+                  <a:schemeClr val="accent1"/>
+                </a:solidFill>
+              </a:rPr>
+              <a:t># verify data load check contents via head</a:t>
+            </a:r>
+          </a:p>
+          <a:p>
+            <a:pPr marL="0" indent="0">
+              <a:lnSpc>
+                <a:spcPct val="100000"/>
+              </a:lnSpc>
+              <a:spcBef>
+                <a:spcPts val="0"/>
+              </a:spcBef>
+              <a:buFont typeface="Arial" panose="020B0604020202020204" pitchFamily="34" charset="0"/>
+              <a:buNone/>
+            </a:pPr>
+            <a:r>
+              <a:rPr lang="en-US" sz="1200" dirty="0" err="1">
+                <a:solidFill>
+                  <a:schemeClr val="accent1"/>
+                </a:solidFill>
+              </a:rPr>
+              <a:t>df.head</a:t>
+            </a:r>
+            <a:endParaRPr lang="en-US" sz="1200" dirty="0">
+              <a:solidFill>
+                <a:schemeClr val="accent1"/>
+              </a:solidFill>
+            </a:endParaRPr>
+          </a:p>
+          <a:p>
+            <a:pPr marL="0" indent="0">
+              <a:lnSpc>
+                <a:spcPct val="100000"/>
+              </a:lnSpc>
+              <a:spcBef>
+                <a:spcPts val="0"/>
+              </a:spcBef>
+              <a:buFont typeface="Arial" panose="020B0604020202020204" pitchFamily="34" charset="0"/>
+              <a:buNone/>
+            </a:pPr>
+            <a:endParaRPr lang="en-US" sz="1300" dirty="0">
+              <a:solidFill>
+                <a:schemeClr val="accent1"/>
+              </a:solidFill>
+            </a:endParaRPr>
+          </a:p>
+          <a:p>
+            <a:pPr marL="0" indent="0">
+              <a:lnSpc>
+                <a:spcPct val="100000"/>
+              </a:lnSpc>
+              <a:spcBef>
+                <a:spcPts val="0"/>
+              </a:spcBef>
+              <a:buFont typeface="Arial" panose="020B0604020202020204" pitchFamily="34" charset="0"/>
+              <a:buNone/>
+            </a:pPr>
+            <a:r>
+              <a:rPr lang="en-US" sz="1300" dirty="0">
+                <a:solidFill>
+                  <a:schemeClr val="accent1"/>
+                </a:solidFill>
+              </a:rPr>
+              <a:t>2. Prepare Data</a:t>
+            </a:r>
+          </a:p>
+          <a:p>
+            <a:pPr marL="0" indent="0">
+              <a:lnSpc>
+                <a:spcPct val="100000"/>
+              </a:lnSpc>
+              <a:spcBef>
+                <a:spcPts val="0"/>
+              </a:spcBef>
+              <a:buFont typeface="Arial" panose="020B0604020202020204" pitchFamily="34" charset="0"/>
+              <a:buNone/>
+            </a:pPr>
+            <a:r>
+              <a:rPr lang="en-US" sz="1300" dirty="0">
+                <a:solidFill>
+                  <a:schemeClr val="accent1"/>
+                </a:solidFill>
+              </a:rPr>
+              <a:t># missing value check</a:t>
+            </a:r>
+          </a:p>
+          <a:p>
+            <a:pPr marL="0" indent="0">
+              <a:lnSpc>
+                <a:spcPct val="100000"/>
+              </a:lnSpc>
+              <a:spcBef>
+                <a:spcPts val="0"/>
+              </a:spcBef>
+              <a:buFont typeface="Arial" panose="020B0604020202020204" pitchFamily="34" charset="0"/>
+              <a:buNone/>
+            </a:pPr>
+            <a:r>
               <a:rPr lang="en-US" sz="1300" dirty="0" err="1">
                 <a:solidFill>
                   <a:schemeClr val="accent1"/>
                 </a:solidFill>
               </a:rPr>
+              <a:t>df.isnull</a:t>
+            </a:r>
+            <a:endParaRPr lang="en-US" sz="1300" dirty="0">
+              <a:solidFill>
+                <a:schemeClr val="accent1"/>
+              </a:solidFill>
+            </a:endParaRPr>
+          </a:p>
+          <a:p>
+            <a:pPr marL="0" indent="0">
+              <a:lnSpc>
+                <a:spcPct val="100000"/>
+              </a:lnSpc>
+              <a:spcBef>
+                <a:spcPts val="0"/>
+              </a:spcBef>
+              <a:buFont typeface="Arial" panose="020B0604020202020204" pitchFamily="34" charset="0"/>
+              <a:buNone/>
+            </a:pPr>
+            <a:r>
+              <a:rPr lang="en-US" sz="1300" dirty="0">
+                <a:solidFill>
+                  <a:schemeClr val="accent1"/>
+                </a:solidFill>
+              </a:rPr>
+              <a:t># Summary Stats</a:t>
+            </a:r>
+          </a:p>
+          <a:p>
+            <a:pPr marL="0" indent="0">
+              <a:lnSpc>
+                <a:spcPct val="100000"/>
+              </a:lnSpc>
+              <a:spcBef>
+                <a:spcPts val="0"/>
+              </a:spcBef>
+              <a:buFont typeface="Arial" panose="020B0604020202020204" pitchFamily="34" charset="0"/>
+              <a:buNone/>
+            </a:pPr>
+            <a:r>
+              <a:rPr lang="en-US" sz="1300" dirty="0" err="1">
+                <a:solidFill>
+                  <a:schemeClr val="accent1"/>
+                </a:solidFill>
+              </a:rPr>
+              <a:t>df.describe</a:t>
+            </a:r>
+            <a:endParaRPr lang="en-US" sz="1300" dirty="0">
+              <a:solidFill>
+                <a:schemeClr val="accent1"/>
+              </a:solidFill>
+            </a:endParaRPr>
+          </a:p>
+          <a:p>
+            <a:pPr marL="0" indent="0">
+              <a:lnSpc>
+                <a:spcPct val="100000"/>
+              </a:lnSpc>
+              <a:spcBef>
+                <a:spcPts val="0"/>
+              </a:spcBef>
+              <a:buFont typeface="Arial" panose="020B0604020202020204" pitchFamily="34" charset="0"/>
+              <a:buNone/>
+            </a:pPr>
+            <a:r>
+              <a:rPr lang="en-US" sz="1300" dirty="0" err="1">
+                <a:solidFill>
+                  <a:schemeClr val="accent1"/>
+                </a:solidFill>
+              </a:rPr>
+              <a:t>df.info</a:t>
+            </a:r>
+            <a:endParaRPr lang="en-US" sz="1300" dirty="0">
+              <a:solidFill>
+                <a:schemeClr val="accent1"/>
+              </a:solidFill>
+            </a:endParaRPr>
+          </a:p>
+          <a:p>
+            <a:pPr marL="0" indent="0">
+              <a:lnSpc>
+                <a:spcPct val="100000"/>
+              </a:lnSpc>
+              <a:spcBef>
+                <a:spcPts val="0"/>
+              </a:spcBef>
+              <a:buFont typeface="Arial" panose="020B0604020202020204" pitchFamily="34" charset="0"/>
+              <a:buNone/>
+            </a:pPr>
+            <a:r>
+              <a:rPr lang="en-US" sz="1300" dirty="0">
+                <a:solidFill>
+                  <a:schemeClr val="accent1"/>
+                </a:solidFill>
+              </a:rPr>
+              <a:t>df = df[‘</a:t>
+            </a:r>
+            <a:r>
+              <a:rPr lang="en-US" sz="1300" dirty="0" err="1">
+                <a:solidFill>
+                  <a:schemeClr val="accent1"/>
+                </a:solidFill>
+              </a:rPr>
+              <a:t>cols_w_extreme_vlaues</a:t>
+            </a:r>
+            <a:r>
+              <a:rPr lang="en-US" sz="1300" dirty="0">
+                <a:solidFill>
+                  <a:schemeClr val="accent1"/>
+                </a:solidFill>
+              </a:rPr>
+              <a:t>’ &lt; </a:t>
+            </a:r>
+            <a:r>
+              <a:rPr lang="en-US" sz="1300" dirty="0" err="1">
+                <a:solidFill>
+                  <a:schemeClr val="accent1"/>
+                </a:solidFill>
+              </a:rPr>
+              <a:t>value_remove_outliers</a:t>
+            </a:r>
+            <a:r>
+              <a:rPr lang="en-US" sz="1300" dirty="0">
+                <a:solidFill>
+                  <a:schemeClr val="accent1"/>
+                </a:solidFill>
+              </a:rPr>
+              <a:t>]</a:t>
+            </a:r>
+          </a:p>
+          <a:p>
+            <a:pPr marL="0" indent="0">
+              <a:lnSpc>
+                <a:spcPct val="100000"/>
+              </a:lnSpc>
+              <a:spcBef>
+                <a:spcPts val="0"/>
+              </a:spcBef>
+              <a:buFont typeface="Arial" panose="020B0604020202020204" pitchFamily="34" charset="0"/>
+              <a:buNone/>
+            </a:pPr>
+            <a:r>
+              <a:rPr lang="en-US" sz="1300" dirty="0" err="1">
+                <a:solidFill>
+                  <a:schemeClr val="accent1"/>
+                </a:solidFill>
+              </a:rPr>
+              <a:t>sns.catplot</a:t>
+            </a:r>
+            <a:r>
+              <a:rPr lang="en-US" sz="1300" dirty="0">
+                <a:solidFill>
+                  <a:schemeClr val="accent1"/>
+                </a:solidFill>
+              </a:rPr>
+              <a:t> #all categorical variables</a:t>
+            </a:r>
+          </a:p>
+          <a:p>
+            <a:pPr marL="0" indent="0">
+              <a:lnSpc>
+                <a:spcPct val="100000"/>
+              </a:lnSpc>
+              <a:spcBef>
+                <a:spcPts val="0"/>
+              </a:spcBef>
+              <a:buFont typeface="Arial" panose="020B0604020202020204" pitchFamily="34" charset="0"/>
+              <a:buNone/>
+            </a:pPr>
+            <a:r>
+              <a:rPr lang="en-US" sz="1300" dirty="0" err="1">
+                <a:solidFill>
+                  <a:schemeClr val="accent1"/>
+                </a:solidFill>
+              </a:rPr>
               <a:t>sns.boxplot</a:t>
             </a:r>
             <a:r>
@@ -7482,15 +9447,878 @@
           </a:p>
           <a:p>
             <a:pPr marL="0" indent="0">
+              <a:buFont typeface="Arial" panose="020B0604020202020204" pitchFamily="34" charset="0"/>
               <a:buNone/>
             </a:pPr>
             <a:endParaRPr lang="en-US" dirty="0"/>
           </a:p>
           <a:p>
             <a:pPr marL="0" indent="0">
+              <a:buFont typeface="Arial" panose="020B0604020202020204" pitchFamily="34" charset="0"/>
               <a:buNone/>
             </a:pPr>
             <a:endParaRPr lang="en-US" dirty="0"/>
+          </a:p>
+        </p:txBody>
+      </p:sp>
+      <p:sp>
+        <p:nvSpPr>
+          <p:cNvPr id="12" name="Content Placeholder 7">
+            <a:extLst>
+              <a:ext uri="{FF2B5EF4-FFF2-40B4-BE49-F238E27FC236}">
+                <a16:creationId xmlns:a16="http://schemas.microsoft.com/office/drawing/2014/main" id="{01D9FC00-1FAB-1EFE-56D8-6881139817A2}"/>
+              </a:ext>
+            </a:extLst>
+          </p:cNvPr>
+          <p:cNvSpPr txBox="1">
+            <a:spLocks/>
+          </p:cNvSpPr>
+          <p:nvPr/>
+        </p:nvSpPr>
+        <p:spPr>
+          <a:xfrm>
+            <a:off x="4191001" y="1843088"/>
+            <a:ext cx="3803822" cy="4351338"/>
+          </a:xfrm>
+          <a:prstGeom prst="rect">
+            <a:avLst/>
+          </a:prstGeom>
+        </p:spPr>
+        <p:txBody>
+          <a:bodyPr vert="horz" lIns="91440" tIns="45720" rIns="91440" bIns="45720" rtlCol="0">
+            <a:noAutofit/>
+          </a:bodyPr>
+          <a:lstStyle>
+            <a:lvl1pPr marL="228600" indent="-228600" algn="l" defTabSz="914400" rtl="0" eaLnBrk="1" latinLnBrk="0" hangingPunct="1">
+              <a:lnSpc>
+                <a:spcPct val="90000"/>
+              </a:lnSpc>
+              <a:spcBef>
+                <a:spcPts val="1000"/>
+              </a:spcBef>
+              <a:buFont typeface="Arial" panose="020B0604020202020204" pitchFamily="34" charset="0"/>
+              <a:buChar char="•"/>
+              <a:defRPr sz="2800" kern="1200">
+                <a:solidFill>
+                  <a:schemeClr val="tx1"/>
+                </a:solidFill>
+                <a:latin typeface="+mn-lt"/>
+                <a:ea typeface="+mn-ea"/>
+                <a:cs typeface="+mn-cs"/>
+              </a:defRPr>
+            </a:lvl1pPr>
+            <a:lvl2pPr marL="685800" indent="-228600" algn="l" defTabSz="914400" rtl="0" eaLnBrk="1" latinLnBrk="0" hangingPunct="1">
+              <a:lnSpc>
+                <a:spcPct val="90000"/>
+              </a:lnSpc>
+              <a:spcBef>
+                <a:spcPts val="500"/>
+              </a:spcBef>
+              <a:buFont typeface="Arial" panose="020B0604020202020204" pitchFamily="34" charset="0"/>
+              <a:buChar char="•"/>
+              <a:defRPr sz="2400" kern="1200">
+                <a:solidFill>
+                  <a:schemeClr val="tx1"/>
+                </a:solidFill>
+                <a:latin typeface="+mn-lt"/>
+                <a:ea typeface="+mn-ea"/>
+                <a:cs typeface="+mn-cs"/>
+              </a:defRPr>
+            </a:lvl2pPr>
+            <a:lvl3pPr marL="1143000" indent="-228600" algn="l" defTabSz="914400" rtl="0" eaLnBrk="1" latinLnBrk="0" hangingPunct="1">
+              <a:lnSpc>
+                <a:spcPct val="90000"/>
+              </a:lnSpc>
+              <a:spcBef>
+                <a:spcPts val="500"/>
+              </a:spcBef>
+              <a:buFont typeface="Arial" panose="020B0604020202020204" pitchFamily="34" charset="0"/>
+              <a:buChar char="•"/>
+              <a:defRPr sz="2000" kern="1200">
+                <a:solidFill>
+                  <a:schemeClr val="tx1"/>
+                </a:solidFill>
+                <a:latin typeface="+mn-lt"/>
+                <a:ea typeface="+mn-ea"/>
+                <a:cs typeface="+mn-cs"/>
+              </a:defRPr>
+            </a:lvl3pPr>
+            <a:lvl4pPr marL="1600200" indent="-228600" algn="l" defTabSz="914400" rtl="0" eaLnBrk="1" latinLnBrk="0" hangingPunct="1">
+              <a:lnSpc>
+                <a:spcPct val="90000"/>
+              </a:lnSpc>
+              <a:spcBef>
+                <a:spcPts val="500"/>
+              </a:spcBef>
+              <a:buFont typeface="Arial" panose="020B0604020202020204" pitchFamily="34" charset="0"/>
+              <a:buChar char="•"/>
+              <a:defRPr sz="1800" kern="1200">
+                <a:solidFill>
+                  <a:schemeClr val="tx1"/>
+                </a:solidFill>
+                <a:latin typeface="+mn-lt"/>
+                <a:ea typeface="+mn-ea"/>
+                <a:cs typeface="+mn-cs"/>
+              </a:defRPr>
+            </a:lvl4pPr>
+            <a:lvl5pPr marL="2057400" indent="-228600" algn="l" defTabSz="914400" rtl="0" eaLnBrk="1" latinLnBrk="0" hangingPunct="1">
+              <a:lnSpc>
+                <a:spcPct val="90000"/>
+              </a:lnSpc>
+              <a:spcBef>
+                <a:spcPts val="500"/>
+              </a:spcBef>
+              <a:buFont typeface="Arial" panose="020B0604020202020204" pitchFamily="34" charset="0"/>
+              <a:buChar char="•"/>
+              <a:defRPr sz="1800" kern="1200">
+                <a:solidFill>
+                  <a:schemeClr val="tx1"/>
+                </a:solidFill>
+                <a:latin typeface="+mn-lt"/>
+                <a:ea typeface="+mn-ea"/>
+                <a:cs typeface="+mn-cs"/>
+              </a:defRPr>
+            </a:lvl5pPr>
+            <a:lvl6pPr marL="2514600" indent="-228600" algn="l" defTabSz="914400" rtl="0" eaLnBrk="1" latinLnBrk="0" hangingPunct="1">
+              <a:lnSpc>
+                <a:spcPct val="90000"/>
+              </a:lnSpc>
+              <a:spcBef>
+                <a:spcPts val="500"/>
+              </a:spcBef>
+              <a:buFont typeface="Arial" panose="020B0604020202020204" pitchFamily="34" charset="0"/>
+              <a:buChar char="•"/>
+              <a:defRPr sz="1800" kern="1200">
+                <a:solidFill>
+                  <a:schemeClr val="tx1"/>
+                </a:solidFill>
+                <a:latin typeface="+mn-lt"/>
+                <a:ea typeface="+mn-ea"/>
+                <a:cs typeface="+mn-cs"/>
+              </a:defRPr>
+            </a:lvl6pPr>
+            <a:lvl7pPr marL="2971800" indent="-228600" algn="l" defTabSz="914400" rtl="0" eaLnBrk="1" latinLnBrk="0" hangingPunct="1">
+              <a:lnSpc>
+                <a:spcPct val="90000"/>
+              </a:lnSpc>
+              <a:spcBef>
+                <a:spcPts val="500"/>
+              </a:spcBef>
+              <a:buFont typeface="Arial" panose="020B0604020202020204" pitchFamily="34" charset="0"/>
+              <a:buChar char="•"/>
+              <a:defRPr sz="1800" kern="1200">
+                <a:solidFill>
+                  <a:schemeClr val="tx1"/>
+                </a:solidFill>
+                <a:latin typeface="+mn-lt"/>
+                <a:ea typeface="+mn-ea"/>
+                <a:cs typeface="+mn-cs"/>
+              </a:defRPr>
+            </a:lvl7pPr>
+            <a:lvl8pPr marL="3429000" indent="-228600" algn="l" defTabSz="914400" rtl="0" eaLnBrk="1" latinLnBrk="0" hangingPunct="1">
+              <a:lnSpc>
+                <a:spcPct val="90000"/>
+              </a:lnSpc>
+              <a:spcBef>
+                <a:spcPts val="500"/>
+              </a:spcBef>
+              <a:buFont typeface="Arial" panose="020B0604020202020204" pitchFamily="34" charset="0"/>
+              <a:buChar char="•"/>
+              <a:defRPr sz="1800" kern="1200">
+                <a:solidFill>
+                  <a:schemeClr val="tx1"/>
+                </a:solidFill>
+                <a:latin typeface="+mn-lt"/>
+                <a:ea typeface="+mn-ea"/>
+                <a:cs typeface="+mn-cs"/>
+              </a:defRPr>
+            </a:lvl8pPr>
+            <a:lvl9pPr marL="3886200" indent="-228600" algn="l" defTabSz="914400" rtl="0" eaLnBrk="1" latinLnBrk="0" hangingPunct="1">
+              <a:lnSpc>
+                <a:spcPct val="90000"/>
+              </a:lnSpc>
+              <a:spcBef>
+                <a:spcPts val="500"/>
+              </a:spcBef>
+              <a:buFont typeface="Arial" panose="020B0604020202020204" pitchFamily="34" charset="0"/>
+              <a:buChar char="•"/>
+              <a:defRPr sz="1800" kern="1200">
+                <a:solidFill>
+                  <a:schemeClr val="tx1"/>
+                </a:solidFill>
+                <a:latin typeface="+mn-lt"/>
+                <a:ea typeface="+mn-ea"/>
+                <a:cs typeface="+mn-cs"/>
+              </a:defRPr>
+            </a:lvl9pPr>
+          </a:lstStyle>
+          <a:p>
+            <a:pPr marL="0" indent="0">
+              <a:lnSpc>
+                <a:spcPct val="100000"/>
+              </a:lnSpc>
+              <a:spcBef>
+                <a:spcPts val="0"/>
+              </a:spcBef>
+              <a:buFont typeface="Arial" panose="020B0604020202020204" pitchFamily="34" charset="0"/>
+              <a:buNone/>
+            </a:pPr>
+            <a:endParaRPr lang="en-US" sz="1200" dirty="0">
+              <a:solidFill>
+                <a:schemeClr val="accent5"/>
+              </a:solidFill>
+            </a:endParaRPr>
+          </a:p>
+          <a:p>
+            <a:pPr marL="0" indent="0">
+              <a:lnSpc>
+                <a:spcPct val="100000"/>
+              </a:lnSpc>
+              <a:spcBef>
+                <a:spcPts val="0"/>
+              </a:spcBef>
+              <a:buFont typeface="Arial" panose="020B0604020202020204" pitchFamily="34" charset="0"/>
+              <a:buNone/>
+            </a:pPr>
+            <a:r>
+              <a:rPr lang="en-US" sz="1200" dirty="0">
+                <a:solidFill>
+                  <a:schemeClr val="accent5"/>
+                </a:solidFill>
+              </a:rPr>
+              <a:t>3. Analyze</a:t>
+            </a:r>
+          </a:p>
+          <a:p>
+            <a:pPr marL="0" indent="0">
+              <a:lnSpc>
+                <a:spcPct val="100000"/>
+              </a:lnSpc>
+              <a:spcBef>
+                <a:spcPts val="0"/>
+              </a:spcBef>
+              <a:buFont typeface="Arial" panose="020B0604020202020204" pitchFamily="34" charset="0"/>
+              <a:buNone/>
+            </a:pPr>
+            <a:r>
+              <a:rPr lang="en-US" sz="1200" dirty="0">
+                <a:solidFill>
+                  <a:schemeClr val="accent5"/>
+                </a:solidFill>
+              </a:rPr>
+              <a:t>#Split Data for training and testing</a:t>
+            </a:r>
+          </a:p>
+          <a:p>
+            <a:pPr marL="0" indent="0">
+              <a:lnSpc>
+                <a:spcPct val="100000"/>
+              </a:lnSpc>
+              <a:spcBef>
+                <a:spcPts val="0"/>
+              </a:spcBef>
+              <a:buFont typeface="Arial" panose="020B0604020202020204" pitchFamily="34" charset="0"/>
+              <a:buNone/>
+            </a:pPr>
+            <a:r>
+              <a:rPr lang="en-US" sz="1200" dirty="0" err="1">
+                <a:solidFill>
+                  <a:schemeClr val="accent5"/>
+                </a:solidFill>
+              </a:rPr>
+              <a:t>X_train</a:t>
+            </a:r>
+            <a:r>
+              <a:rPr lang="en-US" sz="1200" dirty="0">
+                <a:solidFill>
+                  <a:schemeClr val="accent5"/>
+                </a:solidFill>
+              </a:rPr>
+              <a:t>, </a:t>
+            </a:r>
+            <a:r>
+              <a:rPr lang="en-US" sz="1200" dirty="0" err="1">
+                <a:solidFill>
+                  <a:schemeClr val="accent5"/>
+                </a:solidFill>
+              </a:rPr>
+              <a:t>X_test</a:t>
+            </a:r>
+            <a:r>
+              <a:rPr lang="en-US" sz="1200" dirty="0">
+                <a:solidFill>
+                  <a:schemeClr val="accent5"/>
+                </a:solidFill>
+              </a:rPr>
+              <a:t>, </a:t>
+            </a:r>
+            <a:r>
+              <a:rPr lang="en-US" sz="1200" dirty="0" err="1">
+                <a:solidFill>
+                  <a:schemeClr val="accent5"/>
+                </a:solidFill>
+              </a:rPr>
+              <a:t>y_train</a:t>
+            </a:r>
+            <a:r>
+              <a:rPr lang="en-US" sz="1200" dirty="0">
+                <a:solidFill>
+                  <a:schemeClr val="accent5"/>
+                </a:solidFill>
+              </a:rPr>
+              <a:t>, </a:t>
+            </a:r>
+            <a:r>
+              <a:rPr lang="en-US" sz="1200" dirty="0" err="1">
+                <a:solidFill>
+                  <a:schemeClr val="accent5"/>
+                </a:solidFill>
+              </a:rPr>
+              <a:t>y_test</a:t>
+            </a:r>
+            <a:r>
+              <a:rPr lang="en-US" sz="1200" dirty="0">
+                <a:solidFill>
+                  <a:schemeClr val="accent5"/>
+                </a:solidFill>
+              </a:rPr>
+              <a:t> = </a:t>
+            </a:r>
+            <a:r>
+              <a:rPr lang="en-US" sz="1200" dirty="0" err="1">
+                <a:solidFill>
+                  <a:schemeClr val="accent5"/>
+                </a:solidFill>
+              </a:rPr>
+              <a:t>train_test_split</a:t>
+            </a:r>
+            <a:r>
+              <a:rPr lang="en-US" sz="1200" dirty="0">
+                <a:solidFill>
+                  <a:schemeClr val="accent5"/>
+                </a:solidFill>
+              </a:rPr>
+              <a:t>(X, y, test)</a:t>
+            </a:r>
+          </a:p>
+          <a:p>
+            <a:pPr marL="0" indent="0">
+              <a:lnSpc>
+                <a:spcPct val="100000"/>
+              </a:lnSpc>
+              <a:spcBef>
+                <a:spcPts val="0"/>
+              </a:spcBef>
+              <a:buFont typeface="Arial" panose="020B0604020202020204" pitchFamily="34" charset="0"/>
+              <a:buNone/>
+            </a:pPr>
+            <a:r>
+              <a:rPr lang="en-US" sz="1200" dirty="0">
+                <a:solidFill>
+                  <a:schemeClr val="accent5"/>
+                </a:solidFill>
+              </a:rPr>
+              <a:t>#Scale data</a:t>
+            </a:r>
+          </a:p>
+          <a:p>
+            <a:pPr marL="0" indent="0">
+              <a:lnSpc>
+                <a:spcPct val="100000"/>
+              </a:lnSpc>
+              <a:spcBef>
+                <a:spcPts val="0"/>
+              </a:spcBef>
+              <a:buFont typeface="Arial" panose="020B0604020202020204" pitchFamily="34" charset="0"/>
+              <a:buNone/>
+            </a:pPr>
+            <a:r>
+              <a:rPr lang="en-US" sz="1200" dirty="0" err="1">
+                <a:solidFill>
+                  <a:schemeClr val="accent5"/>
+                </a:solidFill>
+              </a:rPr>
+              <a:t>sc</a:t>
+            </a:r>
+            <a:r>
+              <a:rPr lang="en-US" sz="1200" dirty="0">
+                <a:solidFill>
+                  <a:schemeClr val="accent5"/>
+                </a:solidFill>
+              </a:rPr>
+              <a:t>=</a:t>
+            </a:r>
+            <a:r>
+              <a:rPr lang="en-US" sz="1200" dirty="0" err="1">
+                <a:solidFill>
+                  <a:schemeClr val="accent5"/>
+                </a:solidFill>
+              </a:rPr>
+              <a:t>MinMaxScaler</a:t>
+            </a:r>
+            <a:r>
+              <a:rPr lang="en-US" sz="1200" dirty="0">
+                <a:solidFill>
+                  <a:schemeClr val="accent5"/>
+                </a:solidFill>
+              </a:rPr>
+              <a:t>()</a:t>
+            </a:r>
+          </a:p>
+          <a:p>
+            <a:pPr marL="0" indent="0">
+              <a:lnSpc>
+                <a:spcPct val="100000"/>
+              </a:lnSpc>
+              <a:spcBef>
+                <a:spcPts val="0"/>
+              </a:spcBef>
+              <a:buFont typeface="Arial" panose="020B0604020202020204" pitchFamily="34" charset="0"/>
+              <a:buNone/>
+            </a:pPr>
+            <a:r>
+              <a:rPr lang="en-US" sz="1200" dirty="0" err="1">
+                <a:solidFill>
+                  <a:schemeClr val="accent5"/>
+                </a:solidFill>
+              </a:rPr>
+              <a:t>X_train_scaled</a:t>
+            </a:r>
+            <a:r>
+              <a:rPr lang="en-US" sz="1200" dirty="0">
+                <a:solidFill>
+                  <a:schemeClr val="accent5"/>
+                </a:solidFill>
+              </a:rPr>
+              <a:t> = </a:t>
+            </a:r>
+            <a:r>
+              <a:rPr lang="en-US" sz="1200" dirty="0" err="1">
+                <a:solidFill>
+                  <a:schemeClr val="accent5"/>
+                </a:solidFill>
+              </a:rPr>
+              <a:t>sc.fit_transform</a:t>
+            </a:r>
+            <a:r>
+              <a:rPr lang="en-US" sz="1200" dirty="0">
+                <a:solidFill>
+                  <a:schemeClr val="accent5"/>
+                </a:solidFill>
+              </a:rPr>
+              <a:t>(</a:t>
+            </a:r>
+            <a:r>
+              <a:rPr lang="en-US" sz="1200" dirty="0" err="1">
+                <a:solidFill>
+                  <a:schemeClr val="accent5"/>
+                </a:solidFill>
+              </a:rPr>
+              <a:t>X_train</a:t>
+            </a:r>
+            <a:r>
+              <a:rPr lang="en-US" sz="1200" dirty="0">
+                <a:solidFill>
+                  <a:schemeClr val="accent5"/>
+                </a:solidFill>
+              </a:rPr>
+              <a:t>)</a:t>
+            </a:r>
+          </a:p>
+          <a:p>
+            <a:pPr marL="0" indent="0">
+              <a:lnSpc>
+                <a:spcPct val="100000"/>
+              </a:lnSpc>
+              <a:spcBef>
+                <a:spcPts val="0"/>
+              </a:spcBef>
+              <a:buFont typeface="Arial" panose="020B0604020202020204" pitchFamily="34" charset="0"/>
+              <a:buNone/>
+            </a:pPr>
+            <a:r>
+              <a:rPr lang="en-US" sz="1200" dirty="0" err="1">
+                <a:solidFill>
+                  <a:schemeClr val="accent5"/>
+                </a:solidFill>
+              </a:rPr>
+              <a:t>X_test_scaled</a:t>
+            </a:r>
+            <a:r>
+              <a:rPr lang="en-US" sz="1200" dirty="0">
+                <a:solidFill>
+                  <a:schemeClr val="accent5"/>
+                </a:solidFill>
+              </a:rPr>
+              <a:t> = </a:t>
+            </a:r>
+            <a:r>
+              <a:rPr lang="en-US" sz="1200" dirty="0" err="1">
+                <a:solidFill>
+                  <a:schemeClr val="accent5"/>
+                </a:solidFill>
+              </a:rPr>
+              <a:t>sc.transform</a:t>
+            </a:r>
+            <a:r>
+              <a:rPr lang="en-US" sz="1200" dirty="0">
+                <a:solidFill>
+                  <a:schemeClr val="accent5"/>
+                </a:solidFill>
+              </a:rPr>
+              <a:t>(</a:t>
+            </a:r>
+            <a:r>
+              <a:rPr lang="en-US" sz="1200" dirty="0" err="1">
+                <a:solidFill>
+                  <a:schemeClr val="accent5"/>
+                </a:solidFill>
+              </a:rPr>
+              <a:t>X_test</a:t>
+            </a:r>
+            <a:r>
+              <a:rPr lang="en-US" sz="1200" dirty="0">
+                <a:solidFill>
+                  <a:schemeClr val="accent5"/>
+                </a:solidFill>
+              </a:rPr>
+              <a:t>)</a:t>
+            </a:r>
+          </a:p>
+          <a:p>
+            <a:pPr marL="0" indent="0">
+              <a:lnSpc>
+                <a:spcPct val="100000"/>
+              </a:lnSpc>
+              <a:spcBef>
+                <a:spcPts val="0"/>
+              </a:spcBef>
+              <a:buFont typeface="Arial" panose="020B0604020202020204" pitchFamily="34" charset="0"/>
+              <a:buNone/>
+            </a:pPr>
+            <a:r>
+              <a:rPr lang="en-US" sz="1200" dirty="0">
+                <a:solidFill>
+                  <a:schemeClr val="accent5"/>
+                </a:solidFill>
+              </a:rPr>
+              <a:t># Create 7 </a:t>
+            </a:r>
+            <a:r>
+              <a:rPr lang="en-US" sz="1200" dirty="0" err="1">
+                <a:solidFill>
+                  <a:schemeClr val="accent5"/>
+                </a:solidFill>
+              </a:rPr>
+              <a:t>clf</a:t>
+            </a:r>
+            <a:r>
+              <a:rPr lang="en-US" sz="1200" dirty="0">
+                <a:solidFill>
+                  <a:schemeClr val="accent5"/>
+                </a:solidFill>
+              </a:rPr>
+              <a:t> models and store results utilizing </a:t>
+            </a:r>
+            <a:r>
+              <a:rPr lang="en-US" sz="1200" dirty="0" err="1">
+                <a:solidFill>
+                  <a:schemeClr val="accent5"/>
+                </a:solidFill>
+              </a:rPr>
+              <a:t>grid_search</a:t>
+            </a:r>
+            <a:endParaRPr lang="en-US" sz="1200" dirty="0">
+              <a:solidFill>
+                <a:schemeClr val="accent5"/>
+              </a:solidFill>
+            </a:endParaRPr>
+          </a:p>
+          <a:p>
+            <a:pPr marL="0" indent="0">
+              <a:lnSpc>
+                <a:spcPct val="100000"/>
+              </a:lnSpc>
+              <a:spcBef>
+                <a:spcPts val="0"/>
+              </a:spcBef>
+              <a:buFont typeface="Arial" panose="020B0604020202020204" pitchFamily="34" charset="0"/>
+              <a:buNone/>
+            </a:pPr>
+            <a:r>
+              <a:rPr lang="en-US" sz="1200" dirty="0">
+                <a:solidFill>
+                  <a:schemeClr val="accent5"/>
+                </a:solidFill>
+              </a:rPr>
+              <a:t>for model in models:</a:t>
+            </a:r>
+          </a:p>
+          <a:p>
+            <a:pPr marL="0" indent="0">
+              <a:lnSpc>
+                <a:spcPct val="100000"/>
+              </a:lnSpc>
+              <a:spcBef>
+                <a:spcPts val="0"/>
+              </a:spcBef>
+              <a:buFont typeface="Arial" panose="020B0604020202020204" pitchFamily="34" charset="0"/>
+              <a:buNone/>
+            </a:pPr>
+            <a:r>
+              <a:rPr lang="en-US" sz="1200" dirty="0">
+                <a:solidFill>
+                  <a:schemeClr val="accent5"/>
+                </a:solidFill>
+              </a:rPr>
+              <a:t>  print(model["</a:t>
+            </a:r>
+            <a:r>
+              <a:rPr lang="en-US" sz="1200" dirty="0" err="1">
+                <a:solidFill>
+                  <a:schemeClr val="accent5"/>
+                </a:solidFill>
+              </a:rPr>
+              <a:t>estimater</a:t>
+            </a:r>
+            <a:r>
+              <a:rPr lang="en-US" sz="1200" dirty="0">
+                <a:solidFill>
+                  <a:schemeClr val="accent5"/>
+                </a:solidFill>
+              </a:rPr>
+              <a:t>"])</a:t>
+            </a:r>
+          </a:p>
+          <a:p>
+            <a:pPr marL="0" indent="0">
+              <a:lnSpc>
+                <a:spcPct val="100000"/>
+              </a:lnSpc>
+              <a:spcBef>
+                <a:spcPts val="0"/>
+              </a:spcBef>
+              <a:buFont typeface="Arial" panose="020B0604020202020204" pitchFamily="34" charset="0"/>
+              <a:buNone/>
+            </a:pPr>
+            <a:endParaRPr lang="en-US" sz="1200" dirty="0">
+              <a:solidFill>
+                <a:schemeClr val="accent5"/>
+              </a:solidFill>
+            </a:endParaRPr>
+          </a:p>
+          <a:p>
+            <a:pPr marL="0" indent="0">
+              <a:lnSpc>
+                <a:spcPct val="100000"/>
+              </a:lnSpc>
+              <a:spcBef>
+                <a:spcPts val="0"/>
+              </a:spcBef>
+              <a:buFont typeface="Arial" panose="020B0604020202020204" pitchFamily="34" charset="0"/>
+              <a:buNone/>
+            </a:pPr>
+            <a:r>
+              <a:rPr lang="en-US" sz="1200" dirty="0">
+                <a:solidFill>
+                  <a:schemeClr val="accent5"/>
+                </a:solidFill>
+              </a:rPr>
+              <a:t>  # Create model</a:t>
+            </a:r>
+          </a:p>
+          <a:p>
+            <a:pPr marL="0" indent="0">
+              <a:lnSpc>
+                <a:spcPct val="100000"/>
+              </a:lnSpc>
+              <a:spcBef>
+                <a:spcPts val="0"/>
+              </a:spcBef>
+              <a:buFont typeface="Arial" panose="020B0604020202020204" pitchFamily="34" charset="0"/>
+              <a:buNone/>
+            </a:pPr>
+            <a:r>
+              <a:rPr lang="en-US" sz="1200" dirty="0">
+                <a:solidFill>
+                  <a:schemeClr val="accent5"/>
+                </a:solidFill>
+              </a:rPr>
+              <a:t>  </a:t>
+            </a:r>
+            <a:r>
+              <a:rPr lang="en-US" sz="1200" dirty="0" err="1">
+                <a:solidFill>
+                  <a:schemeClr val="accent5"/>
+                </a:solidFill>
+              </a:rPr>
+              <a:t>clf</a:t>
+            </a:r>
+            <a:r>
+              <a:rPr lang="en-US" sz="1200" dirty="0">
+                <a:solidFill>
+                  <a:schemeClr val="accent5"/>
+                </a:solidFill>
+              </a:rPr>
+              <a:t> = model["</a:t>
+            </a:r>
+            <a:r>
+              <a:rPr lang="en-US" sz="1200" dirty="0" err="1">
+                <a:solidFill>
+                  <a:schemeClr val="accent5"/>
+                </a:solidFill>
+              </a:rPr>
+              <a:t>estimater</a:t>
+            </a:r>
+            <a:r>
+              <a:rPr lang="en-US" sz="1200" dirty="0">
+                <a:solidFill>
+                  <a:schemeClr val="accent5"/>
+                </a:solidFill>
+              </a:rPr>
+              <a:t>"]</a:t>
+            </a:r>
+          </a:p>
+          <a:p>
+            <a:pPr marL="0" indent="0">
+              <a:lnSpc>
+                <a:spcPct val="100000"/>
+              </a:lnSpc>
+              <a:spcBef>
+                <a:spcPts val="0"/>
+              </a:spcBef>
+              <a:buFont typeface="Arial" panose="020B0604020202020204" pitchFamily="34" charset="0"/>
+              <a:buNone/>
+            </a:pPr>
+            <a:r>
+              <a:rPr lang="en-US" sz="1200" dirty="0">
+                <a:solidFill>
+                  <a:schemeClr val="accent5"/>
+                </a:solidFill>
+              </a:rPr>
+              <a:t>  # Instantiate the grid search model</a:t>
+            </a:r>
+          </a:p>
+          <a:p>
+            <a:pPr marL="0" indent="0">
+              <a:lnSpc>
+                <a:spcPct val="100000"/>
+              </a:lnSpc>
+              <a:spcBef>
+                <a:spcPts val="0"/>
+              </a:spcBef>
+              <a:buFont typeface="Arial" panose="020B0604020202020204" pitchFamily="34" charset="0"/>
+              <a:buNone/>
+            </a:pPr>
+            <a:r>
+              <a:rPr lang="en-US" sz="1200" dirty="0">
+                <a:solidFill>
+                  <a:schemeClr val="accent5"/>
+                </a:solidFill>
+              </a:rPr>
+              <a:t>  </a:t>
+            </a:r>
+            <a:r>
+              <a:rPr lang="en-US" sz="1200" dirty="0" err="1">
+                <a:solidFill>
+                  <a:schemeClr val="accent5"/>
+                </a:solidFill>
+              </a:rPr>
+              <a:t>grid_search</a:t>
+            </a:r>
+            <a:r>
+              <a:rPr lang="en-US" sz="1200" dirty="0">
+                <a:solidFill>
+                  <a:schemeClr val="accent5"/>
+                </a:solidFill>
+              </a:rPr>
+              <a:t> = </a:t>
+            </a:r>
+            <a:r>
+              <a:rPr lang="en-US" sz="1200" dirty="0" err="1">
+                <a:solidFill>
+                  <a:schemeClr val="accent5"/>
+                </a:solidFill>
+              </a:rPr>
+              <a:t>GridSearchCV</a:t>
+            </a:r>
+            <a:r>
+              <a:rPr lang="en-US" sz="1200" dirty="0">
+                <a:solidFill>
+                  <a:schemeClr val="accent5"/>
+                </a:solidFill>
+              </a:rPr>
+              <a:t>(estimator = </a:t>
+            </a:r>
+            <a:r>
+              <a:rPr lang="en-US" sz="1200" dirty="0" err="1">
+                <a:solidFill>
+                  <a:schemeClr val="accent5"/>
+                </a:solidFill>
+              </a:rPr>
+              <a:t>clf</a:t>
+            </a:r>
+            <a:r>
+              <a:rPr lang="en-US" sz="1200" dirty="0">
+                <a:solidFill>
+                  <a:schemeClr val="accent5"/>
+                </a:solidFill>
+              </a:rPr>
+              <a:t>, </a:t>
+            </a:r>
+            <a:r>
+              <a:rPr lang="en-US" sz="1200" dirty="0" err="1">
+                <a:solidFill>
+                  <a:schemeClr val="accent5"/>
+                </a:solidFill>
+              </a:rPr>
+              <a:t>param_grid</a:t>
+            </a:r>
+            <a:r>
+              <a:rPr lang="en-US" sz="1200" dirty="0">
+                <a:solidFill>
+                  <a:schemeClr val="accent5"/>
+                </a:solidFill>
+              </a:rPr>
+              <a:t> = model["params"], </a:t>
+            </a:r>
+          </a:p>
+          <a:p>
+            <a:pPr marL="0" indent="0">
+              <a:lnSpc>
+                <a:spcPct val="100000"/>
+              </a:lnSpc>
+              <a:spcBef>
+                <a:spcPts val="0"/>
+              </a:spcBef>
+              <a:buFont typeface="Arial" panose="020B0604020202020204" pitchFamily="34" charset="0"/>
+              <a:buNone/>
+            </a:pPr>
+            <a:r>
+              <a:rPr lang="en-US" sz="1200" dirty="0">
+                <a:solidFill>
+                  <a:schemeClr val="accent5"/>
+                </a:solidFill>
+              </a:rPr>
+              <a:t>                            cv = 10)</a:t>
+            </a:r>
+          </a:p>
+          <a:p>
+            <a:pPr marL="0" indent="0">
+              <a:lnSpc>
+                <a:spcPct val="100000"/>
+              </a:lnSpc>
+              <a:spcBef>
+                <a:spcPts val="0"/>
+              </a:spcBef>
+              <a:buFont typeface="Arial" panose="020B0604020202020204" pitchFamily="34" charset="0"/>
+              <a:buNone/>
+            </a:pPr>
+            <a:endParaRPr lang="en-US" sz="1200" dirty="0">
+              <a:solidFill>
+                <a:schemeClr val="accent5"/>
+              </a:solidFill>
+            </a:endParaRPr>
           </a:p>
         </p:txBody>
       </p:sp>

</xml_diff>